<commit_message>
Se realiza el código base del modelado y se obtienen los primeros resultados
</commit_message>
<xml_diff>
--- a/03_BASIC_MODELLING/03_BASIC_MODELLING.pptx
+++ b/03_BASIC_MODELLING/03_BASIC_MODELLING.pptx
@@ -5,7 +5,7 @@
     <p:sldMasterId id="2147483648" r:id="rId1"/>
   </p:sldMasterIdLst>
   <p:notesMasterIdLst>
-    <p:notesMasterId r:id="rId28"/>
+    <p:notesMasterId r:id="rId29"/>
   </p:notesMasterIdLst>
   <p:sldIdLst>
     <p:sldId id="256" r:id="rId2"/>
@@ -32,8 +32,9 @@
     <p:sldId id="565" r:id="rId23"/>
     <p:sldId id="563" r:id="rId24"/>
     <p:sldId id="580" r:id="rId25"/>
-    <p:sldId id="564" r:id="rId26"/>
-    <p:sldId id="538" r:id="rId27"/>
+    <p:sldId id="581" r:id="rId26"/>
+    <p:sldId id="564" r:id="rId27"/>
+    <p:sldId id="538" r:id="rId28"/>
   </p:sldIdLst>
   <p:sldSz cx="12192000" cy="6858000"/>
   <p:notesSz cx="6858000" cy="9144000"/>
@@ -161,6 +162,7 @@
             <p14:sldId id="565"/>
             <p14:sldId id="563"/>
             <p14:sldId id="580"/>
+            <p14:sldId id="581"/>
             <p14:sldId id="564"/>
             <p14:sldId id="538"/>
           </p14:sldIdLst>
@@ -259,7 +261,7 @@
           <a:p>
             <a:fld id="{6118F894-A91F-4842-BD9A-7582ADBE2C27}" type="datetimeFigureOut">
               <a:rPr lang="en-US" smtClean="0"/>
-              <a:t>4/13/2021</a:t>
+              <a:t>4/15/2021</a:t>
             </a:fld>
             <a:endParaRPr lang="en-US" dirty="0"/>
           </a:p>
@@ -676,7 +678,7 @@
           <a:p>
             <a:fld id="{15119D3F-0F06-48B5-A311-F7380CC22BDC}" type="datetimeFigureOut">
               <a:rPr lang="en-US" smtClean="0"/>
-              <a:t>4/13/2021</a:t>
+              <a:t>4/15/2021</a:t>
             </a:fld>
             <a:endParaRPr lang="en-US" dirty="0"/>
           </a:p>
@@ -876,7 +878,7 @@
           <a:p>
             <a:fld id="{15119D3F-0F06-48B5-A311-F7380CC22BDC}" type="datetimeFigureOut">
               <a:rPr lang="en-US" smtClean="0"/>
-              <a:t>4/13/2021</a:t>
+              <a:t>4/15/2021</a:t>
             </a:fld>
             <a:endParaRPr lang="en-US" dirty="0"/>
           </a:p>
@@ -1086,7 +1088,7 @@
           <a:p>
             <a:fld id="{15119D3F-0F06-48B5-A311-F7380CC22BDC}" type="datetimeFigureOut">
               <a:rPr lang="en-US" smtClean="0"/>
-              <a:t>4/13/2021</a:t>
+              <a:t>4/15/2021</a:t>
             </a:fld>
             <a:endParaRPr lang="en-US" dirty="0"/>
           </a:p>
@@ -1286,7 +1288,7 @@
           <a:p>
             <a:fld id="{15119D3F-0F06-48B5-A311-F7380CC22BDC}" type="datetimeFigureOut">
               <a:rPr lang="en-US" smtClean="0"/>
-              <a:t>4/13/2021</a:t>
+              <a:t>4/15/2021</a:t>
             </a:fld>
             <a:endParaRPr lang="en-US" dirty="0"/>
           </a:p>
@@ -1562,7 +1564,7 @@
           <a:p>
             <a:fld id="{15119D3F-0F06-48B5-A311-F7380CC22BDC}" type="datetimeFigureOut">
               <a:rPr lang="en-US" smtClean="0"/>
-              <a:t>4/13/2021</a:t>
+              <a:t>4/15/2021</a:t>
             </a:fld>
             <a:endParaRPr lang="en-US" dirty="0"/>
           </a:p>
@@ -1830,7 +1832,7 @@
           <a:p>
             <a:fld id="{15119D3F-0F06-48B5-A311-F7380CC22BDC}" type="datetimeFigureOut">
               <a:rPr lang="en-US" smtClean="0"/>
-              <a:t>4/13/2021</a:t>
+              <a:t>4/15/2021</a:t>
             </a:fld>
             <a:endParaRPr lang="en-US" dirty="0"/>
           </a:p>
@@ -2245,7 +2247,7 @@
           <a:p>
             <a:fld id="{15119D3F-0F06-48B5-A311-F7380CC22BDC}" type="datetimeFigureOut">
               <a:rPr lang="en-US" smtClean="0"/>
-              <a:t>4/13/2021</a:t>
+              <a:t>4/15/2021</a:t>
             </a:fld>
             <a:endParaRPr lang="en-US" dirty="0"/>
           </a:p>
@@ -2387,7 +2389,7 @@
           <a:p>
             <a:fld id="{15119D3F-0F06-48B5-A311-F7380CC22BDC}" type="datetimeFigureOut">
               <a:rPr lang="en-US" smtClean="0"/>
-              <a:t>4/13/2021</a:t>
+              <a:t>4/15/2021</a:t>
             </a:fld>
             <a:endParaRPr lang="en-US" dirty="0"/>
           </a:p>
@@ -2500,7 +2502,7 @@
           <a:p>
             <a:fld id="{15119D3F-0F06-48B5-A311-F7380CC22BDC}" type="datetimeFigureOut">
               <a:rPr lang="en-US" smtClean="0"/>
-              <a:t>4/13/2021</a:t>
+              <a:t>4/15/2021</a:t>
             </a:fld>
             <a:endParaRPr lang="en-US" dirty="0"/>
           </a:p>
@@ -2914,7 +2916,7 @@
           <a:p>
             <a:fld id="{15119D3F-0F06-48B5-A311-F7380CC22BDC}" type="datetimeFigureOut">
               <a:rPr lang="en-US" smtClean="0"/>
-              <a:t>4/13/2021</a:t>
+              <a:t>4/15/2021</a:t>
             </a:fld>
             <a:endParaRPr lang="en-US" dirty="0"/>
           </a:p>
@@ -3203,7 +3205,7 @@
           <a:p>
             <a:fld id="{15119D3F-0F06-48B5-A311-F7380CC22BDC}" type="datetimeFigureOut">
               <a:rPr lang="en-US" smtClean="0"/>
-              <a:t>4/13/2021</a:t>
+              <a:t>4/15/2021</a:t>
             </a:fld>
             <a:endParaRPr lang="en-US" dirty="0"/>
           </a:p>
@@ -3448,7 +3450,7 @@
             <a:fld id="{15119D3F-0F06-48B5-A311-F7380CC22BDC}" type="datetimeFigureOut">
               <a:rPr lang="en-US" smtClean="0"/>
               <a:pPr/>
-              <a:t>4/13/2021</a:t>
+              <a:t>4/15/2021</a:t>
             </a:fld>
             <a:endParaRPr lang="en-US" dirty="0"/>
           </a:p>
@@ -6911,6 +6913,51 @@
                       </p:childTnLst>
                     </p:cTn>
                   </p:par>
+                  <p:par>
+                    <p:cTn id="7" fill="hold">
+                      <p:stCondLst>
+                        <p:cond delay="indefinite"/>
+                      </p:stCondLst>
+                      <p:childTnLst>
+                        <p:par>
+                          <p:cTn id="8" fill="hold">
+                            <p:stCondLst>
+                              <p:cond delay="0"/>
+                            </p:stCondLst>
+                            <p:childTnLst>
+                              <p:par>
+                                <p:cTn id="9" presetID="1" presetClass="entr" presetSubtype="0" fill="hold" grpId="0" nodeType="clickEffect">
+                                  <p:stCondLst>
+                                    <p:cond delay="0"/>
+                                  </p:stCondLst>
+                                  <p:childTnLst>
+                                    <p:set>
+                                      <p:cBhvr>
+                                        <p:cTn id="10" dur="1" fill="hold">
+                                          <p:stCondLst>
+                                            <p:cond delay="0"/>
+                                          </p:stCondLst>
+                                        </p:cTn>
+                                        <p:tgtEl>
+                                          <p:spTgt spid="4"/>
+                                        </p:tgtEl>
+                                        <p:attrNameLst>
+                                          <p:attrName>style.visibility</p:attrName>
+                                        </p:attrNameLst>
+                                      </p:cBhvr>
+                                      <p:to>
+                                        <p:strVal val="visible"/>
+                                      </p:to>
+                                    </p:set>
+                                  </p:childTnLst>
+                                </p:cTn>
+                              </p:par>
+                            </p:childTnLst>
+                          </p:cTn>
+                        </p:par>
+                      </p:childTnLst>
+                    </p:cTn>
+                  </p:par>
                 </p:childTnLst>
               </p:cTn>
               <p:prevCondLst>
@@ -6934,6 +6981,7 @@
     </p:tnLst>
     <p:bldLst>
       <p:bldP spid="12" grpId="0"/>
+      <p:bldP spid="4" grpId="0" animBg="1"/>
     </p:bldLst>
   </p:timing>
 </p:sld>
@@ -9305,6 +9353,112 @@
   <p:clrMapOvr>
     <a:masterClrMapping/>
   </p:clrMapOvr>
+  <p:timing>
+    <p:tnLst>
+      <p:par>
+        <p:cTn id="1" dur="indefinite" restart="never" nodeType="tmRoot">
+          <p:childTnLst>
+            <p:seq concurrent="1" nextAc="seek">
+              <p:cTn id="2" dur="indefinite" nodeType="mainSeq">
+                <p:childTnLst>
+                  <p:par>
+                    <p:cTn id="3" fill="hold">
+                      <p:stCondLst>
+                        <p:cond delay="indefinite"/>
+                      </p:stCondLst>
+                      <p:childTnLst>
+                        <p:par>
+                          <p:cTn id="4" fill="hold">
+                            <p:stCondLst>
+                              <p:cond delay="0"/>
+                            </p:stCondLst>
+                            <p:childTnLst>
+                              <p:par>
+                                <p:cTn id="5" presetID="1" presetClass="entr" presetSubtype="0" fill="hold" grpId="0" nodeType="clickEffect">
+                                  <p:stCondLst>
+                                    <p:cond delay="0"/>
+                                  </p:stCondLst>
+                                  <p:childTnLst>
+                                    <p:set>
+                                      <p:cBhvr>
+                                        <p:cTn id="6" dur="1" fill="hold">
+                                          <p:stCondLst>
+                                            <p:cond delay="0"/>
+                                          </p:stCondLst>
+                                        </p:cTn>
+                                        <p:tgtEl>
+                                          <p:spTgt spid="7"/>
+                                        </p:tgtEl>
+                                        <p:attrNameLst>
+                                          <p:attrName>style.visibility</p:attrName>
+                                        </p:attrNameLst>
+                                      </p:cBhvr>
+                                      <p:to>
+                                        <p:strVal val="visible"/>
+                                      </p:to>
+                                    </p:set>
+                                  </p:childTnLst>
+                                </p:cTn>
+                              </p:par>
+                              <p:par>
+                                <p:cTn id="7" presetID="1" presetClass="entr" presetSubtype="0" fill="hold" grpId="0" nodeType="withEffect">
+                                  <p:stCondLst>
+                                    <p:cond delay="0"/>
+                                  </p:stCondLst>
+                                  <p:childTnLst>
+                                    <p:set>
+                                      <p:cBhvr>
+                                        <p:cTn id="8" dur="1" fill="hold">
+                                          <p:stCondLst>
+                                            <p:cond delay="0"/>
+                                          </p:stCondLst>
+                                        </p:cTn>
+                                        <p:tgtEl>
+                                          <p:spTgt spid="6"/>
+                                        </p:tgtEl>
+                                        <p:attrNameLst>
+                                          <p:attrName>style.visibility</p:attrName>
+                                        </p:attrNameLst>
+                                      </p:cBhvr>
+                                      <p:to>
+                                        <p:strVal val="visible"/>
+                                      </p:to>
+                                    </p:set>
+                                  </p:childTnLst>
+                                </p:cTn>
+                              </p:par>
+                            </p:childTnLst>
+                          </p:cTn>
+                        </p:par>
+                      </p:childTnLst>
+                    </p:cTn>
+                  </p:par>
+                </p:childTnLst>
+              </p:cTn>
+              <p:prevCondLst>
+                <p:cond evt="onPrev" delay="0">
+                  <p:tgtEl>
+                    <p:sldTgt/>
+                  </p:tgtEl>
+                </p:cond>
+              </p:prevCondLst>
+              <p:nextCondLst>
+                <p:cond evt="onNext" delay="0">
+                  <p:tgtEl>
+                    <p:sldTgt/>
+                  </p:tgtEl>
+                </p:cond>
+              </p:nextCondLst>
+            </p:seq>
+          </p:childTnLst>
+        </p:cTn>
+      </p:par>
+    </p:tnLst>
+    <p:bldLst>
+      <p:bldP spid="6" grpId="0" animBg="1"/>
+      <p:bldP spid="7" grpId="0" animBg="1"/>
+    </p:bldLst>
+  </p:timing>
 </p:sld>
 </file>
 
@@ -17267,8 +17421,12 @@
             <a:lstStyle/>
             <a:p>
               <a:r>
-                <a:rPr lang="es-ES"/>
-                <a:t>Autoregresión. Modelo que utiliza la relación dependiente entre una observación y un cierto número de observaciones retardadas.</a:t>
+                <a:rPr lang="es-ES" b="1" dirty="0" err="1"/>
+                <a:t>Autoregresión</a:t>
+              </a:r>
+              <a:r>
+                <a:rPr lang="es-ES" dirty="0"/>
+                <a:t>. El modelo utiliza la relación dependiente entre una observación y un cierto número de observaciones retardadas.</a:t>
               </a:r>
             </a:p>
           </p:txBody>
@@ -17344,10 +17502,10 @@
         </p:nvGrpSpPr>
         <p:grpSpPr>
           <a:xfrm>
-            <a:off x="2491530" y="2702902"/>
-            <a:ext cx="6593745" cy="1782610"/>
-            <a:chOff x="2491530" y="2702902"/>
-            <a:chExt cx="6593745" cy="1782610"/>
+            <a:off x="1610687" y="2702902"/>
+            <a:ext cx="8237987" cy="1782610"/>
+            <a:chOff x="847288" y="2702902"/>
+            <a:chExt cx="8237987" cy="1782610"/>
           </a:xfrm>
           <a:solidFill>
             <a:srgbClr val="C00000"/>
@@ -17367,8 +17525,8 @@
           </p:nvSpPr>
           <p:spPr>
             <a:xfrm>
-              <a:off x="2491530" y="2891604"/>
-              <a:ext cx="6342077" cy="1593908"/>
+              <a:off x="847288" y="2891604"/>
+              <a:ext cx="7986319" cy="1593908"/>
             </a:xfrm>
             <a:prstGeom prst="roundRect">
               <a:avLst/>
@@ -17401,8 +17559,12 @@
             <a:lstStyle/>
             <a:p>
               <a:r>
+                <a:rPr lang="es-ES" b="1" dirty="0"/>
+                <a:t>Integrado</a:t>
+              </a:r>
+              <a:r>
                 <a:rPr lang="es-ES" dirty="0"/>
-                <a:t>Integrado. El uso de la diferenciación de las observaciones brutas (por ejemplo, restando una observación de una observación en el paso de tiempo anterior) con el fin de hacer la serie de tiempo estacionaria.</a:t>
+                <a:t>. El uso de la diferenciación de las observaciones brutas (por ejemplo, restando una observación de una observación en el paso de tiempo anterior) con el fin de hacer la serie de tiempo estacionaria. Integrado significa que se predicen las diferencias de t-1 a t en vez del valor de la serie directamente.</a:t>
               </a:r>
             </a:p>
           </p:txBody>
@@ -17478,10 +17640,10 @@
         </p:nvGrpSpPr>
         <p:grpSpPr>
           <a:xfrm>
-            <a:off x="4211273" y="4645003"/>
-            <a:ext cx="6740553" cy="1754249"/>
-            <a:chOff x="3816990" y="4436826"/>
-            <a:chExt cx="6740553" cy="1754249"/>
+            <a:off x="3932807" y="4674214"/>
+            <a:ext cx="7383003" cy="1754249"/>
+            <a:chOff x="3174540" y="4436826"/>
+            <a:chExt cx="7383003" cy="1754249"/>
           </a:xfrm>
         </p:grpSpPr>
         <p:sp>
@@ -17498,8 +17660,8 @@
           </p:nvSpPr>
           <p:spPr>
             <a:xfrm>
-              <a:off x="3816990" y="4751363"/>
-              <a:ext cx="6342077" cy="1439712"/>
+              <a:off x="3174540" y="4751363"/>
+              <a:ext cx="6984527" cy="1439712"/>
             </a:xfrm>
             <a:prstGeom prst="roundRect">
               <a:avLst/>
@@ -17531,8 +17693,12 @@
             <a:lstStyle/>
             <a:p>
               <a:r>
+                <a:rPr lang="es-ES" b="1" dirty="0"/>
+                <a:t>Media móvil</a:t>
+              </a:r>
+              <a:r>
                 <a:rPr lang="es-ES" dirty="0"/>
-                <a:t>Media móvil. Modelo que utiliza la dependencia entre una observación y un error residual de un modelo de media móvil aplicado a las observaciones retardadas.</a:t>
+                <a:t>. El modelo utiliza la dependencia entre una observación y un error residual de un modelo de media móvil aplicado a las observaciones retardadas.</a:t>
               </a:r>
             </a:p>
           </p:txBody>
@@ -18016,7 +18182,7 @@
         <p:spPr>
           <a:xfrm>
             <a:off x="1786856" y="1427979"/>
-            <a:ext cx="8825218" cy="369332"/>
+            <a:ext cx="4667210" cy="646331"/>
           </a:xfrm>
           <a:prstGeom prst="rect">
             <a:avLst/>
@@ -18059,8 +18225,8 @@
         </p:nvSpPr>
         <p:spPr>
           <a:xfrm>
-            <a:off x="1786856" y="2252984"/>
-            <a:ext cx="8825218" cy="369332"/>
+            <a:off x="1683391" y="2252984"/>
+            <a:ext cx="4667210" cy="646331"/>
           </a:xfrm>
           <a:prstGeom prst="rect">
             <a:avLst/>
@@ -18079,7 +18245,7 @@
                   <a:srgbClr val="C00000"/>
                 </a:solidFill>
               </a:rPr>
-              <a:t>Diferenciación con los </a:t>
+              <a:t>Orden de la diferenciación con los </a:t>
             </a:r>
             <a:r>
               <a:rPr lang="es-ES" dirty="0" err="1">
@@ -18120,7 +18286,7 @@
         <p:spPr>
           <a:xfrm>
             <a:off x="1786856" y="2961857"/>
-            <a:ext cx="8825218" cy="369332"/>
+            <a:ext cx="4309144" cy="369332"/>
           </a:xfrm>
           <a:prstGeom prst="rect">
             <a:avLst/>
@@ -18178,7 +18344,7 @@
         </p:blipFill>
         <p:spPr bwMode="auto">
           <a:xfrm>
-            <a:off x="2206303" y="3429000"/>
+            <a:off x="2676223" y="3572174"/>
             <a:ext cx="7348756" cy="1624764"/>
           </a:xfrm>
           <a:prstGeom prst="rect">
@@ -19654,6 +19820,50 @@
               <a:effectLst/>
               <a:latin typeface="Arial" panose="020B0604020202020204" pitchFamily="34" charset="0"/>
             </a:endParaRPr>
+          </a:p>
+        </p:txBody>
+      </p:sp>
+      <p:sp>
+        <p:nvSpPr>
+          <p:cNvPr id="3" name="CuadroTexto 2">
+            <a:extLst>
+              <a:ext uri="{FF2B5EF4-FFF2-40B4-BE49-F238E27FC236}">
+                <a16:creationId xmlns:a16="http://schemas.microsoft.com/office/drawing/2014/main" id="{C219C963-9AC9-4F45-AB10-571CDB65EA1C}"/>
+              </a:ext>
+            </a:extLst>
+          </p:cNvPr>
+          <p:cNvSpPr txBox="1"/>
+          <p:nvPr/>
+        </p:nvSpPr>
+        <p:spPr>
+          <a:xfrm>
+            <a:off x="8022" y="4052511"/>
+            <a:ext cx="3933406" cy="369332"/>
+          </a:xfrm>
+          <a:prstGeom prst="rect">
+            <a:avLst/>
+          </a:prstGeom>
+          <a:noFill/>
+        </p:spPr>
+        <p:txBody>
+          <a:bodyPr wrap="square" rtlCol="0">
+            <a:spAutoFit/>
+          </a:bodyPr>
+          <a:lstStyle/>
+          <a:p>
+            <a:r>
+              <a:rPr lang="es-ES" dirty="0"/>
+              <a:t>Ejemplo ARIMA(</a:t>
+            </a:r>
+            <a:r>
+              <a:rPr lang="es-ES" dirty="0" err="1"/>
+              <a:t>p,d,q</a:t>
+            </a:r>
+            <a:r>
+              <a:rPr lang="es-ES" dirty="0"/>
+              <a:t>)</a:t>
+            </a:r>
+            <a:endParaRPr lang="en-US" dirty="0"/>
           </a:p>
         </p:txBody>
       </p:sp>
@@ -19773,6 +19983,51 @@
                                           </p:stCondLst>
                                         </p:cTn>
                                         <p:tgtEl>
+                                          <p:spTgt spid="3"/>
+                                        </p:tgtEl>
+                                        <p:attrNameLst>
+                                          <p:attrName>style.visibility</p:attrName>
+                                        </p:attrNameLst>
+                                      </p:cBhvr>
+                                      <p:to>
+                                        <p:strVal val="visible"/>
+                                      </p:to>
+                                    </p:set>
+                                  </p:childTnLst>
+                                </p:cTn>
+                              </p:par>
+                            </p:childTnLst>
+                          </p:cTn>
+                        </p:par>
+                      </p:childTnLst>
+                    </p:cTn>
+                  </p:par>
+                  <p:par>
+                    <p:cTn id="13" fill="hold">
+                      <p:stCondLst>
+                        <p:cond delay="indefinite"/>
+                      </p:stCondLst>
+                      <p:childTnLst>
+                        <p:par>
+                          <p:cTn id="14" fill="hold">
+                            <p:stCondLst>
+                              <p:cond delay="0"/>
+                            </p:stCondLst>
+                            <p:childTnLst>
+                              <p:par>
+                                <p:cTn id="15" presetID="1" presetClass="entr" presetSubtype="0" fill="hold" grpId="0" nodeType="clickEffect">
+                                  <p:stCondLst>
+                                    <p:cond delay="0"/>
+                                  </p:stCondLst>
+                                  <p:childTnLst>
+                                    <p:set>
+                                      <p:cBhvr>
+                                        <p:cTn id="16" dur="1" fill="hold">
+                                          <p:stCondLst>
+                                            <p:cond delay="0"/>
+                                          </p:stCondLst>
+                                        </p:cTn>
+                                        <p:tgtEl>
                                           <p:spTgt spid="17"/>
                                         </p:tgtEl>
                                         <p:attrNameLst>
@@ -19816,6 +20071,7 @@
     <p:bldLst>
       <p:bldP spid="5" grpId="0"/>
       <p:bldP spid="17" grpId="0" animBg="1"/>
+      <p:bldP spid="3" grpId="0"/>
     </p:bldLst>
   </p:timing>
 </p:sld>
@@ -19843,6 +20099,881 @@
           <p:cNvPr id="4" name="CuadroTexto 3">
             <a:extLst>
               <a:ext uri="{FF2B5EF4-FFF2-40B4-BE49-F238E27FC236}">
+                <a16:creationId xmlns:a16="http://schemas.microsoft.com/office/drawing/2014/main" id="{A48A2DB7-45D1-4352-8A85-2E75FD0B506F}"/>
+              </a:ext>
+            </a:extLst>
+          </p:cNvPr>
+          <p:cNvSpPr txBox="1"/>
+          <p:nvPr/>
+        </p:nvSpPr>
+        <p:spPr>
+          <a:xfrm>
+            <a:off x="5729681" y="304358"/>
+            <a:ext cx="6579765" cy="584775"/>
+          </a:xfrm>
+          <a:prstGeom prst="rect">
+            <a:avLst/>
+          </a:prstGeom>
+          <a:noFill/>
+        </p:spPr>
+        <p:txBody>
+          <a:bodyPr wrap="square" rtlCol="0">
+            <a:spAutoFit/>
+          </a:bodyPr>
+          <a:lstStyle/>
+          <a:p>
+            <a:pPr algn="ctr"/>
+            <a:r>
+              <a:rPr lang="es-ES" sz="3200" dirty="0"/>
+              <a:t>Estructura de Modelado</a:t>
+            </a:r>
+          </a:p>
+        </p:txBody>
+      </p:sp>
+      <p:sp>
+        <p:nvSpPr>
+          <p:cNvPr id="5" name="Rectángulo: esquinas redondeadas 4">
+            <a:extLst>
+              <a:ext uri="{FF2B5EF4-FFF2-40B4-BE49-F238E27FC236}">
+                <a16:creationId xmlns:a16="http://schemas.microsoft.com/office/drawing/2014/main" id="{6D5EB826-FB16-4449-B3B9-F1D8DD76AF63}"/>
+              </a:ext>
+            </a:extLst>
+          </p:cNvPr>
+          <p:cNvSpPr/>
+          <p:nvPr/>
+        </p:nvSpPr>
+        <p:spPr>
+          <a:xfrm>
+            <a:off x="2740404" y="2741103"/>
+            <a:ext cx="2751589" cy="746620"/>
+          </a:xfrm>
+          <a:prstGeom prst="roundRect">
+            <a:avLst/>
+          </a:prstGeom>
+          <a:solidFill>
+            <a:srgbClr val="C00000"/>
+          </a:solidFill>
+          <a:ln>
+            <a:noFill/>
+          </a:ln>
+        </p:spPr>
+        <p:style>
+          <a:lnRef idx="2">
+            <a:schemeClr val="accent1">
+              <a:shade val="50000"/>
+            </a:schemeClr>
+          </a:lnRef>
+          <a:fillRef idx="1">
+            <a:schemeClr val="accent1"/>
+          </a:fillRef>
+          <a:effectRef idx="0">
+            <a:schemeClr val="accent1"/>
+          </a:effectRef>
+          <a:fontRef idx="minor">
+            <a:schemeClr val="lt1"/>
+          </a:fontRef>
+        </p:style>
+        <p:txBody>
+          <a:bodyPr rtlCol="0" anchor="ctr"/>
+          <a:lstStyle/>
+          <a:p>
+            <a:pPr algn="ctr"/>
+            <a:r>
+              <a:rPr lang="es-ES" dirty="0" err="1">
+                <a:solidFill>
+                  <a:schemeClr val="bg1"/>
+                </a:solidFill>
+              </a:rPr>
+              <a:t>Ts_modelling</a:t>
+            </a:r>
+            <a:r>
+              <a:rPr lang="es-ES" dirty="0">
+                <a:solidFill>
+                  <a:schemeClr val="bg1"/>
+                </a:solidFill>
+              </a:rPr>
+              <a:t>()</a:t>
+            </a:r>
+            <a:endParaRPr lang="en-US" dirty="0">
+              <a:solidFill>
+                <a:schemeClr val="bg1"/>
+              </a:solidFill>
+            </a:endParaRPr>
+          </a:p>
+        </p:txBody>
+      </p:sp>
+      <p:sp>
+        <p:nvSpPr>
+          <p:cNvPr id="7" name="Rectángulo: esquinas redondeadas 6">
+            <a:extLst>
+              <a:ext uri="{FF2B5EF4-FFF2-40B4-BE49-F238E27FC236}">
+                <a16:creationId xmlns:a16="http://schemas.microsoft.com/office/drawing/2014/main" id="{040784CE-4A17-47CA-9DBC-E05729007B80}"/>
+              </a:ext>
+            </a:extLst>
+          </p:cNvPr>
+          <p:cNvSpPr/>
+          <p:nvPr/>
+        </p:nvSpPr>
+        <p:spPr>
+          <a:xfrm>
+            <a:off x="5134063" y="4131576"/>
+            <a:ext cx="3221372" cy="746620"/>
+          </a:xfrm>
+          <a:prstGeom prst="roundRect">
+            <a:avLst/>
+          </a:prstGeom>
+          <a:solidFill>
+            <a:schemeClr val="tx1"/>
+          </a:solidFill>
+          <a:ln>
+            <a:noFill/>
+          </a:ln>
+        </p:spPr>
+        <p:style>
+          <a:lnRef idx="2">
+            <a:schemeClr val="accent1">
+              <a:shade val="50000"/>
+            </a:schemeClr>
+          </a:lnRef>
+          <a:fillRef idx="1">
+            <a:schemeClr val="accent1"/>
+          </a:fillRef>
+          <a:effectRef idx="0">
+            <a:schemeClr val="accent1"/>
+          </a:effectRef>
+          <a:fontRef idx="minor">
+            <a:schemeClr val="lt1"/>
+          </a:fontRef>
+        </p:style>
+        <p:txBody>
+          <a:bodyPr rtlCol="0" anchor="ctr"/>
+          <a:lstStyle/>
+          <a:p>
+            <a:pPr algn="ctr"/>
+            <a:r>
+              <a:rPr lang="es-ES" dirty="0" err="1">
+                <a:solidFill>
+                  <a:schemeClr val="bg1"/>
+                </a:solidFill>
+              </a:rPr>
+              <a:t>Walkforward_validation</a:t>
+            </a:r>
+            <a:r>
+              <a:rPr lang="es-ES" dirty="0">
+                <a:solidFill>
+                  <a:schemeClr val="bg1"/>
+                </a:solidFill>
+              </a:rPr>
+              <a:t>()</a:t>
+            </a:r>
+            <a:endParaRPr lang="en-US" dirty="0">
+              <a:solidFill>
+                <a:schemeClr val="bg1"/>
+              </a:solidFill>
+            </a:endParaRPr>
+          </a:p>
+        </p:txBody>
+      </p:sp>
+      <p:sp>
+        <p:nvSpPr>
+          <p:cNvPr id="8" name="Rectángulo: esquinas redondeadas 7">
+            <a:extLst>
+              <a:ext uri="{FF2B5EF4-FFF2-40B4-BE49-F238E27FC236}">
+                <a16:creationId xmlns:a16="http://schemas.microsoft.com/office/drawing/2014/main" id="{105530F4-960C-4ACB-A214-D61C2BFFAB26}"/>
+              </a:ext>
+            </a:extLst>
+          </p:cNvPr>
+          <p:cNvSpPr/>
+          <p:nvPr/>
+        </p:nvSpPr>
+        <p:spPr>
+          <a:xfrm>
+            <a:off x="696286" y="1367407"/>
+            <a:ext cx="2751589" cy="746620"/>
+          </a:xfrm>
+          <a:prstGeom prst="roundRect">
+            <a:avLst/>
+          </a:prstGeom>
+          <a:solidFill>
+            <a:schemeClr val="accent1"/>
+          </a:solidFill>
+          <a:ln>
+            <a:noFill/>
+          </a:ln>
+        </p:spPr>
+        <p:style>
+          <a:lnRef idx="2">
+            <a:schemeClr val="accent1">
+              <a:shade val="50000"/>
+            </a:schemeClr>
+          </a:lnRef>
+          <a:fillRef idx="1">
+            <a:schemeClr val="accent1"/>
+          </a:fillRef>
+          <a:effectRef idx="0">
+            <a:schemeClr val="accent1"/>
+          </a:effectRef>
+          <a:fontRef idx="minor">
+            <a:schemeClr val="lt1"/>
+          </a:fontRef>
+        </p:style>
+        <p:txBody>
+          <a:bodyPr rtlCol="0" anchor="ctr"/>
+          <a:lstStyle/>
+          <a:p>
+            <a:pPr algn="ctr"/>
+            <a:r>
+              <a:rPr lang="es-ES" dirty="0" err="1">
+                <a:solidFill>
+                  <a:schemeClr val="bg1"/>
+                </a:solidFill>
+              </a:rPr>
+              <a:t>Ts_transform</a:t>
+            </a:r>
+            <a:r>
+              <a:rPr lang="es-ES" dirty="0">
+                <a:solidFill>
+                  <a:schemeClr val="bg1"/>
+                </a:solidFill>
+              </a:rPr>
+              <a:t>()</a:t>
+            </a:r>
+            <a:endParaRPr lang="en-US" dirty="0">
+              <a:solidFill>
+                <a:schemeClr val="bg1"/>
+              </a:solidFill>
+            </a:endParaRPr>
+          </a:p>
+        </p:txBody>
+      </p:sp>
+      <p:sp>
+        <p:nvSpPr>
+          <p:cNvPr id="10" name="Flecha: doblada 9">
+            <a:extLst>
+              <a:ext uri="{FF2B5EF4-FFF2-40B4-BE49-F238E27FC236}">
+                <a16:creationId xmlns:a16="http://schemas.microsoft.com/office/drawing/2014/main" id="{7051927B-3330-4BF6-9A98-0E55F15C7EC7}"/>
+              </a:ext>
+            </a:extLst>
+          </p:cNvPr>
+          <p:cNvSpPr/>
+          <p:nvPr/>
+        </p:nvSpPr>
+        <p:spPr>
+          <a:xfrm flipH="1">
+            <a:off x="5491993" y="2957119"/>
+            <a:ext cx="850084" cy="1174457"/>
+          </a:xfrm>
+          <a:prstGeom prst="bentArrow">
+            <a:avLst/>
+          </a:prstGeom>
+          <a:gradFill>
+            <a:gsLst>
+              <a:gs pos="0">
+                <a:srgbClr val="C00000"/>
+              </a:gs>
+              <a:gs pos="100000">
+                <a:srgbClr val="001C54"/>
+              </a:gs>
+            </a:gsLst>
+            <a:lin ang="5400000" scaled="1"/>
+          </a:gradFill>
+          <a:ln>
+            <a:noFill/>
+          </a:ln>
+        </p:spPr>
+        <p:style>
+          <a:lnRef idx="2">
+            <a:schemeClr val="accent1">
+              <a:shade val="50000"/>
+            </a:schemeClr>
+          </a:lnRef>
+          <a:fillRef idx="1">
+            <a:schemeClr val="accent1"/>
+          </a:fillRef>
+          <a:effectRef idx="0">
+            <a:schemeClr val="accent1"/>
+          </a:effectRef>
+          <a:fontRef idx="minor">
+            <a:schemeClr val="lt1"/>
+          </a:fontRef>
+        </p:style>
+        <p:txBody>
+          <a:bodyPr rtlCol="0" anchor="ctr"/>
+          <a:lstStyle/>
+          <a:p>
+            <a:pPr algn="ctr"/>
+            <a:endParaRPr lang="en-US" dirty="0">
+              <a:solidFill>
+                <a:schemeClr val="tx1"/>
+              </a:solidFill>
+            </a:endParaRPr>
+          </a:p>
+        </p:txBody>
+      </p:sp>
+      <p:sp>
+        <p:nvSpPr>
+          <p:cNvPr id="11" name="Flecha: doblada 10">
+            <a:extLst>
+              <a:ext uri="{FF2B5EF4-FFF2-40B4-BE49-F238E27FC236}">
+                <a16:creationId xmlns:a16="http://schemas.microsoft.com/office/drawing/2014/main" id="{A8A02B34-9B36-4BB8-B5DF-D8236D1EA823}"/>
+              </a:ext>
+            </a:extLst>
+          </p:cNvPr>
+          <p:cNvSpPr/>
+          <p:nvPr/>
+        </p:nvSpPr>
+        <p:spPr>
+          <a:xfrm flipH="1">
+            <a:off x="3447875" y="1510020"/>
+            <a:ext cx="850084" cy="1231083"/>
+          </a:xfrm>
+          <a:prstGeom prst="bentArrow">
+            <a:avLst/>
+          </a:prstGeom>
+          <a:gradFill>
+            <a:gsLst>
+              <a:gs pos="26000">
+                <a:schemeClr val="accent6">
+                  <a:lumMod val="50000"/>
+                </a:schemeClr>
+              </a:gs>
+              <a:gs pos="100000">
+                <a:schemeClr val="tx2"/>
+              </a:gs>
+            </a:gsLst>
+            <a:lin ang="5400000" scaled="1"/>
+          </a:gradFill>
+          <a:ln>
+            <a:noFill/>
+          </a:ln>
+        </p:spPr>
+        <p:style>
+          <a:lnRef idx="2">
+            <a:schemeClr val="accent1">
+              <a:shade val="50000"/>
+            </a:schemeClr>
+          </a:lnRef>
+          <a:fillRef idx="1">
+            <a:schemeClr val="accent1"/>
+          </a:fillRef>
+          <a:effectRef idx="0">
+            <a:schemeClr val="accent1"/>
+          </a:effectRef>
+          <a:fontRef idx="minor">
+            <a:schemeClr val="lt1"/>
+          </a:fontRef>
+        </p:style>
+        <p:txBody>
+          <a:bodyPr rtlCol="0" anchor="ctr"/>
+          <a:lstStyle/>
+          <a:p>
+            <a:pPr algn="ctr"/>
+            <a:endParaRPr lang="en-US">
+              <a:solidFill>
+                <a:schemeClr val="tx1"/>
+              </a:solidFill>
+            </a:endParaRPr>
+          </a:p>
+        </p:txBody>
+      </p:sp>
+      <p:sp>
+        <p:nvSpPr>
+          <p:cNvPr id="12" name="Flecha: doblada 11">
+            <a:extLst>
+              <a:ext uri="{FF2B5EF4-FFF2-40B4-BE49-F238E27FC236}">
+                <a16:creationId xmlns:a16="http://schemas.microsoft.com/office/drawing/2014/main" id="{979102A8-2BC4-484F-9DE2-15D955CD6D24}"/>
+              </a:ext>
+            </a:extLst>
+          </p:cNvPr>
+          <p:cNvSpPr/>
+          <p:nvPr/>
+        </p:nvSpPr>
+        <p:spPr>
+          <a:xfrm flipV="1">
+            <a:off x="1412146" y="2114024"/>
+            <a:ext cx="1328258" cy="1254155"/>
+          </a:xfrm>
+          <a:prstGeom prst="bentArrow">
+            <a:avLst>
+              <a:gd name="adj1" fmla="val 15526"/>
+              <a:gd name="adj2" fmla="val 18368"/>
+              <a:gd name="adj3" fmla="val 28158"/>
+              <a:gd name="adj4" fmla="val 43750"/>
+            </a:avLst>
+          </a:prstGeom>
+          <a:gradFill>
+            <a:gsLst>
+              <a:gs pos="0">
+                <a:srgbClr val="C00000"/>
+              </a:gs>
+              <a:gs pos="80000">
+                <a:schemeClr val="accent1"/>
+              </a:gs>
+            </a:gsLst>
+            <a:lin ang="5400000" scaled="1"/>
+          </a:gradFill>
+          <a:ln>
+            <a:noFill/>
+          </a:ln>
+        </p:spPr>
+        <p:style>
+          <a:lnRef idx="2">
+            <a:schemeClr val="accent1">
+              <a:shade val="50000"/>
+            </a:schemeClr>
+          </a:lnRef>
+          <a:fillRef idx="1">
+            <a:schemeClr val="accent1"/>
+          </a:fillRef>
+          <a:effectRef idx="0">
+            <a:schemeClr val="accent1"/>
+          </a:effectRef>
+          <a:fontRef idx="minor">
+            <a:schemeClr val="lt1"/>
+          </a:fontRef>
+        </p:style>
+        <p:txBody>
+          <a:bodyPr rtlCol="0" anchor="ctr"/>
+          <a:lstStyle/>
+          <a:p>
+            <a:pPr algn="ctr"/>
+            <a:endParaRPr lang="en-US">
+              <a:solidFill>
+                <a:schemeClr val="tx1"/>
+              </a:solidFill>
+            </a:endParaRPr>
+          </a:p>
+        </p:txBody>
+      </p:sp>
+      <p:sp>
+        <p:nvSpPr>
+          <p:cNvPr id="13" name="Flecha: doblada 12">
+            <a:extLst>
+              <a:ext uri="{FF2B5EF4-FFF2-40B4-BE49-F238E27FC236}">
+                <a16:creationId xmlns:a16="http://schemas.microsoft.com/office/drawing/2014/main" id="{C5CA823C-E885-4D01-A4DA-2196A1291117}"/>
+              </a:ext>
+            </a:extLst>
+          </p:cNvPr>
+          <p:cNvSpPr/>
+          <p:nvPr/>
+        </p:nvSpPr>
+        <p:spPr>
+          <a:xfrm flipV="1">
+            <a:off x="3797416" y="3491914"/>
+            <a:ext cx="1328258" cy="1254155"/>
+          </a:xfrm>
+          <a:prstGeom prst="bentArrow">
+            <a:avLst>
+              <a:gd name="adj1" fmla="val 15526"/>
+              <a:gd name="adj2" fmla="val 18368"/>
+              <a:gd name="adj3" fmla="val 28158"/>
+              <a:gd name="adj4" fmla="val 43750"/>
+            </a:avLst>
+          </a:prstGeom>
+          <a:gradFill>
+            <a:gsLst>
+              <a:gs pos="100000">
+                <a:schemeClr val="tx2"/>
+              </a:gs>
+              <a:gs pos="8000">
+                <a:schemeClr val="tx1"/>
+              </a:gs>
+            </a:gsLst>
+            <a:lin ang="5400000" scaled="1"/>
+          </a:gradFill>
+          <a:ln>
+            <a:noFill/>
+          </a:ln>
+        </p:spPr>
+        <p:style>
+          <a:lnRef idx="2">
+            <a:schemeClr val="accent1">
+              <a:shade val="50000"/>
+            </a:schemeClr>
+          </a:lnRef>
+          <a:fillRef idx="1">
+            <a:schemeClr val="accent1"/>
+          </a:fillRef>
+          <a:effectRef idx="0">
+            <a:schemeClr val="accent1"/>
+          </a:effectRef>
+          <a:fontRef idx="minor">
+            <a:schemeClr val="lt1"/>
+          </a:fontRef>
+        </p:style>
+        <p:txBody>
+          <a:bodyPr rtlCol="0" anchor="ctr"/>
+          <a:lstStyle/>
+          <a:p>
+            <a:pPr algn="ctr"/>
+            <a:endParaRPr lang="en-US">
+              <a:solidFill>
+                <a:schemeClr val="tx1"/>
+              </a:solidFill>
+            </a:endParaRPr>
+          </a:p>
+        </p:txBody>
+      </p:sp>
+      <p:sp>
+        <p:nvSpPr>
+          <p:cNvPr id="14" name="Flecha: doblada 13">
+            <a:extLst>
+              <a:ext uri="{FF2B5EF4-FFF2-40B4-BE49-F238E27FC236}">
+                <a16:creationId xmlns:a16="http://schemas.microsoft.com/office/drawing/2014/main" id="{48085223-BEC7-421C-91FF-D6EB5CD79BBE}"/>
+              </a:ext>
+            </a:extLst>
+          </p:cNvPr>
+          <p:cNvSpPr/>
+          <p:nvPr/>
+        </p:nvSpPr>
+        <p:spPr>
+          <a:xfrm flipV="1">
+            <a:off x="5986941" y="4878192"/>
+            <a:ext cx="1702963" cy="834709"/>
+          </a:xfrm>
+          <a:prstGeom prst="bentArrow">
+            <a:avLst>
+              <a:gd name="adj1" fmla="val 15526"/>
+              <a:gd name="adj2" fmla="val 18368"/>
+              <a:gd name="adj3" fmla="val 28158"/>
+              <a:gd name="adj4" fmla="val 43750"/>
+            </a:avLst>
+          </a:prstGeom>
+          <a:gradFill>
+            <a:gsLst>
+              <a:gs pos="0">
+                <a:schemeClr val="bg1"/>
+              </a:gs>
+              <a:gs pos="80000">
+                <a:srgbClr val="001C54"/>
+              </a:gs>
+            </a:gsLst>
+            <a:lin ang="5400000" scaled="1"/>
+          </a:gradFill>
+          <a:ln>
+            <a:noFill/>
+          </a:ln>
+        </p:spPr>
+        <p:style>
+          <a:lnRef idx="2">
+            <a:schemeClr val="accent1">
+              <a:shade val="50000"/>
+            </a:schemeClr>
+          </a:lnRef>
+          <a:fillRef idx="1">
+            <a:schemeClr val="accent1"/>
+          </a:fillRef>
+          <a:effectRef idx="0">
+            <a:schemeClr val="accent1"/>
+          </a:effectRef>
+          <a:fontRef idx="minor">
+            <a:schemeClr val="lt1"/>
+          </a:fontRef>
+        </p:style>
+        <p:txBody>
+          <a:bodyPr rtlCol="0" anchor="ctr"/>
+          <a:lstStyle/>
+          <a:p>
+            <a:pPr algn="ctr"/>
+            <a:endParaRPr lang="en-US">
+              <a:solidFill>
+                <a:schemeClr val="tx1"/>
+              </a:solidFill>
+            </a:endParaRPr>
+          </a:p>
+        </p:txBody>
+      </p:sp>
+      <p:sp>
+        <p:nvSpPr>
+          <p:cNvPr id="15" name="Rectángulo: esquinas redondeadas 14">
+            <a:extLst>
+              <a:ext uri="{FF2B5EF4-FFF2-40B4-BE49-F238E27FC236}">
+                <a16:creationId xmlns:a16="http://schemas.microsoft.com/office/drawing/2014/main" id="{BE9F6FC0-56F8-449F-8C5F-049D201E28D4}"/>
+              </a:ext>
+            </a:extLst>
+          </p:cNvPr>
+          <p:cNvSpPr/>
+          <p:nvPr/>
+        </p:nvSpPr>
+        <p:spPr>
+          <a:xfrm>
+            <a:off x="7689905" y="5251503"/>
+            <a:ext cx="2399252" cy="746620"/>
+          </a:xfrm>
+          <a:prstGeom prst="roundRect">
+            <a:avLst/>
+          </a:prstGeom>
+          <a:solidFill>
+            <a:schemeClr val="bg1"/>
+          </a:solidFill>
+          <a:ln>
+            <a:solidFill>
+              <a:schemeClr val="tx1"/>
+            </a:solidFill>
+          </a:ln>
+        </p:spPr>
+        <p:style>
+          <a:lnRef idx="2">
+            <a:schemeClr val="accent1">
+              <a:shade val="50000"/>
+            </a:schemeClr>
+          </a:lnRef>
+          <a:fillRef idx="1">
+            <a:schemeClr val="accent1"/>
+          </a:fillRef>
+          <a:effectRef idx="0">
+            <a:schemeClr val="accent1"/>
+          </a:effectRef>
+          <a:fontRef idx="minor">
+            <a:schemeClr val="lt1"/>
+          </a:fontRef>
+        </p:style>
+        <p:txBody>
+          <a:bodyPr rtlCol="0" anchor="ctr"/>
+          <a:lstStyle/>
+          <a:p>
+            <a:pPr algn="ctr"/>
+            <a:r>
+              <a:rPr lang="es-ES" dirty="0" err="1">
+                <a:solidFill>
+                  <a:srgbClr val="001C54"/>
+                </a:solidFill>
+              </a:rPr>
+              <a:t>Validation_Results</a:t>
+            </a:r>
+            <a:endParaRPr lang="en-US" dirty="0">
+              <a:solidFill>
+                <a:srgbClr val="001C54"/>
+              </a:solidFill>
+            </a:endParaRPr>
+          </a:p>
+        </p:txBody>
+      </p:sp>
+      <p:sp>
+        <p:nvSpPr>
+          <p:cNvPr id="16" name="Rectángulo: esquinas redondeadas 15">
+            <a:extLst>
+              <a:ext uri="{FF2B5EF4-FFF2-40B4-BE49-F238E27FC236}">
+                <a16:creationId xmlns:a16="http://schemas.microsoft.com/office/drawing/2014/main" id="{AFB84819-8798-427C-91FE-7EAA8F4B58CF}"/>
+              </a:ext>
+            </a:extLst>
+          </p:cNvPr>
+          <p:cNvSpPr/>
+          <p:nvPr/>
+        </p:nvSpPr>
+        <p:spPr>
+          <a:xfrm>
+            <a:off x="18347" y="4718806"/>
+            <a:ext cx="4580389" cy="1904905"/>
+          </a:xfrm>
+          <a:prstGeom prst="roundRect">
+            <a:avLst/>
+          </a:prstGeom>
+          <a:solidFill>
+            <a:schemeClr val="bg1"/>
+          </a:solidFill>
+          <a:ln>
+            <a:noFill/>
+          </a:ln>
+        </p:spPr>
+        <p:style>
+          <a:lnRef idx="2">
+            <a:schemeClr val="accent1">
+              <a:shade val="50000"/>
+            </a:schemeClr>
+          </a:lnRef>
+          <a:fillRef idx="1">
+            <a:schemeClr val="accent1"/>
+          </a:fillRef>
+          <a:effectRef idx="0">
+            <a:schemeClr val="accent1"/>
+          </a:effectRef>
+          <a:fontRef idx="minor">
+            <a:schemeClr val="lt1"/>
+          </a:fontRef>
+        </p:style>
+        <p:txBody>
+          <a:bodyPr rtlCol="0" anchor="ctr"/>
+          <a:lstStyle/>
+          <a:p>
+            <a:pPr algn="ctr"/>
+            <a:endParaRPr lang="es-ES" sz="1600" dirty="0">
+              <a:solidFill>
+                <a:srgbClr val="001C54"/>
+              </a:solidFill>
+            </a:endParaRPr>
+          </a:p>
+          <a:p>
+            <a:pPr algn="ctr"/>
+            <a:r>
+              <a:rPr lang="es-ES" sz="1600" dirty="0">
+                <a:solidFill>
+                  <a:srgbClr val="001C54"/>
+                </a:solidFill>
+              </a:rPr>
+              <a:t>Para esto es necesario que la transformación de las variables, el modelado y la validación sean “controladas” desde el mismo punto y que den resultados tanto numéricos como visuales para entender si la serie ha sido modelada correctamente</a:t>
+            </a:r>
+            <a:endParaRPr lang="en-US" sz="1600" dirty="0">
+              <a:solidFill>
+                <a:srgbClr val="001C54"/>
+              </a:solidFill>
+            </a:endParaRPr>
+          </a:p>
+        </p:txBody>
+      </p:sp>
+      <p:sp>
+        <p:nvSpPr>
+          <p:cNvPr id="18" name="CuadroTexto 17">
+            <a:extLst>
+              <a:ext uri="{FF2B5EF4-FFF2-40B4-BE49-F238E27FC236}">
+                <a16:creationId xmlns:a16="http://schemas.microsoft.com/office/drawing/2014/main" id="{519AB228-E217-4BE6-9AC6-70518A354EF2}"/>
+              </a:ext>
+            </a:extLst>
+          </p:cNvPr>
+          <p:cNvSpPr txBox="1"/>
+          <p:nvPr/>
+        </p:nvSpPr>
+        <p:spPr>
+          <a:xfrm>
+            <a:off x="5729681" y="1566099"/>
+            <a:ext cx="6153538" cy="646331"/>
+          </a:xfrm>
+          <a:prstGeom prst="rect">
+            <a:avLst/>
+          </a:prstGeom>
+          <a:noFill/>
+        </p:spPr>
+        <p:txBody>
+          <a:bodyPr wrap="square">
+            <a:spAutoFit/>
+          </a:bodyPr>
+          <a:lstStyle/>
+          <a:p>
+            <a:pPr algn="ctr"/>
+            <a:r>
+              <a:rPr lang="es-ES" sz="1800" dirty="0">
+                <a:solidFill>
+                  <a:srgbClr val="001C54"/>
+                </a:solidFill>
+              </a:rPr>
+              <a:t>La estructura del código debe permitir iterar de manera flexible y rápida sobre múltiples parámetros. </a:t>
+            </a:r>
+          </a:p>
+        </p:txBody>
+      </p:sp>
+    </p:spTree>
+    <p:extLst>
+      <p:ext uri="{BB962C8B-B14F-4D97-AF65-F5344CB8AC3E}">
+        <p14:creationId xmlns:p14="http://schemas.microsoft.com/office/powerpoint/2010/main" val="1784842650"/>
+      </p:ext>
+    </p:extLst>
+  </p:cSld>
+  <p:clrMapOvr>
+    <a:masterClrMapping/>
+  </p:clrMapOvr>
+  <p:timing>
+    <p:tnLst>
+      <p:par>
+        <p:cTn id="1" dur="indefinite" restart="never" nodeType="tmRoot">
+          <p:childTnLst>
+            <p:seq concurrent="1" nextAc="seek">
+              <p:cTn id="2" dur="indefinite" nodeType="mainSeq">
+                <p:childTnLst>
+                  <p:par>
+                    <p:cTn id="3" fill="hold">
+                      <p:stCondLst>
+                        <p:cond delay="indefinite"/>
+                      </p:stCondLst>
+                      <p:childTnLst>
+                        <p:par>
+                          <p:cTn id="4" fill="hold">
+                            <p:stCondLst>
+                              <p:cond delay="0"/>
+                            </p:stCondLst>
+                            <p:childTnLst>
+                              <p:par>
+                                <p:cTn id="5" presetID="1" presetClass="entr" presetSubtype="0" fill="hold" grpId="0" nodeType="clickEffect">
+                                  <p:stCondLst>
+                                    <p:cond delay="0"/>
+                                  </p:stCondLst>
+                                  <p:childTnLst>
+                                    <p:set>
+                                      <p:cBhvr>
+                                        <p:cTn id="6" dur="1" fill="hold">
+                                          <p:stCondLst>
+                                            <p:cond delay="0"/>
+                                          </p:stCondLst>
+                                        </p:cTn>
+                                        <p:tgtEl>
+                                          <p:spTgt spid="16"/>
+                                        </p:tgtEl>
+                                        <p:attrNameLst>
+                                          <p:attrName>style.visibility</p:attrName>
+                                        </p:attrNameLst>
+                                      </p:cBhvr>
+                                      <p:to>
+                                        <p:strVal val="visible"/>
+                                      </p:to>
+                                    </p:set>
+                                  </p:childTnLst>
+                                </p:cTn>
+                              </p:par>
+                            </p:childTnLst>
+                          </p:cTn>
+                        </p:par>
+                      </p:childTnLst>
+                    </p:cTn>
+                  </p:par>
+                </p:childTnLst>
+              </p:cTn>
+              <p:prevCondLst>
+                <p:cond evt="onPrev" delay="0">
+                  <p:tgtEl>
+                    <p:sldTgt/>
+                  </p:tgtEl>
+                </p:cond>
+              </p:prevCondLst>
+              <p:nextCondLst>
+                <p:cond evt="onNext" delay="0">
+                  <p:tgtEl>
+                    <p:sldTgt/>
+                  </p:tgtEl>
+                </p:cond>
+              </p:nextCondLst>
+            </p:seq>
+          </p:childTnLst>
+        </p:cTn>
+      </p:par>
+    </p:tnLst>
+    <p:bldLst>
+      <p:bldP spid="16" grpId="0" animBg="1"/>
+    </p:bldLst>
+  </p:timing>
+</p:sld>
+</file>
+
+<file path=ppt/slides/slide26.xml><?xml version="1.0" encoding="utf-8"?>
+<p:sld xmlns:a="http://schemas.openxmlformats.org/drawingml/2006/main" xmlns:r="http://schemas.openxmlformats.org/officeDocument/2006/relationships" xmlns:p="http://schemas.openxmlformats.org/presentationml/2006/main">
+  <p:cSld>
+    <p:spTree>
+      <p:nvGrpSpPr>
+        <p:cNvPr id="1" name=""/>
+        <p:cNvGrpSpPr/>
+        <p:nvPr/>
+      </p:nvGrpSpPr>
+      <p:grpSpPr>
+        <a:xfrm>
+          <a:off x="0" y="0"/>
+          <a:ext cx="0" cy="0"/>
+          <a:chOff x="0" y="0"/>
+          <a:chExt cx="0" cy="0"/>
+        </a:xfrm>
+      </p:grpSpPr>
+      <p:sp>
+        <p:nvSpPr>
+          <p:cNvPr id="4" name="CuadroTexto 3">
+            <a:extLst>
+              <a:ext uri="{FF2B5EF4-FFF2-40B4-BE49-F238E27FC236}">
                 <a16:creationId xmlns:a16="http://schemas.microsoft.com/office/drawing/2014/main" id="{E9C6E1A9-B79E-4CCE-AF4A-B1AE56534C4B}"/>
               </a:ext>
             </a:extLst>
@@ -19914,34 +21045,9 @@
               <a:buChar char="Ø"/>
             </a:pPr>
             <a:r>
-              <a:rPr lang="en-US" sz="2400" dirty="0" err="1"/>
-              <a:t>Crear</a:t>
-            </a:r>
-            <a:r>
-              <a:rPr lang="en-US" sz="2400" dirty="0"/>
-              <a:t> una </a:t>
-            </a:r>
-            <a:r>
-              <a:rPr lang="en-US" sz="2400" dirty="0" err="1"/>
-              <a:t>función</a:t>
-            </a:r>
-            <a:r>
-              <a:rPr lang="en-US" sz="2400" dirty="0"/>
-              <a:t> que </a:t>
-            </a:r>
-            <a:r>
-              <a:rPr lang="en-US" sz="2400" dirty="0" err="1"/>
-              <a:t>analice</a:t>
-            </a:r>
-            <a:r>
-              <a:rPr lang="en-US" sz="2400" dirty="0"/>
-              <a:t> las series </a:t>
-            </a:r>
-            <a:r>
-              <a:rPr lang="en-US" sz="2400" dirty="0" err="1"/>
-              <a:t>temporales</a:t>
-            </a:r>
-            <a:endParaRPr lang="en-US" sz="2400" dirty="0"/>
+              <a:rPr lang="es-ES" sz="2400" dirty="0"/>
+              <a:t>Crear una función que analice las series temporales</a:t>
+            </a:r>
           </a:p>
           <a:p>
             <a:pPr marL="742950" lvl="1" indent="-285750">
@@ -19949,42 +21055,14 @@
               <a:buChar char="Ø"/>
             </a:pPr>
             <a:r>
-              <a:rPr lang="en-US" sz="2400" dirty="0" err="1"/>
-              <a:t>Analizar</a:t>
-            </a:r>
-            <a:r>
-              <a:rPr lang="en-US" sz="2400" dirty="0"/>
-              <a:t> </a:t>
-            </a:r>
-            <a:r>
-              <a:rPr lang="en-US" sz="2400" dirty="0" err="1"/>
-              <a:t>vuestra</a:t>
-            </a:r>
-            <a:r>
-              <a:rPr lang="en-US" sz="2400" dirty="0"/>
-              <a:t> variable </a:t>
-            </a:r>
-            <a:r>
-              <a:rPr lang="en-US" sz="2400" dirty="0" err="1"/>
-              <a:t>dependiente</a:t>
-            </a:r>
-            <a:r>
-              <a:rPr lang="en-US" sz="2400" dirty="0"/>
-              <a:t> y </a:t>
-            </a:r>
-            <a:r>
-              <a:rPr lang="en-US" sz="2400" dirty="0" err="1"/>
-              <a:t>posibles</a:t>
-            </a:r>
-            <a:r>
-              <a:rPr lang="en-US" sz="2400" dirty="0"/>
-              <a:t> </a:t>
-            </a:r>
-            <a:r>
-              <a:rPr lang="en-US" sz="2400" dirty="0" err="1"/>
+              <a:rPr lang="es-ES" sz="2400" dirty="0"/>
+              <a:t>Analizar vuestra variable dependiente y posibles </a:t>
+            </a:r>
+            <a:r>
+              <a:rPr lang="es-ES" sz="2400" dirty="0" err="1"/>
               <a:t>regresoras</a:t>
             </a:r>
-            <a:endParaRPr lang="en-US" sz="2400" dirty="0"/>
+            <a:endParaRPr lang="es-ES" sz="2400" dirty="0"/>
           </a:p>
           <a:p>
             <a:pPr marL="742950" lvl="1" indent="-285750">
@@ -19992,36 +21070,16 @@
               <a:buChar char="Ø"/>
             </a:pPr>
             <a:r>
-              <a:rPr lang="en-US" sz="2400" dirty="0" err="1"/>
-              <a:t>Crear</a:t>
-            </a:r>
-            <a:r>
-              <a:rPr lang="en-US" sz="2400" dirty="0"/>
-              <a:t> una </a:t>
-            </a:r>
-            <a:r>
-              <a:rPr lang="en-US" sz="2400" dirty="0" err="1"/>
-              <a:t>función</a:t>
-            </a:r>
-            <a:r>
-              <a:rPr lang="en-US" sz="2400" dirty="0"/>
-              <a:t> </a:t>
-            </a:r>
-            <a:r>
-              <a:rPr lang="en-US" sz="2400" dirty="0" err="1"/>
+              <a:rPr lang="es-ES" sz="2400" dirty="0"/>
+              <a:t>Crear una función </a:t>
+            </a:r>
+            <a:r>
+              <a:rPr lang="es-ES" sz="2400" dirty="0" err="1"/>
               <a:t>Walkforward</a:t>
             </a:r>
             <a:r>
-              <a:rPr lang="en-US" sz="2400" dirty="0"/>
-              <a:t> para </a:t>
-            </a:r>
-            <a:r>
-              <a:rPr lang="en-US" sz="2400" dirty="0" err="1"/>
-              <a:t>medir</a:t>
-            </a:r>
-            <a:r>
-              <a:rPr lang="en-US" sz="2400" dirty="0"/>
-              <a:t> </a:t>
+              <a:rPr lang="es-ES" sz="2400" dirty="0"/>
+              <a:t> para medir </a:t>
             </a:r>
           </a:p>
           <a:p>
@@ -20030,20 +21088,16 @@
               <a:buChar char="Ø"/>
             </a:pPr>
             <a:r>
-              <a:rPr lang="en-US" sz="2400" dirty="0" err="1"/>
-              <a:t>Crear</a:t>
-            </a:r>
-            <a:r>
-              <a:rPr lang="en-US" sz="2400" dirty="0"/>
-              <a:t> un </a:t>
-            </a:r>
-            <a:r>
-              <a:rPr lang="en-US" sz="2400" dirty="0" err="1"/>
-              <a:t>modelo</a:t>
-            </a:r>
-            <a:r>
-              <a:rPr lang="en-US" sz="2400" dirty="0"/>
-              <a:t> baseline ARIMA</a:t>
+              <a:rPr lang="es-ES" sz="2400" dirty="0"/>
+              <a:t>Crear un modelo </a:t>
+            </a:r>
+            <a:r>
+              <a:rPr lang="es-ES" sz="2400" dirty="0" err="1"/>
+              <a:t>baseline</a:t>
+            </a:r>
+            <a:r>
+              <a:rPr lang="es-ES" sz="2400" dirty="0"/>
+              <a:t> ARIMA</a:t>
             </a:r>
           </a:p>
           <a:p>
@@ -20052,13 +21106,13 @@
               <a:buChar char="Ø"/>
             </a:pPr>
             <a:r>
-              <a:rPr lang="en-US" sz="2400" dirty="0"/>
+              <a:rPr lang="es-ES" sz="2400" dirty="0"/>
               <a:t>Git!</a:t>
             </a:r>
           </a:p>
           <a:p>
             <a:pPr lvl="1"/>
-            <a:endParaRPr lang="en-US" sz="2400" dirty="0"/>
+            <a:endParaRPr lang="es-ES" sz="2400" dirty="0"/>
           </a:p>
         </p:txBody>
       </p:sp>
@@ -20075,7 +21129,7 @@
 </p:sld>
 </file>
 
-<file path=ppt/slides/slide26.xml><?xml version="1.0" encoding="utf-8"?>
+<file path=ppt/slides/slide27.xml><?xml version="1.0" encoding="utf-8"?>
 <p:sld xmlns:a="http://schemas.openxmlformats.org/drawingml/2006/main" xmlns:r="http://schemas.openxmlformats.org/officeDocument/2006/relationships" xmlns:p="http://schemas.openxmlformats.org/presentationml/2006/main">
   <p:cSld>
     <p:spTree>
@@ -22167,8 +23221,8 @@
         </p:nvSpPr>
         <p:spPr>
           <a:xfrm>
-            <a:off x="6095999" y="4086275"/>
-            <a:ext cx="5837853" cy="864064"/>
+            <a:off x="5788405" y="4086275"/>
+            <a:ext cx="6145448" cy="864064"/>
           </a:xfrm>
           <a:prstGeom prst="roundRect">
             <a:avLst/>
@@ -22207,7 +23261,7 @@
                   <a:srgbClr val="C00000"/>
                 </a:solidFill>
               </a:rPr>
-              <a:t>La Autocorrelación nos ayudará a encontrar los distintos componentes del modelo ARIMA</a:t>
+              <a:t>La Autocorrelación nos ayudará a encontrar los distintos componentes del modelo ARIMA (AR y MA)</a:t>
             </a:r>
             <a:endParaRPr lang="en-US" dirty="0">
               <a:solidFill>
@@ -22448,14 +23502,14 @@
           <a:p>
             <a:pPr algn="ctr"/>
             <a:r>
-              <a:rPr lang="es-ES" dirty="0">
+              <a:rPr lang="es-ES" sz="2000" dirty="0">
                 <a:solidFill>
                   <a:schemeClr val="tx1"/>
                 </a:solidFill>
               </a:rPr>
               <a:t>Autocorrelación</a:t>
             </a:r>
-            <a:endParaRPr lang="en-US" dirty="0">
+            <a:endParaRPr lang="en-US" sz="2000" dirty="0">
               <a:solidFill>
                 <a:schemeClr val="tx1"/>
               </a:solidFill>

</xml_diff>

<commit_message>
Se hace la estructura del modelado
</commit_message>
<xml_diff>
--- a/03_BASIC_MODELLING/03_BASIC_MODELLING.pptx
+++ b/03_BASIC_MODELLING/03_BASIC_MODELLING.pptx
@@ -261,7 +261,7 @@
           <a:p>
             <a:fld id="{6118F894-A91F-4842-BD9A-7582ADBE2C27}" type="datetimeFigureOut">
               <a:rPr lang="en-US" smtClean="0"/>
-              <a:t>4/15/2021</a:t>
+              <a:t>4/18/2021</a:t>
             </a:fld>
             <a:endParaRPr lang="en-US" dirty="0"/>
           </a:p>
@@ -678,7 +678,7 @@
           <a:p>
             <a:fld id="{15119D3F-0F06-48B5-A311-F7380CC22BDC}" type="datetimeFigureOut">
               <a:rPr lang="en-US" smtClean="0"/>
-              <a:t>4/15/2021</a:t>
+              <a:t>4/18/2021</a:t>
             </a:fld>
             <a:endParaRPr lang="en-US" dirty="0"/>
           </a:p>
@@ -878,7 +878,7 @@
           <a:p>
             <a:fld id="{15119D3F-0F06-48B5-A311-F7380CC22BDC}" type="datetimeFigureOut">
               <a:rPr lang="en-US" smtClean="0"/>
-              <a:t>4/15/2021</a:t>
+              <a:t>4/18/2021</a:t>
             </a:fld>
             <a:endParaRPr lang="en-US" dirty="0"/>
           </a:p>
@@ -1088,7 +1088,7 @@
           <a:p>
             <a:fld id="{15119D3F-0F06-48B5-A311-F7380CC22BDC}" type="datetimeFigureOut">
               <a:rPr lang="en-US" smtClean="0"/>
-              <a:t>4/15/2021</a:t>
+              <a:t>4/18/2021</a:t>
             </a:fld>
             <a:endParaRPr lang="en-US" dirty="0"/>
           </a:p>
@@ -1288,7 +1288,7 @@
           <a:p>
             <a:fld id="{15119D3F-0F06-48B5-A311-F7380CC22BDC}" type="datetimeFigureOut">
               <a:rPr lang="en-US" smtClean="0"/>
-              <a:t>4/15/2021</a:t>
+              <a:t>4/18/2021</a:t>
             </a:fld>
             <a:endParaRPr lang="en-US" dirty="0"/>
           </a:p>
@@ -1564,7 +1564,7 @@
           <a:p>
             <a:fld id="{15119D3F-0F06-48B5-A311-F7380CC22BDC}" type="datetimeFigureOut">
               <a:rPr lang="en-US" smtClean="0"/>
-              <a:t>4/15/2021</a:t>
+              <a:t>4/18/2021</a:t>
             </a:fld>
             <a:endParaRPr lang="en-US" dirty="0"/>
           </a:p>
@@ -1832,7 +1832,7 @@
           <a:p>
             <a:fld id="{15119D3F-0F06-48B5-A311-F7380CC22BDC}" type="datetimeFigureOut">
               <a:rPr lang="en-US" smtClean="0"/>
-              <a:t>4/15/2021</a:t>
+              <a:t>4/18/2021</a:t>
             </a:fld>
             <a:endParaRPr lang="en-US" dirty="0"/>
           </a:p>
@@ -2247,7 +2247,7 @@
           <a:p>
             <a:fld id="{15119D3F-0F06-48B5-A311-F7380CC22BDC}" type="datetimeFigureOut">
               <a:rPr lang="en-US" smtClean="0"/>
-              <a:t>4/15/2021</a:t>
+              <a:t>4/18/2021</a:t>
             </a:fld>
             <a:endParaRPr lang="en-US" dirty="0"/>
           </a:p>
@@ -2389,7 +2389,7 @@
           <a:p>
             <a:fld id="{15119D3F-0F06-48B5-A311-F7380CC22BDC}" type="datetimeFigureOut">
               <a:rPr lang="en-US" smtClean="0"/>
-              <a:t>4/15/2021</a:t>
+              <a:t>4/18/2021</a:t>
             </a:fld>
             <a:endParaRPr lang="en-US" dirty="0"/>
           </a:p>
@@ -2502,7 +2502,7 @@
           <a:p>
             <a:fld id="{15119D3F-0F06-48B5-A311-F7380CC22BDC}" type="datetimeFigureOut">
               <a:rPr lang="en-US" smtClean="0"/>
-              <a:t>4/15/2021</a:t>
+              <a:t>4/18/2021</a:t>
             </a:fld>
             <a:endParaRPr lang="en-US" dirty="0"/>
           </a:p>
@@ -2916,7 +2916,7 @@
           <a:p>
             <a:fld id="{15119D3F-0F06-48B5-A311-F7380CC22BDC}" type="datetimeFigureOut">
               <a:rPr lang="en-US" smtClean="0"/>
-              <a:t>4/15/2021</a:t>
+              <a:t>4/18/2021</a:t>
             </a:fld>
             <a:endParaRPr lang="en-US" dirty="0"/>
           </a:p>
@@ -3205,7 +3205,7 @@
           <a:p>
             <a:fld id="{15119D3F-0F06-48B5-A311-F7380CC22BDC}" type="datetimeFigureOut">
               <a:rPr lang="en-US" smtClean="0"/>
-              <a:t>4/15/2021</a:t>
+              <a:t>4/18/2021</a:t>
             </a:fld>
             <a:endParaRPr lang="en-US" dirty="0"/>
           </a:p>
@@ -3450,7 +3450,7 @@
             <a:fld id="{15119D3F-0F06-48B5-A311-F7380CC22BDC}" type="datetimeFigureOut">
               <a:rPr lang="en-US" smtClean="0"/>
               <a:pPr/>
-              <a:t>4/15/2021</a:t>
+              <a:t>4/18/2021</a:t>
             </a:fld>
             <a:endParaRPr lang="en-US" dirty="0"/>
           </a:p>

</xml_diff>

<commit_message>
se avanza con las técnicas de modelado tradicional y LSTM
</commit_message>
<xml_diff>
--- a/03_BASIC_MODELLING/03_BASIC_MODELLING.pptx
+++ b/03_BASIC_MODELLING/03_BASIC_MODELLING.pptx
@@ -5,7 +5,7 @@
     <p:sldMasterId id="2147483648" r:id="rId1"/>
   </p:sldMasterIdLst>
   <p:notesMasterIdLst>
-    <p:notesMasterId r:id="rId29"/>
+    <p:notesMasterId r:id="rId30"/>
   </p:notesMasterIdLst>
   <p:sldIdLst>
     <p:sldId id="256" r:id="rId2"/>
@@ -29,12 +29,13 @@
     <p:sldId id="569" r:id="rId20"/>
     <p:sldId id="568" r:id="rId21"/>
     <p:sldId id="553" r:id="rId22"/>
-    <p:sldId id="565" r:id="rId23"/>
-    <p:sldId id="563" r:id="rId24"/>
-    <p:sldId id="580" r:id="rId25"/>
-    <p:sldId id="581" r:id="rId26"/>
-    <p:sldId id="564" r:id="rId27"/>
-    <p:sldId id="538" r:id="rId28"/>
+    <p:sldId id="582" r:id="rId23"/>
+    <p:sldId id="565" r:id="rId24"/>
+    <p:sldId id="563" r:id="rId25"/>
+    <p:sldId id="580" r:id="rId26"/>
+    <p:sldId id="581" r:id="rId27"/>
+    <p:sldId id="564" r:id="rId28"/>
+    <p:sldId id="538" r:id="rId29"/>
   </p:sldIdLst>
   <p:sldSz cx="12192000" cy="6858000"/>
   <p:notesSz cx="6858000" cy="9144000"/>
@@ -159,6 +160,7 @@
             <p14:sldId id="569"/>
             <p14:sldId id="568"/>
             <p14:sldId id="553"/>
+            <p14:sldId id="582"/>
             <p14:sldId id="565"/>
             <p14:sldId id="563"/>
             <p14:sldId id="580"/>
@@ -261,7 +263,7 @@
           <a:p>
             <a:fld id="{6118F894-A91F-4842-BD9A-7582ADBE2C27}" type="datetimeFigureOut">
               <a:rPr lang="en-US" smtClean="0"/>
-              <a:t>4/18/2021</a:t>
+              <a:t>4/25/2021</a:t>
             </a:fld>
             <a:endParaRPr lang="en-US" dirty="0"/>
           </a:p>
@@ -678,7 +680,7 @@
           <a:p>
             <a:fld id="{15119D3F-0F06-48B5-A311-F7380CC22BDC}" type="datetimeFigureOut">
               <a:rPr lang="en-US" smtClean="0"/>
-              <a:t>4/18/2021</a:t>
+              <a:t>4/25/2021</a:t>
             </a:fld>
             <a:endParaRPr lang="en-US" dirty="0"/>
           </a:p>
@@ -878,7 +880,7 @@
           <a:p>
             <a:fld id="{15119D3F-0F06-48B5-A311-F7380CC22BDC}" type="datetimeFigureOut">
               <a:rPr lang="en-US" smtClean="0"/>
-              <a:t>4/18/2021</a:t>
+              <a:t>4/25/2021</a:t>
             </a:fld>
             <a:endParaRPr lang="en-US" dirty="0"/>
           </a:p>
@@ -1088,7 +1090,7 @@
           <a:p>
             <a:fld id="{15119D3F-0F06-48B5-A311-F7380CC22BDC}" type="datetimeFigureOut">
               <a:rPr lang="en-US" smtClean="0"/>
-              <a:t>4/18/2021</a:t>
+              <a:t>4/25/2021</a:t>
             </a:fld>
             <a:endParaRPr lang="en-US" dirty="0"/>
           </a:p>
@@ -1288,7 +1290,7 @@
           <a:p>
             <a:fld id="{15119D3F-0F06-48B5-A311-F7380CC22BDC}" type="datetimeFigureOut">
               <a:rPr lang="en-US" smtClean="0"/>
-              <a:t>4/18/2021</a:t>
+              <a:t>4/25/2021</a:t>
             </a:fld>
             <a:endParaRPr lang="en-US" dirty="0"/>
           </a:p>
@@ -1564,7 +1566,7 @@
           <a:p>
             <a:fld id="{15119D3F-0F06-48B5-A311-F7380CC22BDC}" type="datetimeFigureOut">
               <a:rPr lang="en-US" smtClean="0"/>
-              <a:t>4/18/2021</a:t>
+              <a:t>4/25/2021</a:t>
             </a:fld>
             <a:endParaRPr lang="en-US" dirty="0"/>
           </a:p>
@@ -1832,7 +1834,7 @@
           <a:p>
             <a:fld id="{15119D3F-0F06-48B5-A311-F7380CC22BDC}" type="datetimeFigureOut">
               <a:rPr lang="en-US" smtClean="0"/>
-              <a:t>4/18/2021</a:t>
+              <a:t>4/25/2021</a:t>
             </a:fld>
             <a:endParaRPr lang="en-US" dirty="0"/>
           </a:p>
@@ -2247,7 +2249,7 @@
           <a:p>
             <a:fld id="{15119D3F-0F06-48B5-A311-F7380CC22BDC}" type="datetimeFigureOut">
               <a:rPr lang="en-US" smtClean="0"/>
-              <a:t>4/18/2021</a:t>
+              <a:t>4/25/2021</a:t>
             </a:fld>
             <a:endParaRPr lang="en-US" dirty="0"/>
           </a:p>
@@ -2389,7 +2391,7 @@
           <a:p>
             <a:fld id="{15119D3F-0F06-48B5-A311-F7380CC22BDC}" type="datetimeFigureOut">
               <a:rPr lang="en-US" smtClean="0"/>
-              <a:t>4/18/2021</a:t>
+              <a:t>4/25/2021</a:t>
             </a:fld>
             <a:endParaRPr lang="en-US" dirty="0"/>
           </a:p>
@@ -2502,7 +2504,7 @@
           <a:p>
             <a:fld id="{15119D3F-0F06-48B5-A311-F7380CC22BDC}" type="datetimeFigureOut">
               <a:rPr lang="en-US" smtClean="0"/>
-              <a:t>4/18/2021</a:t>
+              <a:t>4/25/2021</a:t>
             </a:fld>
             <a:endParaRPr lang="en-US" dirty="0"/>
           </a:p>
@@ -2916,7 +2918,7 @@
           <a:p>
             <a:fld id="{15119D3F-0F06-48B5-A311-F7380CC22BDC}" type="datetimeFigureOut">
               <a:rPr lang="en-US" smtClean="0"/>
-              <a:t>4/18/2021</a:t>
+              <a:t>4/25/2021</a:t>
             </a:fld>
             <a:endParaRPr lang="en-US" dirty="0"/>
           </a:p>
@@ -3205,7 +3207,7 @@
           <a:p>
             <a:fld id="{15119D3F-0F06-48B5-A311-F7380CC22BDC}" type="datetimeFigureOut">
               <a:rPr lang="en-US" smtClean="0"/>
-              <a:t>4/18/2021</a:t>
+              <a:t>4/25/2021</a:t>
             </a:fld>
             <a:endParaRPr lang="en-US" dirty="0"/>
           </a:p>
@@ -3450,7 +3452,7 @@
             <a:fld id="{15119D3F-0F06-48B5-A311-F7380CC22BDC}" type="datetimeFigureOut">
               <a:rPr lang="en-US" smtClean="0"/>
               <a:pPr/>
-              <a:t>4/18/2021</a:t>
+              <a:t>4/25/2021</a:t>
             </a:fld>
             <a:endParaRPr lang="en-US" dirty="0"/>
           </a:p>
@@ -14130,6 +14132,431 @@
         </p:nvSpPr>
         <p:spPr>
           <a:xfrm>
+            <a:off x="596160" y="3420768"/>
+            <a:ext cx="2914920" cy="464040"/>
+          </a:xfrm>
+          <a:prstGeom prst="rect">
+            <a:avLst/>
+          </a:prstGeom>
+          <a:noFill/>
+          <a:ln>
+            <a:noFill/>
+          </a:ln>
+        </p:spPr>
+        <p:style>
+          <a:lnRef idx="0">
+            <a:scrgbClr r="0" g="0" b="0"/>
+          </a:lnRef>
+          <a:fillRef idx="0">
+            <a:scrgbClr r="0" g="0" b="0"/>
+          </a:fillRef>
+          <a:effectRef idx="0">
+            <a:scrgbClr r="0" g="0" b="0"/>
+          </a:effectRef>
+          <a:fontRef idx="minor"/>
+        </p:style>
+        <p:txBody>
+          <a:bodyPr lIns="122040" tIns="60840" rIns="122040" bIns="60840"/>
+          <a:lstStyle/>
+          <a:p>
+            <a:pPr>
+              <a:lnSpc>
+                <a:spcPct val="100000"/>
+              </a:lnSpc>
+            </a:pPr>
+            <a:r>
+              <a:rPr lang="en-US" sz="1800" b="0" strike="noStrike" spc="-1" dirty="0" err="1">
+                <a:solidFill>
+                  <a:srgbClr val="000000"/>
+                </a:solidFill>
+                <a:uFill>
+                  <a:solidFill>
+                    <a:srgbClr val="FFFFFF"/>
+                  </a:solidFill>
+                </a:uFill>
+                <a:ea typeface="DejaVu Sans"/>
+              </a:rPr>
+              <a:t>Walkforward</a:t>
+            </a:r>
+            <a:r>
+              <a:rPr lang="en-US" sz="1800" b="0" strike="noStrike" spc="-1" dirty="0">
+                <a:solidFill>
+                  <a:srgbClr val="000000"/>
+                </a:solidFill>
+                <a:uFill>
+                  <a:solidFill>
+                    <a:srgbClr val="FFFFFF"/>
+                  </a:solidFill>
+                </a:uFill>
+                <a:ea typeface="DejaVu Sans"/>
+              </a:rPr>
+              <a:t> Validation</a:t>
+            </a:r>
+            <a:endParaRPr lang="en-US" sz="1800" b="0" strike="noStrike" spc="-1" dirty="0">
+              <a:solidFill>
+                <a:srgbClr val="000000"/>
+              </a:solidFill>
+              <a:uFill>
+                <a:solidFill>
+                  <a:srgbClr val="FFFFFF"/>
+                </a:solidFill>
+              </a:uFill>
+            </a:endParaRPr>
+          </a:p>
+        </p:txBody>
+      </p:sp>
+      <p:sp>
+        <p:nvSpPr>
+          <p:cNvPr id="15" name="CustomShape 10">
+            <a:extLst>
+              <a:ext uri="{FF2B5EF4-FFF2-40B4-BE49-F238E27FC236}">
+                <a16:creationId xmlns:a16="http://schemas.microsoft.com/office/drawing/2014/main" id="{18ED0F88-13C8-48CD-89F4-DB30B474205F}"/>
+              </a:ext>
+            </a:extLst>
+          </p:cNvPr>
+          <p:cNvSpPr/>
+          <p:nvPr/>
+        </p:nvSpPr>
+        <p:spPr>
+          <a:xfrm>
+            <a:off x="363600" y="4028088"/>
+            <a:ext cx="3315240" cy="1155960"/>
+          </a:xfrm>
+          <a:prstGeom prst="rect">
+            <a:avLst/>
+          </a:prstGeom>
+          <a:solidFill>
+            <a:srgbClr val="FFFFFF">
+              <a:alpha val="56000"/>
+            </a:srgbClr>
+          </a:solidFill>
+          <a:ln>
+            <a:noFill/>
+          </a:ln>
+        </p:spPr>
+        <p:style>
+          <a:lnRef idx="0">
+            <a:scrgbClr r="0" g="0" b="0"/>
+          </a:lnRef>
+          <a:fillRef idx="0">
+            <a:scrgbClr r="0" g="0" b="0"/>
+          </a:fillRef>
+          <a:effectRef idx="0">
+            <a:scrgbClr r="0" g="0" b="0"/>
+          </a:effectRef>
+          <a:fontRef idx="minor"/>
+        </p:style>
+        <p:txBody>
+          <a:bodyPr lIns="90000" tIns="45000" rIns="90000" bIns="45000"/>
+          <a:lstStyle/>
+          <a:p>
+            <a:pPr>
+              <a:lnSpc>
+                <a:spcPct val="100000"/>
+              </a:lnSpc>
+            </a:pPr>
+            <a:r>
+              <a:rPr lang="es-ES" sz="1400" spc="-1" dirty="0">
+                <a:solidFill>
+                  <a:srgbClr val="000000"/>
+                </a:solidFill>
+                <a:uFill>
+                  <a:solidFill>
+                    <a:srgbClr val="FFFFFF"/>
+                  </a:solidFill>
+                </a:uFill>
+              </a:rPr>
+              <a:t>La validación </a:t>
+            </a:r>
+            <a:r>
+              <a:rPr lang="es-ES" sz="1400" spc="-1" dirty="0" err="1">
+                <a:solidFill>
+                  <a:srgbClr val="000000"/>
+                </a:solidFill>
+                <a:uFill>
+                  <a:solidFill>
+                    <a:srgbClr val="FFFFFF"/>
+                  </a:solidFill>
+                </a:uFill>
+              </a:rPr>
+              <a:t>Walkforward</a:t>
+            </a:r>
+            <a:r>
+              <a:rPr lang="es-ES" sz="1400" spc="-1" dirty="0">
+                <a:solidFill>
+                  <a:srgbClr val="000000"/>
+                </a:solidFill>
+                <a:uFill>
+                  <a:solidFill>
+                    <a:srgbClr val="FFFFFF"/>
+                  </a:solidFill>
+                </a:uFill>
+              </a:rPr>
+              <a:t> simula el uso que se le dará al modelo mediante pruebas sucesivas en las que se utiliza toda la información disponible para hacer el modelado y la prueba, se obtiene el resultado y se avanza al siguiente período</a:t>
+            </a:r>
+            <a:endParaRPr lang="es-ES" sz="1800" b="0" strike="noStrike" spc="-1" dirty="0">
+              <a:solidFill>
+                <a:srgbClr val="000000"/>
+              </a:solidFill>
+              <a:uFill>
+                <a:solidFill>
+                  <a:srgbClr val="FFFFFF"/>
+                </a:solidFill>
+              </a:uFill>
+            </a:endParaRPr>
+          </a:p>
+        </p:txBody>
+      </p:sp>
+      <p:sp>
+        <p:nvSpPr>
+          <p:cNvPr id="16" name="CustomShape 13">
+            <a:extLst>
+              <a:ext uri="{FF2B5EF4-FFF2-40B4-BE49-F238E27FC236}">
+                <a16:creationId xmlns:a16="http://schemas.microsoft.com/office/drawing/2014/main" id="{DCBB4E01-84B7-4F9B-A4E4-E068C295A556}"/>
+              </a:ext>
+            </a:extLst>
+          </p:cNvPr>
+          <p:cNvSpPr/>
+          <p:nvPr/>
+        </p:nvSpPr>
+        <p:spPr>
+          <a:xfrm rot="10800000">
+            <a:off x="1316160" y="2937828"/>
+            <a:ext cx="939600" cy="464040"/>
+          </a:xfrm>
+          <a:prstGeom prst="curvedUpArrow">
+            <a:avLst>
+              <a:gd name="adj1" fmla="val 25000"/>
+              <a:gd name="adj2" fmla="val 50000"/>
+              <a:gd name="adj3" fmla="val 25000"/>
+            </a:avLst>
+          </a:prstGeom>
+          <a:solidFill>
+            <a:schemeClr val="bg1">
+              <a:lumMod val="65000"/>
+            </a:schemeClr>
+          </a:solidFill>
+          <a:ln>
+            <a:solidFill>
+              <a:srgbClr val="002060"/>
+            </a:solidFill>
+            <a:round/>
+          </a:ln>
+        </p:spPr>
+        <p:style>
+          <a:lnRef idx="2">
+            <a:schemeClr val="accent1">
+              <a:shade val="50000"/>
+            </a:schemeClr>
+          </a:lnRef>
+          <a:fillRef idx="1">
+            <a:schemeClr val="accent1"/>
+          </a:fillRef>
+          <a:effectRef idx="0">
+            <a:schemeClr val="accent1"/>
+          </a:effectRef>
+          <a:fontRef idx="minor"/>
+        </p:style>
+      </p:sp>
+      <p:pic>
+        <p:nvPicPr>
+          <p:cNvPr id="3" name="Imagen 2">
+            <a:extLst>
+              <a:ext uri="{FF2B5EF4-FFF2-40B4-BE49-F238E27FC236}">
+                <a16:creationId xmlns:a16="http://schemas.microsoft.com/office/drawing/2014/main" id="{98554D4A-EF06-4340-89E5-114B7FCA4959}"/>
+              </a:ext>
+            </a:extLst>
+          </p:cNvPr>
+          <p:cNvPicPr>
+            <a:picLocks noChangeAspect="1"/>
+          </p:cNvPicPr>
+          <p:nvPr/>
+        </p:nvPicPr>
+        <p:blipFill rotWithShape="1">
+          <a:blip r:embed="rId2"/>
+          <a:srcRect b="14388"/>
+          <a:stretch/>
+        </p:blipFill>
+        <p:spPr>
+          <a:xfrm>
+            <a:off x="4417071" y="2829912"/>
+            <a:ext cx="7001852" cy="3172584"/>
+          </a:xfrm>
+          <a:prstGeom prst="rect">
+            <a:avLst/>
+          </a:prstGeom>
+        </p:spPr>
+      </p:pic>
+    </p:spTree>
+    <p:extLst>
+      <p:ext uri="{BB962C8B-B14F-4D97-AF65-F5344CB8AC3E}">
+        <p14:creationId xmlns:p14="http://schemas.microsoft.com/office/powerpoint/2010/main" val="624133707"/>
+      </p:ext>
+    </p:extLst>
+  </p:cSld>
+  <p:clrMapOvr>
+    <a:masterClrMapping/>
+  </p:clrMapOvr>
+</p:sld>
+</file>
+
+<file path=ppt/slides/slide22.xml><?xml version="1.0" encoding="utf-8"?>
+<p:sld xmlns:a="http://schemas.openxmlformats.org/drawingml/2006/main" xmlns:r="http://schemas.openxmlformats.org/officeDocument/2006/relationships" xmlns:p="http://schemas.openxmlformats.org/presentationml/2006/main">
+  <p:cSld>
+    <p:spTree>
+      <p:nvGrpSpPr>
+        <p:cNvPr id="1" name=""/>
+        <p:cNvGrpSpPr/>
+        <p:nvPr/>
+      </p:nvGrpSpPr>
+      <p:grpSpPr>
+        <a:xfrm>
+          <a:off x="0" y="0"/>
+          <a:ext cx="0" cy="0"/>
+          <a:chOff x="0" y="0"/>
+          <a:chExt cx="0" cy="0"/>
+        </a:xfrm>
+      </p:grpSpPr>
+      <p:sp>
+        <p:nvSpPr>
+          <p:cNvPr id="9" name="AutoShape 6" descr="statsmodels">
+            <a:extLst>
+              <a:ext uri="{FF2B5EF4-FFF2-40B4-BE49-F238E27FC236}">
+                <a16:creationId xmlns:a16="http://schemas.microsoft.com/office/drawing/2014/main" id="{CABC1135-890E-4BE3-9332-D0D6EF3DCCCC}"/>
+              </a:ext>
+            </a:extLst>
+          </p:cNvPr>
+          <p:cNvSpPr>
+            <a:spLocks noChangeAspect="1" noChangeArrowheads="1"/>
+          </p:cNvSpPr>
+          <p:nvPr/>
+        </p:nvSpPr>
+        <p:spPr bwMode="auto">
+          <a:xfrm>
+            <a:off x="11524641" y="5400258"/>
+            <a:ext cx="304800" cy="304800"/>
+          </a:xfrm>
+          <a:prstGeom prst="rect">
+            <a:avLst/>
+          </a:prstGeom>
+          <a:noFill/>
+          <a:extLst>
+            <a:ext uri="{909E8E84-426E-40DD-AFC4-6F175D3DCCD1}">
+              <a14:hiddenFill xmlns:a14="http://schemas.microsoft.com/office/drawing/2010/main">
+                <a:solidFill>
+                  <a:srgbClr val="FFFFFF"/>
+                </a:solidFill>
+              </a14:hiddenFill>
+            </a:ext>
+          </a:extLst>
+        </p:spPr>
+        <p:txBody>
+          <a:bodyPr vert="horz" wrap="square" lIns="91440" tIns="45720" rIns="91440" bIns="45720" numCol="1" anchor="t" anchorCtr="0" compatLnSpc="1">
+            <a:prstTxWarp prst="textNoShape">
+              <a:avLst/>
+            </a:prstTxWarp>
+          </a:bodyPr>
+          <a:lstStyle/>
+          <a:p>
+            <a:endParaRPr lang="en-US" dirty="0"/>
+          </a:p>
+        </p:txBody>
+      </p:sp>
+      <p:sp>
+        <p:nvSpPr>
+          <p:cNvPr id="12" name="CuadroTexto 11">
+            <a:extLst>
+              <a:ext uri="{FF2B5EF4-FFF2-40B4-BE49-F238E27FC236}">
+                <a16:creationId xmlns:a16="http://schemas.microsoft.com/office/drawing/2014/main" id="{8948FA8D-EDF1-429F-8530-FD8D04815F2B}"/>
+              </a:ext>
+            </a:extLst>
+          </p:cNvPr>
+          <p:cNvSpPr txBox="1"/>
+          <p:nvPr/>
+        </p:nvSpPr>
+        <p:spPr>
+          <a:xfrm>
+            <a:off x="5729681" y="304358"/>
+            <a:ext cx="6579765" cy="584775"/>
+          </a:xfrm>
+          <a:prstGeom prst="rect">
+            <a:avLst/>
+          </a:prstGeom>
+          <a:noFill/>
+        </p:spPr>
+        <p:txBody>
+          <a:bodyPr wrap="square" rtlCol="0">
+            <a:spAutoFit/>
+          </a:bodyPr>
+          <a:lstStyle/>
+          <a:p>
+            <a:pPr algn="ctr"/>
+            <a:r>
+              <a:rPr lang="es-ES" sz="3200" dirty="0"/>
+              <a:t>Validación de Modelos</a:t>
+            </a:r>
+          </a:p>
+        </p:txBody>
+      </p:sp>
+      <p:sp>
+        <p:nvSpPr>
+          <p:cNvPr id="13" name="CuadroTexto 12">
+            <a:extLst>
+              <a:ext uri="{FF2B5EF4-FFF2-40B4-BE49-F238E27FC236}">
+                <a16:creationId xmlns:a16="http://schemas.microsoft.com/office/drawing/2014/main" id="{F2495241-AF14-4361-861E-3C23B778585E}"/>
+              </a:ext>
+            </a:extLst>
+          </p:cNvPr>
+          <p:cNvSpPr txBox="1"/>
+          <p:nvPr/>
+        </p:nvSpPr>
+        <p:spPr>
+          <a:xfrm>
+            <a:off x="209725" y="1420094"/>
+            <a:ext cx="4960690" cy="584775"/>
+          </a:xfrm>
+          <a:prstGeom prst="rect">
+            <a:avLst/>
+          </a:prstGeom>
+          <a:noFill/>
+        </p:spPr>
+        <p:txBody>
+          <a:bodyPr wrap="square" rtlCol="0">
+            <a:spAutoFit/>
+          </a:bodyPr>
+          <a:lstStyle/>
+          <a:p>
+            <a:pPr algn="ctr"/>
+            <a:r>
+              <a:rPr lang="es-ES" sz="3200" dirty="0" err="1"/>
+              <a:t>Walkforward</a:t>
+            </a:r>
+            <a:r>
+              <a:rPr lang="es-ES" sz="3200" dirty="0"/>
+              <a:t> </a:t>
+            </a:r>
+            <a:r>
+              <a:rPr lang="es-ES" sz="3200" dirty="0" err="1"/>
+              <a:t>Validation</a:t>
+            </a:r>
+            <a:endParaRPr lang="es-ES" sz="3200" dirty="0"/>
+          </a:p>
+        </p:txBody>
+      </p:sp>
+      <p:sp>
+        <p:nvSpPr>
+          <p:cNvPr id="14" name="CustomShape 8">
+            <a:extLst>
+              <a:ext uri="{FF2B5EF4-FFF2-40B4-BE49-F238E27FC236}">
+                <a16:creationId xmlns:a16="http://schemas.microsoft.com/office/drawing/2014/main" id="{B9F19D66-57FB-419D-BED3-0F3342F99073}"/>
+              </a:ext>
+            </a:extLst>
+          </p:cNvPr>
+          <p:cNvSpPr/>
+          <p:nvPr/>
+        </p:nvSpPr>
+        <p:spPr>
+          <a:xfrm>
             <a:off x="596160" y="4060080"/>
             <a:ext cx="2914920" cy="464040"/>
           </a:xfrm>
@@ -14754,7 +15181,7 @@
     </p:spTree>
     <p:extLst>
       <p:ext uri="{BB962C8B-B14F-4D97-AF65-F5344CB8AC3E}">
-        <p14:creationId xmlns:p14="http://schemas.microsoft.com/office/powerpoint/2010/main" val="624133707"/>
+        <p14:creationId xmlns:p14="http://schemas.microsoft.com/office/powerpoint/2010/main" val="1597386923"/>
       </p:ext>
     </p:extLst>
   </p:cSld>
@@ -15064,7 +15491,7 @@
 </p:sld>
 </file>
 
-<file path=ppt/slides/slide22.xml><?xml version="1.0" encoding="utf-8"?>
+<file path=ppt/slides/slide23.xml><?xml version="1.0" encoding="utf-8"?>
 <p:sld xmlns:a="http://schemas.openxmlformats.org/drawingml/2006/main" xmlns:r="http://schemas.openxmlformats.org/officeDocument/2006/relationships" xmlns:p="http://schemas.openxmlformats.org/presentationml/2006/main">
   <p:cSld>
     <p:spTree>
@@ -17297,7 +17724,7 @@
 </p:sld>
 </file>
 
-<file path=ppt/slides/slide23.xml><?xml version="1.0" encoding="utf-8"?>
+<file path=ppt/slides/slide24.xml><?xml version="1.0" encoding="utf-8"?>
 <p:sld xmlns:a="http://schemas.openxmlformats.org/drawingml/2006/main" xmlns:r="http://schemas.openxmlformats.org/officeDocument/2006/relationships" xmlns:p="http://schemas.openxmlformats.org/presentationml/2006/main">
   <p:cSld>
     <p:spTree>
@@ -17940,7 +18367,7 @@
 </p:sld>
 </file>
 
-<file path=ppt/slides/slide24.xml><?xml version="1.0" encoding="utf-8"?>
+<file path=ppt/slides/slide25.xml><?xml version="1.0" encoding="utf-8"?>
 <p:sld xmlns:a="http://schemas.openxmlformats.org/drawingml/2006/main" xmlns:r="http://schemas.openxmlformats.org/officeDocument/2006/relationships" xmlns:p="http://schemas.openxmlformats.org/presentationml/2006/main">
   <p:cSld>
     <p:spTree>
@@ -20077,7 +20504,7 @@
 </p:sld>
 </file>
 
-<file path=ppt/slides/slide25.xml><?xml version="1.0" encoding="utf-8"?>
+<file path=ppt/slides/slide26.xml><?xml version="1.0" encoding="utf-8"?>
 <p:sld xmlns:a="http://schemas.openxmlformats.org/drawingml/2006/main" xmlns:r="http://schemas.openxmlformats.org/officeDocument/2006/relationships" xmlns:p="http://schemas.openxmlformats.org/presentationml/2006/main">
   <p:cSld>
     <p:spTree>
@@ -20952,7 +21379,7 @@
 </p:sld>
 </file>
 
-<file path=ppt/slides/slide26.xml><?xml version="1.0" encoding="utf-8"?>
+<file path=ppt/slides/slide27.xml><?xml version="1.0" encoding="utf-8"?>
 <p:sld xmlns:a="http://schemas.openxmlformats.org/drawingml/2006/main" xmlns:r="http://schemas.openxmlformats.org/officeDocument/2006/relationships" xmlns:p="http://schemas.openxmlformats.org/presentationml/2006/main">
   <p:cSld>
     <p:spTree>
@@ -21129,7 +21556,7 @@
 </p:sld>
 </file>
 
-<file path=ppt/slides/slide27.xml><?xml version="1.0" encoding="utf-8"?>
+<file path=ppt/slides/slide28.xml><?xml version="1.0" encoding="utf-8"?>
 <p:sld xmlns:a="http://schemas.openxmlformats.org/drawingml/2006/main" xmlns:r="http://schemas.openxmlformats.org/officeDocument/2006/relationships" xmlns:p="http://schemas.openxmlformats.org/presentationml/2006/main">
   <p:cSld>
     <p:spTree>

</xml_diff>

<commit_message>
Se completa la presentación con cambios de ARIMA y Prophet y se arreglan los fallos del modelo Prophet en el código
</commit_message>
<xml_diff>
--- a/03_BASIC_MODELLING/03_BASIC_MODELLING.pptx
+++ b/03_BASIC_MODELLING/03_BASIC_MODELLING.pptx
@@ -5,7 +5,7 @@
     <p:sldMasterId id="2147483648" r:id="rId1"/>
   </p:sldMasterIdLst>
   <p:notesMasterIdLst>
-    <p:notesMasterId r:id="rId30"/>
+    <p:notesMasterId r:id="rId32"/>
   </p:notesMasterIdLst>
   <p:sldIdLst>
     <p:sldId id="256" r:id="rId2"/>
@@ -32,10 +32,12 @@
     <p:sldId id="582" r:id="rId23"/>
     <p:sldId id="565" r:id="rId24"/>
     <p:sldId id="563" r:id="rId25"/>
-    <p:sldId id="580" r:id="rId26"/>
-    <p:sldId id="581" r:id="rId27"/>
-    <p:sldId id="564" r:id="rId28"/>
-    <p:sldId id="538" r:id="rId29"/>
+    <p:sldId id="583" r:id="rId26"/>
+    <p:sldId id="580" r:id="rId27"/>
+    <p:sldId id="584" r:id="rId28"/>
+    <p:sldId id="581" r:id="rId29"/>
+    <p:sldId id="564" r:id="rId30"/>
+    <p:sldId id="538" r:id="rId31"/>
   </p:sldIdLst>
   <p:sldSz cx="12192000" cy="6858000"/>
   <p:notesSz cx="6858000" cy="9144000"/>
@@ -163,7 +165,9 @@
             <p14:sldId id="582"/>
             <p14:sldId id="565"/>
             <p14:sldId id="563"/>
+            <p14:sldId id="583"/>
             <p14:sldId id="580"/>
+            <p14:sldId id="584"/>
             <p14:sldId id="581"/>
             <p14:sldId id="564"/>
             <p14:sldId id="538"/>
@@ -263,7 +267,7 @@
           <a:p>
             <a:fld id="{6118F894-A91F-4842-BD9A-7582ADBE2C27}" type="datetimeFigureOut">
               <a:rPr lang="en-US" smtClean="0"/>
-              <a:t>4/25/2021</a:t>
+              <a:t>5/6/2021</a:t>
             </a:fld>
             <a:endParaRPr lang="en-US" dirty="0"/>
           </a:p>
@@ -680,7 +684,7 @@
           <a:p>
             <a:fld id="{15119D3F-0F06-48B5-A311-F7380CC22BDC}" type="datetimeFigureOut">
               <a:rPr lang="en-US" smtClean="0"/>
-              <a:t>4/25/2021</a:t>
+              <a:t>5/6/2021</a:t>
             </a:fld>
             <a:endParaRPr lang="en-US" dirty="0"/>
           </a:p>
@@ -880,7 +884,7 @@
           <a:p>
             <a:fld id="{15119D3F-0F06-48B5-A311-F7380CC22BDC}" type="datetimeFigureOut">
               <a:rPr lang="en-US" smtClean="0"/>
-              <a:t>4/25/2021</a:t>
+              <a:t>5/6/2021</a:t>
             </a:fld>
             <a:endParaRPr lang="en-US" dirty="0"/>
           </a:p>
@@ -1090,7 +1094,7 @@
           <a:p>
             <a:fld id="{15119D3F-0F06-48B5-A311-F7380CC22BDC}" type="datetimeFigureOut">
               <a:rPr lang="en-US" smtClean="0"/>
-              <a:t>4/25/2021</a:t>
+              <a:t>5/6/2021</a:t>
             </a:fld>
             <a:endParaRPr lang="en-US" dirty="0"/>
           </a:p>
@@ -1290,7 +1294,7 @@
           <a:p>
             <a:fld id="{15119D3F-0F06-48B5-A311-F7380CC22BDC}" type="datetimeFigureOut">
               <a:rPr lang="en-US" smtClean="0"/>
-              <a:t>4/25/2021</a:t>
+              <a:t>5/6/2021</a:t>
             </a:fld>
             <a:endParaRPr lang="en-US" dirty="0"/>
           </a:p>
@@ -1566,7 +1570,7 @@
           <a:p>
             <a:fld id="{15119D3F-0F06-48B5-A311-F7380CC22BDC}" type="datetimeFigureOut">
               <a:rPr lang="en-US" smtClean="0"/>
-              <a:t>4/25/2021</a:t>
+              <a:t>5/6/2021</a:t>
             </a:fld>
             <a:endParaRPr lang="en-US" dirty="0"/>
           </a:p>
@@ -1834,7 +1838,7 @@
           <a:p>
             <a:fld id="{15119D3F-0F06-48B5-A311-F7380CC22BDC}" type="datetimeFigureOut">
               <a:rPr lang="en-US" smtClean="0"/>
-              <a:t>4/25/2021</a:t>
+              <a:t>5/6/2021</a:t>
             </a:fld>
             <a:endParaRPr lang="en-US" dirty="0"/>
           </a:p>
@@ -2249,7 +2253,7 @@
           <a:p>
             <a:fld id="{15119D3F-0F06-48B5-A311-F7380CC22BDC}" type="datetimeFigureOut">
               <a:rPr lang="en-US" smtClean="0"/>
-              <a:t>4/25/2021</a:t>
+              <a:t>5/6/2021</a:t>
             </a:fld>
             <a:endParaRPr lang="en-US" dirty="0"/>
           </a:p>
@@ -2391,7 +2395,7 @@
           <a:p>
             <a:fld id="{15119D3F-0F06-48B5-A311-F7380CC22BDC}" type="datetimeFigureOut">
               <a:rPr lang="en-US" smtClean="0"/>
-              <a:t>4/25/2021</a:t>
+              <a:t>5/6/2021</a:t>
             </a:fld>
             <a:endParaRPr lang="en-US" dirty="0"/>
           </a:p>
@@ -2504,7 +2508,7 @@
           <a:p>
             <a:fld id="{15119D3F-0F06-48B5-A311-F7380CC22BDC}" type="datetimeFigureOut">
               <a:rPr lang="en-US" smtClean="0"/>
-              <a:t>4/25/2021</a:t>
+              <a:t>5/6/2021</a:t>
             </a:fld>
             <a:endParaRPr lang="en-US" dirty="0"/>
           </a:p>
@@ -2918,7 +2922,7 @@
           <a:p>
             <a:fld id="{15119D3F-0F06-48B5-A311-F7380CC22BDC}" type="datetimeFigureOut">
               <a:rPr lang="en-US" smtClean="0"/>
-              <a:t>4/25/2021</a:t>
+              <a:t>5/6/2021</a:t>
             </a:fld>
             <a:endParaRPr lang="en-US" dirty="0"/>
           </a:p>
@@ -3207,7 +3211,7 @@
           <a:p>
             <a:fld id="{15119D3F-0F06-48B5-A311-F7380CC22BDC}" type="datetimeFigureOut">
               <a:rPr lang="en-US" smtClean="0"/>
-              <a:t>4/25/2021</a:t>
+              <a:t>5/6/2021</a:t>
             </a:fld>
             <a:endParaRPr lang="en-US" dirty="0"/>
           </a:p>
@@ -3452,7 +3456,7 @@
             <a:fld id="{15119D3F-0F06-48B5-A311-F7380CC22BDC}" type="datetimeFigureOut">
               <a:rPr lang="en-US" smtClean="0"/>
               <a:pPr/>
-              <a:t>4/25/2021</a:t>
+              <a:t>5/6/2021</a:t>
             </a:fld>
             <a:endParaRPr lang="en-US" dirty="0"/>
           </a:p>
@@ -18389,6 +18393,991 @@
           <p:cNvPr id="4" name="CuadroTexto 3">
             <a:extLst>
               <a:ext uri="{FF2B5EF4-FFF2-40B4-BE49-F238E27FC236}">
+                <a16:creationId xmlns:a16="http://schemas.microsoft.com/office/drawing/2014/main" id="{399985DA-50B8-4EA5-819B-7A1BB8E3AD1C}"/>
+              </a:ext>
+            </a:extLst>
+          </p:cNvPr>
+          <p:cNvSpPr txBox="1"/>
+          <p:nvPr/>
+        </p:nvSpPr>
+        <p:spPr>
+          <a:xfrm>
+            <a:off x="5729681" y="304358"/>
+            <a:ext cx="6579765" cy="584775"/>
+          </a:xfrm>
+          <a:prstGeom prst="rect">
+            <a:avLst/>
+          </a:prstGeom>
+          <a:noFill/>
+        </p:spPr>
+        <p:txBody>
+          <a:bodyPr wrap="square" rtlCol="0">
+            <a:spAutoFit/>
+          </a:bodyPr>
+          <a:lstStyle/>
+          <a:p>
+            <a:pPr algn="ctr"/>
+            <a:r>
+              <a:rPr lang="es-ES" sz="3200" dirty="0"/>
+              <a:t>Modelos ARIMA</a:t>
+            </a:r>
+          </a:p>
+        </p:txBody>
+      </p:sp>
+      <p:grpSp>
+        <p:nvGrpSpPr>
+          <p:cNvPr id="5" name="Grupo 4">
+            <a:extLst>
+              <a:ext uri="{FF2B5EF4-FFF2-40B4-BE49-F238E27FC236}">
+                <a16:creationId xmlns:a16="http://schemas.microsoft.com/office/drawing/2014/main" id="{4CB101F1-A15C-49FD-82C0-3F73B053C57E}"/>
+              </a:ext>
+            </a:extLst>
+          </p:cNvPr>
+          <p:cNvGrpSpPr/>
+          <p:nvPr/>
+        </p:nvGrpSpPr>
+        <p:grpSpPr>
+          <a:xfrm>
+            <a:off x="302734" y="1766187"/>
+            <a:ext cx="1126435" cy="1060174"/>
+            <a:chOff x="302734" y="1766187"/>
+            <a:chExt cx="1126435" cy="1060174"/>
+          </a:xfrm>
+          <a:solidFill>
+            <a:srgbClr val="C00000"/>
+          </a:solidFill>
+        </p:grpSpPr>
+        <p:sp>
+          <p:nvSpPr>
+            <p:cNvPr id="6" name="Elipse 5">
+              <a:extLst>
+                <a:ext uri="{FF2B5EF4-FFF2-40B4-BE49-F238E27FC236}">
+                  <a16:creationId xmlns:a16="http://schemas.microsoft.com/office/drawing/2014/main" id="{B907E796-698E-4EE8-B58F-6EEA1F2598E4}"/>
+                </a:ext>
+              </a:extLst>
+            </p:cNvPr>
+            <p:cNvSpPr/>
+            <p:nvPr/>
+          </p:nvSpPr>
+          <p:spPr>
+            <a:xfrm>
+              <a:off x="302734" y="1766187"/>
+              <a:ext cx="1126435" cy="1060174"/>
+            </a:xfrm>
+            <a:prstGeom prst="ellipse">
+              <a:avLst/>
+            </a:prstGeom>
+            <a:grpFill/>
+            <a:ln>
+              <a:noFill/>
+            </a:ln>
+          </p:spPr>
+          <p:style>
+            <a:lnRef idx="2">
+              <a:schemeClr val="accent1">
+                <a:shade val="50000"/>
+              </a:schemeClr>
+            </a:lnRef>
+            <a:fillRef idx="1">
+              <a:schemeClr val="accent1"/>
+            </a:fillRef>
+            <a:effectRef idx="0">
+              <a:schemeClr val="accent1"/>
+            </a:effectRef>
+            <a:fontRef idx="minor">
+              <a:schemeClr val="lt1"/>
+            </a:fontRef>
+          </p:style>
+          <p:txBody>
+            <a:bodyPr rtlCol="0" anchor="ctr"/>
+            <a:lstStyle/>
+            <a:p>
+              <a:pPr algn="ctr"/>
+              <a:endParaRPr lang="en-US"/>
+            </a:p>
+          </p:txBody>
+        </p:sp>
+        <p:sp>
+          <p:nvSpPr>
+            <p:cNvPr id="7" name="Caution" descr="{&quot;Key&quot;:&quot;POWER_USER_SHAPE_ICON&quot;,&quot;Value&quot;:&quot;POWER_USER_SHAPE_ICON_STYLE_1&quot;}">
+              <a:extLst>
+                <a:ext uri="{FF2B5EF4-FFF2-40B4-BE49-F238E27FC236}">
+                  <a16:creationId xmlns:a16="http://schemas.microsoft.com/office/drawing/2014/main" id="{18A4FBA0-43F8-4977-B406-7009261A3431}"/>
+                </a:ext>
+              </a:extLst>
+            </p:cNvPr>
+            <p:cNvSpPr>
+              <a:spLocks noChangeAspect="1"/>
+            </p:cNvSpPr>
+            <p:nvPr/>
+          </p:nvSpPr>
+          <p:spPr>
+            <a:xfrm>
+              <a:off x="541683" y="1974476"/>
+              <a:ext cx="629793" cy="542925"/>
+            </a:xfrm>
+            <a:custGeom>
+              <a:avLst/>
+              <a:gdLst>
+                <a:gd name="connsiteX0" fmla="*/ 957551 w 1915105"/>
+                <a:gd name="connsiteY0" fmla="*/ 1312007 h 1650953"/>
+                <a:gd name="connsiteX1" fmla="*/ 1058240 w 1915105"/>
+                <a:gd name="connsiteY1" fmla="*/ 1412696 h 1650953"/>
+                <a:gd name="connsiteX2" fmla="*/ 957551 w 1915105"/>
+                <a:gd name="connsiteY2" fmla="*/ 1513385 h 1650953"/>
+                <a:gd name="connsiteX3" fmla="*/ 856862 w 1915105"/>
+                <a:gd name="connsiteY3" fmla="*/ 1412696 h 1650953"/>
+                <a:gd name="connsiteX4" fmla="*/ 957551 w 1915105"/>
+                <a:gd name="connsiteY4" fmla="*/ 1312007 h 1650953"/>
+                <a:gd name="connsiteX5" fmla="*/ 957553 w 1915105"/>
+                <a:gd name="connsiteY5" fmla="*/ 439775 h 1650953"/>
+                <a:gd name="connsiteX6" fmla="*/ 1026486 w 1915105"/>
+                <a:gd name="connsiteY6" fmla="*/ 508708 h 1650953"/>
+                <a:gd name="connsiteX7" fmla="*/ 1026485 w 1915105"/>
+                <a:gd name="connsiteY7" fmla="*/ 1135578 h 1650953"/>
+                <a:gd name="connsiteX8" fmla="*/ 957552 w 1915105"/>
+                <a:gd name="connsiteY8" fmla="*/ 1204511 h 1650953"/>
+                <a:gd name="connsiteX9" fmla="*/ 957553 w 1915105"/>
+                <a:gd name="connsiteY9" fmla="*/ 1204510 h 1650953"/>
+                <a:gd name="connsiteX10" fmla="*/ 888620 w 1915105"/>
+                <a:gd name="connsiteY10" fmla="*/ 1135577 h 1650953"/>
+                <a:gd name="connsiteX11" fmla="*/ 888620 w 1915105"/>
+                <a:gd name="connsiteY11" fmla="*/ 508708 h 1650953"/>
+                <a:gd name="connsiteX12" fmla="*/ 957553 w 1915105"/>
+                <a:gd name="connsiteY12" fmla="*/ 439775 h 1650953"/>
+                <a:gd name="connsiteX13" fmla="*/ 957553 w 1915105"/>
+                <a:gd name="connsiteY13" fmla="*/ 100443 h 1650953"/>
+                <a:gd name="connsiteX14" fmla="*/ 87050 w 1915105"/>
+                <a:gd name="connsiteY14" fmla="*/ 1601309 h 1650953"/>
+                <a:gd name="connsiteX15" fmla="*/ 1828055 w 1915105"/>
+                <a:gd name="connsiteY15" fmla="*/ 1601309 h 1650953"/>
+                <a:gd name="connsiteX16" fmla="*/ 957553 w 1915105"/>
+                <a:gd name="connsiteY16" fmla="*/ 0 h 1650953"/>
+                <a:gd name="connsiteX17" fmla="*/ 1915105 w 1915105"/>
+                <a:gd name="connsiteY17" fmla="*/ 1650953 h 1650953"/>
+                <a:gd name="connsiteX18" fmla="*/ 0 w 1915105"/>
+                <a:gd name="connsiteY18" fmla="*/ 1650953 h 1650953"/>
+              </a:gdLst>
+              <a:ahLst/>
+              <a:cxnLst>
+                <a:cxn ang="0">
+                  <a:pos x="connsiteX0" y="connsiteY0"/>
+                </a:cxn>
+                <a:cxn ang="0">
+                  <a:pos x="connsiteX1" y="connsiteY1"/>
+                </a:cxn>
+                <a:cxn ang="0">
+                  <a:pos x="connsiteX2" y="connsiteY2"/>
+                </a:cxn>
+                <a:cxn ang="0">
+                  <a:pos x="connsiteX3" y="connsiteY3"/>
+                </a:cxn>
+                <a:cxn ang="0">
+                  <a:pos x="connsiteX4" y="connsiteY4"/>
+                </a:cxn>
+                <a:cxn ang="0">
+                  <a:pos x="connsiteX5" y="connsiteY5"/>
+                </a:cxn>
+                <a:cxn ang="0">
+                  <a:pos x="connsiteX6" y="connsiteY6"/>
+                </a:cxn>
+                <a:cxn ang="0">
+                  <a:pos x="connsiteX7" y="connsiteY7"/>
+                </a:cxn>
+                <a:cxn ang="0">
+                  <a:pos x="connsiteX8" y="connsiteY8"/>
+                </a:cxn>
+                <a:cxn ang="0">
+                  <a:pos x="connsiteX9" y="connsiteY9"/>
+                </a:cxn>
+                <a:cxn ang="0">
+                  <a:pos x="connsiteX10" y="connsiteY10"/>
+                </a:cxn>
+                <a:cxn ang="0">
+                  <a:pos x="connsiteX11" y="connsiteY11"/>
+                </a:cxn>
+                <a:cxn ang="0">
+                  <a:pos x="connsiteX12" y="connsiteY12"/>
+                </a:cxn>
+                <a:cxn ang="0">
+                  <a:pos x="connsiteX13" y="connsiteY13"/>
+                </a:cxn>
+                <a:cxn ang="0">
+                  <a:pos x="connsiteX14" y="connsiteY14"/>
+                </a:cxn>
+                <a:cxn ang="0">
+                  <a:pos x="connsiteX15" y="connsiteY15"/>
+                </a:cxn>
+                <a:cxn ang="0">
+                  <a:pos x="connsiteX16" y="connsiteY16"/>
+                </a:cxn>
+                <a:cxn ang="0">
+                  <a:pos x="connsiteX17" y="connsiteY17"/>
+                </a:cxn>
+                <a:cxn ang="0">
+                  <a:pos x="connsiteX18" y="connsiteY18"/>
+                </a:cxn>
+              </a:cxnLst>
+              <a:rect l="l" t="t" r="r" b="b"/>
+              <a:pathLst>
+                <a:path w="1915105" h="1650953">
+                  <a:moveTo>
+                    <a:pt x="957551" y="1312007"/>
+                  </a:moveTo>
+                  <a:cubicBezTo>
+                    <a:pt x="1013160" y="1312007"/>
+                    <a:pt x="1058240" y="1357087"/>
+                    <a:pt x="1058240" y="1412696"/>
+                  </a:cubicBezTo>
+                  <a:cubicBezTo>
+                    <a:pt x="1058240" y="1468305"/>
+                    <a:pt x="1013160" y="1513385"/>
+                    <a:pt x="957551" y="1513385"/>
+                  </a:cubicBezTo>
+                  <a:cubicBezTo>
+                    <a:pt x="901942" y="1513385"/>
+                    <a:pt x="856862" y="1468305"/>
+                    <a:pt x="856862" y="1412696"/>
+                  </a:cubicBezTo>
+                  <a:cubicBezTo>
+                    <a:pt x="856862" y="1357087"/>
+                    <a:pt x="901942" y="1312007"/>
+                    <a:pt x="957551" y="1312007"/>
+                  </a:cubicBezTo>
+                  <a:close/>
+                  <a:moveTo>
+                    <a:pt x="957553" y="439775"/>
+                  </a:moveTo>
+                  <a:cubicBezTo>
+                    <a:pt x="995624" y="439775"/>
+                    <a:pt x="1026486" y="470637"/>
+                    <a:pt x="1026486" y="508708"/>
+                  </a:cubicBezTo>
+                  <a:cubicBezTo>
+                    <a:pt x="1026486" y="717665"/>
+                    <a:pt x="1026485" y="926621"/>
+                    <a:pt x="1026485" y="1135578"/>
+                  </a:cubicBezTo>
+                  <a:cubicBezTo>
+                    <a:pt x="1026485" y="1173649"/>
+                    <a:pt x="995623" y="1204511"/>
+                    <a:pt x="957552" y="1204511"/>
+                  </a:cubicBezTo>
+                  <a:lnTo>
+                    <a:pt x="957553" y="1204510"/>
+                  </a:lnTo>
+                  <a:cubicBezTo>
+                    <a:pt x="919482" y="1204510"/>
+                    <a:pt x="888620" y="1173648"/>
+                    <a:pt x="888620" y="1135577"/>
+                  </a:cubicBezTo>
+                  <a:lnTo>
+                    <a:pt x="888620" y="508708"/>
+                  </a:lnTo>
+                  <a:cubicBezTo>
+                    <a:pt x="888620" y="470637"/>
+                    <a:pt x="919482" y="439775"/>
+                    <a:pt x="957553" y="439775"/>
+                  </a:cubicBezTo>
+                  <a:close/>
+                  <a:moveTo>
+                    <a:pt x="957553" y="100443"/>
+                  </a:moveTo>
+                  <a:lnTo>
+                    <a:pt x="87050" y="1601309"/>
+                  </a:lnTo>
+                  <a:lnTo>
+                    <a:pt x="1828055" y="1601309"/>
+                  </a:lnTo>
+                  <a:close/>
+                  <a:moveTo>
+                    <a:pt x="957553" y="0"/>
+                  </a:moveTo>
+                  <a:lnTo>
+                    <a:pt x="1915105" y="1650953"/>
+                  </a:lnTo>
+                  <a:lnTo>
+                    <a:pt x="0" y="1650953"/>
+                  </a:lnTo>
+                  <a:close/>
+                </a:path>
+              </a:pathLst>
+            </a:custGeom>
+            <a:solidFill>
+              <a:schemeClr val="bg1"/>
+            </a:solidFill>
+            <a:ln>
+              <a:solidFill>
+                <a:schemeClr val="bg1"/>
+              </a:solidFill>
+            </a:ln>
+          </p:spPr>
+          <p:style>
+            <a:lnRef idx="2">
+              <a:schemeClr val="accent1">
+                <a:shade val="50000"/>
+              </a:schemeClr>
+            </a:lnRef>
+            <a:fillRef idx="1">
+              <a:schemeClr val="accent1"/>
+            </a:fillRef>
+            <a:effectRef idx="0">
+              <a:schemeClr val="accent1"/>
+            </a:effectRef>
+            <a:fontRef idx="minor">
+              <a:schemeClr val="lt1"/>
+            </a:fontRef>
+          </p:style>
+          <p:txBody>
+            <a:bodyPr rtlCol="0" anchor="ctr"/>
+            <a:lstStyle/>
+            <a:p>
+              <a:pPr marL="0" marR="0" lvl="0" indent="0" algn="ctr" defTabSz="914400" rtl="0" eaLnBrk="1" fontAlgn="auto" latinLnBrk="0" hangingPunct="1">
+                <a:lnSpc>
+                  <a:spcPct val="100000"/>
+                </a:lnSpc>
+                <a:spcBef>
+                  <a:spcPts val="0"/>
+                </a:spcBef>
+                <a:spcAft>
+                  <a:spcPts val="0"/>
+                </a:spcAft>
+                <a:buClrTx/>
+                <a:buSzTx/>
+                <a:buFontTx/>
+                <a:buNone/>
+                <a:tabLst/>
+                <a:defRPr/>
+              </a:pPr>
+              <a:endParaRPr kumimoji="0" lang="en-US" sz="1800" b="0" i="0" u="none" strike="noStrike" kern="1200" cap="none" spc="0" normalizeH="0" baseline="0" noProof="0" dirty="0">
+                <a:ln>
+                  <a:noFill/>
+                </a:ln>
+                <a:solidFill>
+                  <a:prstClr val="white"/>
+                </a:solidFill>
+                <a:effectLst/>
+                <a:uLnTx/>
+                <a:uFillTx/>
+                <a:latin typeface="Calibri" panose="020F0502020204030204"/>
+                <a:ea typeface="+mn-ea"/>
+                <a:cs typeface="+mn-cs"/>
+              </a:endParaRPr>
+            </a:p>
+          </p:txBody>
+        </p:sp>
+      </p:grpSp>
+      <p:sp>
+        <p:nvSpPr>
+          <p:cNvPr id="8" name="Rectángulo: esquinas redondeadas 7">
+            <a:extLst>
+              <a:ext uri="{FF2B5EF4-FFF2-40B4-BE49-F238E27FC236}">
+                <a16:creationId xmlns:a16="http://schemas.microsoft.com/office/drawing/2014/main" id="{54AB5DF7-9DD5-43DE-AA62-62C9B8346F88}"/>
+              </a:ext>
+            </a:extLst>
+          </p:cNvPr>
+          <p:cNvSpPr/>
+          <p:nvPr/>
+        </p:nvSpPr>
+        <p:spPr>
+          <a:xfrm>
+            <a:off x="1447345" y="1905137"/>
+            <a:ext cx="7572218" cy="782274"/>
+          </a:xfrm>
+          <a:prstGeom prst="roundRect">
+            <a:avLst/>
+          </a:prstGeom>
+          <a:solidFill>
+            <a:schemeClr val="bg1"/>
+          </a:solidFill>
+          <a:ln>
+            <a:noFill/>
+          </a:ln>
+        </p:spPr>
+        <p:style>
+          <a:lnRef idx="2">
+            <a:schemeClr val="accent1">
+              <a:shade val="50000"/>
+            </a:schemeClr>
+          </a:lnRef>
+          <a:fillRef idx="1">
+            <a:schemeClr val="accent1"/>
+          </a:fillRef>
+          <a:effectRef idx="0">
+            <a:schemeClr val="accent1"/>
+          </a:effectRef>
+          <a:fontRef idx="minor">
+            <a:schemeClr val="lt1"/>
+          </a:fontRef>
+        </p:style>
+        <p:txBody>
+          <a:bodyPr rtlCol="0" anchor="ctr"/>
+          <a:lstStyle/>
+          <a:p>
+            <a:pPr algn="ctr"/>
+            <a:r>
+              <a:rPr lang="es-ES" dirty="0">
+                <a:solidFill>
+                  <a:srgbClr val="001C54"/>
+                </a:solidFill>
+              </a:rPr>
+              <a:t>Un modelo ARMA debe ser estacionario, para esto hay que controlar que la varianza sea constante y confirmar que nuestra serie se hace constante en media aplicando la diferenciación</a:t>
+            </a:r>
+            <a:endParaRPr lang="en-US" dirty="0">
+              <a:solidFill>
+                <a:srgbClr val="001C54"/>
+              </a:solidFill>
+            </a:endParaRPr>
+          </a:p>
+        </p:txBody>
+      </p:sp>
+      <p:sp>
+        <p:nvSpPr>
+          <p:cNvPr id="9" name="Rectángulo: esquinas redondeadas 8">
+            <a:extLst>
+              <a:ext uri="{FF2B5EF4-FFF2-40B4-BE49-F238E27FC236}">
+                <a16:creationId xmlns:a16="http://schemas.microsoft.com/office/drawing/2014/main" id="{A7BCDD0E-7D56-4C55-81E9-1A69CE6FD986}"/>
+              </a:ext>
+            </a:extLst>
+          </p:cNvPr>
+          <p:cNvSpPr/>
+          <p:nvPr/>
+        </p:nvSpPr>
+        <p:spPr>
+          <a:xfrm>
+            <a:off x="2297911" y="3892690"/>
+            <a:ext cx="6481649" cy="782274"/>
+          </a:xfrm>
+          <a:prstGeom prst="roundRect">
+            <a:avLst/>
+          </a:prstGeom>
+          <a:solidFill>
+            <a:schemeClr val="bg1"/>
+          </a:solidFill>
+          <a:ln>
+            <a:noFill/>
+          </a:ln>
+        </p:spPr>
+        <p:style>
+          <a:lnRef idx="2">
+            <a:schemeClr val="accent1">
+              <a:shade val="50000"/>
+            </a:schemeClr>
+          </a:lnRef>
+          <a:fillRef idx="1">
+            <a:schemeClr val="accent1"/>
+          </a:fillRef>
+          <a:effectRef idx="0">
+            <a:schemeClr val="accent1"/>
+          </a:effectRef>
+          <a:fontRef idx="minor">
+            <a:schemeClr val="lt1"/>
+          </a:fontRef>
+        </p:style>
+        <p:txBody>
+          <a:bodyPr rtlCol="0" anchor="ctr"/>
+          <a:lstStyle/>
+          <a:p>
+            <a:pPr algn="ctr"/>
+            <a:r>
+              <a:rPr lang="es-ES" dirty="0">
+                <a:solidFill>
+                  <a:srgbClr val="001C54"/>
+                </a:solidFill>
+              </a:rPr>
+              <a:t>Los regresores que se agreguen al modelo también tienen que ser estacionarios. </a:t>
+            </a:r>
+            <a:endParaRPr lang="en-US" dirty="0">
+              <a:solidFill>
+                <a:srgbClr val="001C54"/>
+              </a:solidFill>
+            </a:endParaRPr>
+          </a:p>
+        </p:txBody>
+      </p:sp>
+      <p:grpSp>
+        <p:nvGrpSpPr>
+          <p:cNvPr id="10" name="Grupo 9">
+            <a:extLst>
+              <a:ext uri="{FF2B5EF4-FFF2-40B4-BE49-F238E27FC236}">
+                <a16:creationId xmlns:a16="http://schemas.microsoft.com/office/drawing/2014/main" id="{529A8FF6-BB04-490E-897D-B0EF2BC2EF06}"/>
+              </a:ext>
+            </a:extLst>
+          </p:cNvPr>
+          <p:cNvGrpSpPr/>
+          <p:nvPr/>
+        </p:nvGrpSpPr>
+        <p:grpSpPr>
+          <a:xfrm>
+            <a:off x="1171476" y="3753740"/>
+            <a:ext cx="1126435" cy="1060174"/>
+            <a:chOff x="302734" y="1766187"/>
+            <a:chExt cx="1126435" cy="1060174"/>
+          </a:xfrm>
+          <a:solidFill>
+            <a:srgbClr val="001C54"/>
+          </a:solidFill>
+        </p:grpSpPr>
+        <p:sp>
+          <p:nvSpPr>
+            <p:cNvPr id="11" name="Elipse 10">
+              <a:extLst>
+                <a:ext uri="{FF2B5EF4-FFF2-40B4-BE49-F238E27FC236}">
+                  <a16:creationId xmlns:a16="http://schemas.microsoft.com/office/drawing/2014/main" id="{F8980C08-89B1-489C-9023-A6AF2D05C53F}"/>
+                </a:ext>
+              </a:extLst>
+            </p:cNvPr>
+            <p:cNvSpPr/>
+            <p:nvPr/>
+          </p:nvSpPr>
+          <p:spPr>
+            <a:xfrm>
+              <a:off x="302734" y="1766187"/>
+              <a:ext cx="1126435" cy="1060174"/>
+            </a:xfrm>
+            <a:prstGeom prst="ellipse">
+              <a:avLst/>
+            </a:prstGeom>
+            <a:grpFill/>
+            <a:ln>
+              <a:noFill/>
+            </a:ln>
+          </p:spPr>
+          <p:style>
+            <a:lnRef idx="2">
+              <a:schemeClr val="accent1">
+                <a:shade val="50000"/>
+              </a:schemeClr>
+            </a:lnRef>
+            <a:fillRef idx="1">
+              <a:schemeClr val="accent1"/>
+            </a:fillRef>
+            <a:effectRef idx="0">
+              <a:schemeClr val="accent1"/>
+            </a:effectRef>
+            <a:fontRef idx="minor">
+              <a:schemeClr val="lt1"/>
+            </a:fontRef>
+          </p:style>
+          <p:txBody>
+            <a:bodyPr rtlCol="0" anchor="ctr"/>
+            <a:lstStyle/>
+            <a:p>
+              <a:pPr algn="ctr"/>
+              <a:endParaRPr lang="en-US"/>
+            </a:p>
+          </p:txBody>
+        </p:sp>
+        <p:sp>
+          <p:nvSpPr>
+            <p:cNvPr id="12" name="Caution" descr="{&quot;Key&quot;:&quot;POWER_USER_SHAPE_ICON&quot;,&quot;Value&quot;:&quot;POWER_USER_SHAPE_ICON_STYLE_1&quot;}">
+              <a:extLst>
+                <a:ext uri="{FF2B5EF4-FFF2-40B4-BE49-F238E27FC236}">
+                  <a16:creationId xmlns:a16="http://schemas.microsoft.com/office/drawing/2014/main" id="{58BE784A-00C3-40A0-89E9-DEA55E10EE90}"/>
+                </a:ext>
+              </a:extLst>
+            </p:cNvPr>
+            <p:cNvSpPr>
+              <a:spLocks noChangeAspect="1"/>
+            </p:cNvSpPr>
+            <p:nvPr/>
+          </p:nvSpPr>
+          <p:spPr>
+            <a:xfrm>
+              <a:off x="541683" y="1974476"/>
+              <a:ext cx="629793" cy="542925"/>
+            </a:xfrm>
+            <a:custGeom>
+              <a:avLst/>
+              <a:gdLst>
+                <a:gd name="connsiteX0" fmla="*/ 957551 w 1915105"/>
+                <a:gd name="connsiteY0" fmla="*/ 1312007 h 1650953"/>
+                <a:gd name="connsiteX1" fmla="*/ 1058240 w 1915105"/>
+                <a:gd name="connsiteY1" fmla="*/ 1412696 h 1650953"/>
+                <a:gd name="connsiteX2" fmla="*/ 957551 w 1915105"/>
+                <a:gd name="connsiteY2" fmla="*/ 1513385 h 1650953"/>
+                <a:gd name="connsiteX3" fmla="*/ 856862 w 1915105"/>
+                <a:gd name="connsiteY3" fmla="*/ 1412696 h 1650953"/>
+                <a:gd name="connsiteX4" fmla="*/ 957551 w 1915105"/>
+                <a:gd name="connsiteY4" fmla="*/ 1312007 h 1650953"/>
+                <a:gd name="connsiteX5" fmla="*/ 957553 w 1915105"/>
+                <a:gd name="connsiteY5" fmla="*/ 439775 h 1650953"/>
+                <a:gd name="connsiteX6" fmla="*/ 1026486 w 1915105"/>
+                <a:gd name="connsiteY6" fmla="*/ 508708 h 1650953"/>
+                <a:gd name="connsiteX7" fmla="*/ 1026485 w 1915105"/>
+                <a:gd name="connsiteY7" fmla="*/ 1135578 h 1650953"/>
+                <a:gd name="connsiteX8" fmla="*/ 957552 w 1915105"/>
+                <a:gd name="connsiteY8" fmla="*/ 1204511 h 1650953"/>
+                <a:gd name="connsiteX9" fmla="*/ 957553 w 1915105"/>
+                <a:gd name="connsiteY9" fmla="*/ 1204510 h 1650953"/>
+                <a:gd name="connsiteX10" fmla="*/ 888620 w 1915105"/>
+                <a:gd name="connsiteY10" fmla="*/ 1135577 h 1650953"/>
+                <a:gd name="connsiteX11" fmla="*/ 888620 w 1915105"/>
+                <a:gd name="connsiteY11" fmla="*/ 508708 h 1650953"/>
+                <a:gd name="connsiteX12" fmla="*/ 957553 w 1915105"/>
+                <a:gd name="connsiteY12" fmla="*/ 439775 h 1650953"/>
+                <a:gd name="connsiteX13" fmla="*/ 957553 w 1915105"/>
+                <a:gd name="connsiteY13" fmla="*/ 100443 h 1650953"/>
+                <a:gd name="connsiteX14" fmla="*/ 87050 w 1915105"/>
+                <a:gd name="connsiteY14" fmla="*/ 1601309 h 1650953"/>
+                <a:gd name="connsiteX15" fmla="*/ 1828055 w 1915105"/>
+                <a:gd name="connsiteY15" fmla="*/ 1601309 h 1650953"/>
+                <a:gd name="connsiteX16" fmla="*/ 957553 w 1915105"/>
+                <a:gd name="connsiteY16" fmla="*/ 0 h 1650953"/>
+                <a:gd name="connsiteX17" fmla="*/ 1915105 w 1915105"/>
+                <a:gd name="connsiteY17" fmla="*/ 1650953 h 1650953"/>
+                <a:gd name="connsiteX18" fmla="*/ 0 w 1915105"/>
+                <a:gd name="connsiteY18" fmla="*/ 1650953 h 1650953"/>
+              </a:gdLst>
+              <a:ahLst/>
+              <a:cxnLst>
+                <a:cxn ang="0">
+                  <a:pos x="connsiteX0" y="connsiteY0"/>
+                </a:cxn>
+                <a:cxn ang="0">
+                  <a:pos x="connsiteX1" y="connsiteY1"/>
+                </a:cxn>
+                <a:cxn ang="0">
+                  <a:pos x="connsiteX2" y="connsiteY2"/>
+                </a:cxn>
+                <a:cxn ang="0">
+                  <a:pos x="connsiteX3" y="connsiteY3"/>
+                </a:cxn>
+                <a:cxn ang="0">
+                  <a:pos x="connsiteX4" y="connsiteY4"/>
+                </a:cxn>
+                <a:cxn ang="0">
+                  <a:pos x="connsiteX5" y="connsiteY5"/>
+                </a:cxn>
+                <a:cxn ang="0">
+                  <a:pos x="connsiteX6" y="connsiteY6"/>
+                </a:cxn>
+                <a:cxn ang="0">
+                  <a:pos x="connsiteX7" y="connsiteY7"/>
+                </a:cxn>
+                <a:cxn ang="0">
+                  <a:pos x="connsiteX8" y="connsiteY8"/>
+                </a:cxn>
+                <a:cxn ang="0">
+                  <a:pos x="connsiteX9" y="connsiteY9"/>
+                </a:cxn>
+                <a:cxn ang="0">
+                  <a:pos x="connsiteX10" y="connsiteY10"/>
+                </a:cxn>
+                <a:cxn ang="0">
+                  <a:pos x="connsiteX11" y="connsiteY11"/>
+                </a:cxn>
+                <a:cxn ang="0">
+                  <a:pos x="connsiteX12" y="connsiteY12"/>
+                </a:cxn>
+                <a:cxn ang="0">
+                  <a:pos x="connsiteX13" y="connsiteY13"/>
+                </a:cxn>
+                <a:cxn ang="0">
+                  <a:pos x="connsiteX14" y="connsiteY14"/>
+                </a:cxn>
+                <a:cxn ang="0">
+                  <a:pos x="connsiteX15" y="connsiteY15"/>
+                </a:cxn>
+                <a:cxn ang="0">
+                  <a:pos x="connsiteX16" y="connsiteY16"/>
+                </a:cxn>
+                <a:cxn ang="0">
+                  <a:pos x="connsiteX17" y="connsiteY17"/>
+                </a:cxn>
+                <a:cxn ang="0">
+                  <a:pos x="connsiteX18" y="connsiteY18"/>
+                </a:cxn>
+              </a:cxnLst>
+              <a:rect l="l" t="t" r="r" b="b"/>
+              <a:pathLst>
+                <a:path w="1915105" h="1650953">
+                  <a:moveTo>
+                    <a:pt x="957551" y="1312007"/>
+                  </a:moveTo>
+                  <a:cubicBezTo>
+                    <a:pt x="1013160" y="1312007"/>
+                    <a:pt x="1058240" y="1357087"/>
+                    <a:pt x="1058240" y="1412696"/>
+                  </a:cubicBezTo>
+                  <a:cubicBezTo>
+                    <a:pt x="1058240" y="1468305"/>
+                    <a:pt x="1013160" y="1513385"/>
+                    <a:pt x="957551" y="1513385"/>
+                  </a:cubicBezTo>
+                  <a:cubicBezTo>
+                    <a:pt x="901942" y="1513385"/>
+                    <a:pt x="856862" y="1468305"/>
+                    <a:pt x="856862" y="1412696"/>
+                  </a:cubicBezTo>
+                  <a:cubicBezTo>
+                    <a:pt x="856862" y="1357087"/>
+                    <a:pt x="901942" y="1312007"/>
+                    <a:pt x="957551" y="1312007"/>
+                  </a:cubicBezTo>
+                  <a:close/>
+                  <a:moveTo>
+                    <a:pt x="957553" y="439775"/>
+                  </a:moveTo>
+                  <a:cubicBezTo>
+                    <a:pt x="995624" y="439775"/>
+                    <a:pt x="1026486" y="470637"/>
+                    <a:pt x="1026486" y="508708"/>
+                  </a:cubicBezTo>
+                  <a:cubicBezTo>
+                    <a:pt x="1026486" y="717665"/>
+                    <a:pt x="1026485" y="926621"/>
+                    <a:pt x="1026485" y="1135578"/>
+                  </a:cubicBezTo>
+                  <a:cubicBezTo>
+                    <a:pt x="1026485" y="1173649"/>
+                    <a:pt x="995623" y="1204511"/>
+                    <a:pt x="957552" y="1204511"/>
+                  </a:cubicBezTo>
+                  <a:lnTo>
+                    <a:pt x="957553" y="1204510"/>
+                  </a:lnTo>
+                  <a:cubicBezTo>
+                    <a:pt x="919482" y="1204510"/>
+                    <a:pt x="888620" y="1173648"/>
+                    <a:pt x="888620" y="1135577"/>
+                  </a:cubicBezTo>
+                  <a:lnTo>
+                    <a:pt x="888620" y="508708"/>
+                  </a:lnTo>
+                  <a:cubicBezTo>
+                    <a:pt x="888620" y="470637"/>
+                    <a:pt x="919482" y="439775"/>
+                    <a:pt x="957553" y="439775"/>
+                  </a:cubicBezTo>
+                  <a:close/>
+                  <a:moveTo>
+                    <a:pt x="957553" y="100443"/>
+                  </a:moveTo>
+                  <a:lnTo>
+                    <a:pt x="87050" y="1601309"/>
+                  </a:lnTo>
+                  <a:lnTo>
+                    <a:pt x="1828055" y="1601309"/>
+                  </a:lnTo>
+                  <a:close/>
+                  <a:moveTo>
+                    <a:pt x="957553" y="0"/>
+                  </a:moveTo>
+                  <a:lnTo>
+                    <a:pt x="1915105" y="1650953"/>
+                  </a:lnTo>
+                  <a:lnTo>
+                    <a:pt x="0" y="1650953"/>
+                  </a:lnTo>
+                  <a:close/>
+                </a:path>
+              </a:pathLst>
+            </a:custGeom>
+            <a:solidFill>
+              <a:schemeClr val="bg1"/>
+            </a:solidFill>
+            <a:ln>
+              <a:solidFill>
+                <a:schemeClr val="bg1"/>
+              </a:solidFill>
+            </a:ln>
+          </p:spPr>
+          <p:style>
+            <a:lnRef idx="2">
+              <a:schemeClr val="accent1">
+                <a:shade val="50000"/>
+              </a:schemeClr>
+            </a:lnRef>
+            <a:fillRef idx="1">
+              <a:schemeClr val="accent1"/>
+            </a:fillRef>
+            <a:effectRef idx="0">
+              <a:schemeClr val="accent1"/>
+            </a:effectRef>
+            <a:fontRef idx="minor">
+              <a:schemeClr val="lt1"/>
+            </a:fontRef>
+          </p:style>
+          <p:txBody>
+            <a:bodyPr rtlCol="0" anchor="ctr"/>
+            <a:lstStyle/>
+            <a:p>
+              <a:pPr marL="0" marR="0" lvl="0" indent="0" algn="ctr" defTabSz="914400" rtl="0" eaLnBrk="1" fontAlgn="auto" latinLnBrk="0" hangingPunct="1">
+                <a:lnSpc>
+                  <a:spcPct val="100000"/>
+                </a:lnSpc>
+                <a:spcBef>
+                  <a:spcPts val="0"/>
+                </a:spcBef>
+                <a:spcAft>
+                  <a:spcPts val="0"/>
+                </a:spcAft>
+                <a:buClrTx/>
+                <a:buSzTx/>
+                <a:buFontTx/>
+                <a:buNone/>
+                <a:tabLst/>
+                <a:defRPr/>
+              </a:pPr>
+              <a:endParaRPr kumimoji="0" lang="en-US" sz="1800" b="0" i="0" u="none" strike="noStrike" kern="1200" cap="none" spc="0" normalizeH="0" baseline="0" noProof="0" dirty="0">
+                <a:ln>
+                  <a:noFill/>
+                </a:ln>
+                <a:solidFill>
+                  <a:prstClr val="white"/>
+                </a:solidFill>
+                <a:effectLst/>
+                <a:uLnTx/>
+                <a:uFillTx/>
+                <a:latin typeface="Calibri" panose="020F0502020204030204"/>
+                <a:ea typeface="+mn-ea"/>
+                <a:cs typeface="+mn-cs"/>
+              </a:endParaRPr>
+            </a:p>
+          </p:txBody>
+        </p:sp>
+      </p:grpSp>
+    </p:spTree>
+    <p:extLst>
+      <p:ext uri="{BB962C8B-B14F-4D97-AF65-F5344CB8AC3E}">
+        <p14:creationId xmlns:p14="http://schemas.microsoft.com/office/powerpoint/2010/main" val="345219961"/>
+      </p:ext>
+    </p:extLst>
+  </p:cSld>
+  <p:clrMapOvr>
+    <a:masterClrMapping/>
+  </p:clrMapOvr>
+  <p:timing>
+    <p:tnLst>
+      <p:par>
+        <p:cTn id="1" dur="indefinite" restart="never" nodeType="tmRoot">
+          <p:childTnLst>
+            <p:seq concurrent="1" nextAc="seek">
+              <p:cTn id="2" dur="indefinite" nodeType="mainSeq">
+                <p:childTnLst>
+                  <p:par>
+                    <p:cTn id="3" fill="hold">
+                      <p:stCondLst>
+                        <p:cond delay="indefinite"/>
+                      </p:stCondLst>
+                      <p:childTnLst>
+                        <p:par>
+                          <p:cTn id="4" fill="hold">
+                            <p:stCondLst>
+                              <p:cond delay="0"/>
+                            </p:stCondLst>
+                            <p:childTnLst>
+                              <p:par>
+                                <p:cTn id="5" presetID="1" presetClass="entr" presetSubtype="0" fill="hold" nodeType="clickEffect">
+                                  <p:stCondLst>
+                                    <p:cond delay="0"/>
+                                  </p:stCondLst>
+                                  <p:childTnLst>
+                                    <p:set>
+                                      <p:cBhvr>
+                                        <p:cTn id="6" dur="1" fill="hold">
+                                          <p:stCondLst>
+                                            <p:cond delay="0"/>
+                                          </p:stCondLst>
+                                        </p:cTn>
+                                        <p:tgtEl>
+                                          <p:spTgt spid="10"/>
+                                        </p:tgtEl>
+                                        <p:attrNameLst>
+                                          <p:attrName>style.visibility</p:attrName>
+                                        </p:attrNameLst>
+                                      </p:cBhvr>
+                                      <p:to>
+                                        <p:strVal val="visible"/>
+                                      </p:to>
+                                    </p:set>
+                                  </p:childTnLst>
+                                </p:cTn>
+                              </p:par>
+                              <p:par>
+                                <p:cTn id="7" presetID="1" presetClass="entr" presetSubtype="0" fill="hold" grpId="0" nodeType="withEffect">
+                                  <p:stCondLst>
+                                    <p:cond delay="0"/>
+                                  </p:stCondLst>
+                                  <p:childTnLst>
+                                    <p:set>
+                                      <p:cBhvr>
+                                        <p:cTn id="8" dur="1" fill="hold">
+                                          <p:stCondLst>
+                                            <p:cond delay="0"/>
+                                          </p:stCondLst>
+                                        </p:cTn>
+                                        <p:tgtEl>
+                                          <p:spTgt spid="9"/>
+                                        </p:tgtEl>
+                                        <p:attrNameLst>
+                                          <p:attrName>style.visibility</p:attrName>
+                                        </p:attrNameLst>
+                                      </p:cBhvr>
+                                      <p:to>
+                                        <p:strVal val="visible"/>
+                                      </p:to>
+                                    </p:set>
+                                  </p:childTnLst>
+                                </p:cTn>
+                              </p:par>
+                            </p:childTnLst>
+                          </p:cTn>
+                        </p:par>
+                      </p:childTnLst>
+                    </p:cTn>
+                  </p:par>
+                </p:childTnLst>
+              </p:cTn>
+              <p:prevCondLst>
+                <p:cond evt="onPrev" delay="0">
+                  <p:tgtEl>
+                    <p:sldTgt/>
+                  </p:tgtEl>
+                </p:cond>
+              </p:prevCondLst>
+              <p:nextCondLst>
+                <p:cond evt="onNext" delay="0">
+                  <p:tgtEl>
+                    <p:sldTgt/>
+                  </p:tgtEl>
+                </p:cond>
+              </p:nextCondLst>
+            </p:seq>
+          </p:childTnLst>
+        </p:cTn>
+      </p:par>
+    </p:tnLst>
+    <p:bldLst>
+      <p:bldP spid="9" grpId="0" animBg="1"/>
+    </p:bldLst>
+  </p:timing>
+</p:sld>
+</file>
+
+<file path=ppt/slides/slide26.xml><?xml version="1.0" encoding="utf-8"?>
+<p:sld xmlns:a="http://schemas.openxmlformats.org/drawingml/2006/main" xmlns:r="http://schemas.openxmlformats.org/officeDocument/2006/relationships" xmlns:p="http://schemas.openxmlformats.org/presentationml/2006/main">
+  <p:cSld>
+    <p:spTree>
+      <p:nvGrpSpPr>
+        <p:cNvPr id="1" name=""/>
+        <p:cNvGrpSpPr/>
+        <p:nvPr/>
+      </p:nvGrpSpPr>
+      <p:grpSpPr>
+        <a:xfrm>
+          <a:off x="0" y="0"/>
+          <a:ext cx="0" cy="0"/>
+          <a:chOff x="0" y="0"/>
+          <a:chExt cx="0" cy="0"/>
+        </a:xfrm>
+      </p:grpSpPr>
+      <p:sp>
+        <p:nvSpPr>
+          <p:cNvPr id="4" name="CuadroTexto 3">
+            <a:extLst>
+              <a:ext uri="{FF2B5EF4-FFF2-40B4-BE49-F238E27FC236}">
                 <a16:creationId xmlns:a16="http://schemas.microsoft.com/office/drawing/2014/main" id="{E9C6E1A9-B79E-4CCE-AF4A-B1AE56534C4B}"/>
               </a:ext>
             </a:extLst>
@@ -18803,8 +19792,8 @@
         </p:nvSpPr>
         <p:spPr>
           <a:xfrm>
-            <a:off x="2206303" y="5020770"/>
-            <a:ext cx="8716162" cy="261610"/>
+            <a:off x="2197914" y="6592260"/>
+            <a:ext cx="8716162" cy="230832"/>
           </a:xfrm>
           <a:prstGeom prst="rect">
             <a:avLst/>
@@ -18818,7 +19807,7 @@
           <a:lstStyle/>
           <a:p>
             <a:r>
-              <a:rPr lang="es-ES" sz="1100" dirty="0">
+              <a:rPr lang="es-ES" sz="900" dirty="0">
                 <a:solidFill>
                   <a:schemeClr val="accent2">
                     <a:lumMod val="50000"/>
@@ -18827,7 +19816,7 @@
               </a:rPr>
               <a:t>Fuente: https://towardsdatascience.com/time-series-forecasting-in-real-life-budget-forecasting-with-arima-d5ec57e634cb</a:t>
             </a:r>
-            <a:endParaRPr lang="en-US" sz="1100" dirty="0">
+            <a:endParaRPr lang="en-US" sz="900" dirty="0">
               <a:solidFill>
                 <a:schemeClr val="accent2">
                   <a:lumMod val="50000"/>
@@ -18853,7 +19842,7 @@
         </p:nvSpPr>
         <p:spPr bwMode="auto">
           <a:xfrm>
-            <a:off x="587229" y="5559892"/>
+            <a:off x="570451" y="5329752"/>
             <a:ext cx="9689284" cy="784830"/>
           </a:xfrm>
           <a:prstGeom prst="rect">
@@ -20504,7 +21493,1174 @@
 </p:sld>
 </file>
 
-<file path=ppt/slides/slide26.xml><?xml version="1.0" encoding="utf-8"?>
+<file path=ppt/slides/slide27.xml><?xml version="1.0" encoding="utf-8"?>
+<p:sld xmlns:a="http://schemas.openxmlformats.org/drawingml/2006/main" xmlns:r="http://schemas.openxmlformats.org/officeDocument/2006/relationships" xmlns:p="http://schemas.openxmlformats.org/presentationml/2006/main">
+  <p:cSld>
+    <p:spTree>
+      <p:nvGrpSpPr>
+        <p:cNvPr id="1" name=""/>
+        <p:cNvGrpSpPr/>
+        <p:nvPr/>
+      </p:nvGrpSpPr>
+      <p:grpSpPr>
+        <a:xfrm>
+          <a:off x="0" y="0"/>
+          <a:ext cx="0" cy="0"/>
+          <a:chOff x="0" y="0"/>
+          <a:chExt cx="0" cy="0"/>
+        </a:xfrm>
+      </p:grpSpPr>
+      <p:sp>
+        <p:nvSpPr>
+          <p:cNvPr id="4" name="CuadroTexto 3">
+            <a:extLst>
+              <a:ext uri="{FF2B5EF4-FFF2-40B4-BE49-F238E27FC236}">
+                <a16:creationId xmlns:a16="http://schemas.microsoft.com/office/drawing/2014/main" id="{E9C6E1A9-B79E-4CCE-AF4A-B1AE56534C4B}"/>
+              </a:ext>
+            </a:extLst>
+          </p:cNvPr>
+          <p:cNvSpPr txBox="1"/>
+          <p:nvPr/>
+        </p:nvSpPr>
+        <p:spPr>
+          <a:xfrm>
+            <a:off x="5729681" y="304358"/>
+            <a:ext cx="6579765" cy="584775"/>
+          </a:xfrm>
+          <a:prstGeom prst="rect">
+            <a:avLst/>
+          </a:prstGeom>
+          <a:noFill/>
+        </p:spPr>
+        <p:txBody>
+          <a:bodyPr wrap="square" rtlCol="0">
+            <a:spAutoFit/>
+          </a:bodyPr>
+          <a:lstStyle/>
+          <a:p>
+            <a:pPr algn="ctr"/>
+            <a:r>
+              <a:rPr lang="es-ES" sz="3200" dirty="0"/>
+              <a:t>Modelo </a:t>
+            </a:r>
+            <a:r>
+              <a:rPr lang="es-ES" sz="3200" dirty="0" err="1"/>
+              <a:t>Prophet</a:t>
+            </a:r>
+            <a:endParaRPr lang="es-ES" sz="3200" dirty="0"/>
+          </a:p>
+        </p:txBody>
+      </p:sp>
+      <p:sp>
+        <p:nvSpPr>
+          <p:cNvPr id="16" name="CuadroTexto 15">
+            <a:extLst>
+              <a:ext uri="{FF2B5EF4-FFF2-40B4-BE49-F238E27FC236}">
+                <a16:creationId xmlns:a16="http://schemas.microsoft.com/office/drawing/2014/main" id="{A6EE8BBB-37F5-4824-BB6E-0752751CB940}"/>
+              </a:ext>
+            </a:extLst>
+          </p:cNvPr>
+          <p:cNvSpPr txBox="1"/>
+          <p:nvPr/>
+        </p:nvSpPr>
+        <p:spPr>
+          <a:xfrm>
+            <a:off x="1169874" y="6416068"/>
+            <a:ext cx="4217780" cy="369332"/>
+          </a:xfrm>
+          <a:prstGeom prst="rect">
+            <a:avLst/>
+          </a:prstGeom>
+          <a:noFill/>
+        </p:spPr>
+        <p:txBody>
+          <a:bodyPr wrap="square">
+            <a:spAutoFit/>
+          </a:bodyPr>
+          <a:lstStyle/>
+          <a:p>
+            <a:r>
+              <a:rPr lang="en-US" dirty="0"/>
+              <a:t>https://facebook.github.io/prophet/</a:t>
+            </a:r>
+          </a:p>
+        </p:txBody>
+      </p:sp>
+      <mc:AlternateContent xmlns:mc="http://schemas.openxmlformats.org/markup-compatibility/2006">
+        <mc:Choice xmlns:a14="http://schemas.microsoft.com/office/drawing/2010/main" Requires="a14">
+          <p:sp>
+            <p:nvSpPr>
+              <p:cNvPr id="2" name="CuadroTexto 1">
+                <a:extLst>
+                  <a:ext uri="{FF2B5EF4-FFF2-40B4-BE49-F238E27FC236}">
+                    <a16:creationId xmlns:a16="http://schemas.microsoft.com/office/drawing/2014/main" id="{578383B6-D5BF-4AD6-BA88-5E327FA47896}"/>
+                  </a:ext>
+                </a:extLst>
+              </p:cNvPr>
+              <p:cNvSpPr txBox="1"/>
+              <p:nvPr/>
+            </p:nvSpPr>
+            <p:spPr>
+              <a:xfrm>
+                <a:off x="3541667" y="1198325"/>
+                <a:ext cx="3691973" cy="276999"/>
+              </a:xfrm>
+              <a:prstGeom prst="rect">
+                <a:avLst/>
+              </a:prstGeom>
+              <a:noFill/>
+            </p:spPr>
+            <p:txBody>
+              <a:bodyPr wrap="none" lIns="0" tIns="0" rIns="0" bIns="0" rtlCol="0">
+                <a:spAutoFit/>
+              </a:bodyPr>
+              <a:lstStyle/>
+              <a:p>
+                <a14:m>
+                  <m:oMathPara xmlns:m="http://schemas.openxmlformats.org/officeDocument/2006/math">
+                    <m:oMathParaPr>
+                      <m:jc m:val="centerGroup"/>
+                    </m:oMathParaPr>
+                    <m:oMath xmlns:m="http://schemas.openxmlformats.org/officeDocument/2006/math">
+                      <m:r>
+                        <a:rPr lang="en-US" i="1">
+                          <a:latin typeface="Cambria Math" panose="02040503050406030204" pitchFamily="18" charset="0"/>
+                        </a:rPr>
+                        <m:t>𝑦</m:t>
+                      </m:r>
+                      <m:r>
+                        <a:rPr lang="en-US" i="1">
+                          <a:latin typeface="Cambria Math" panose="02040503050406030204" pitchFamily="18" charset="0"/>
+                        </a:rPr>
+                        <m:t>(</m:t>
+                      </m:r>
+                      <m:r>
+                        <a:rPr lang="en-US" i="1">
+                          <a:latin typeface="Cambria Math" panose="02040503050406030204" pitchFamily="18" charset="0"/>
+                        </a:rPr>
+                        <m:t>𝑡</m:t>
+                      </m:r>
+                      <m:r>
+                        <a:rPr lang="en-US" i="1">
+                          <a:latin typeface="Cambria Math" panose="02040503050406030204" pitchFamily="18" charset="0"/>
+                        </a:rPr>
+                        <m:t>) = </m:t>
+                      </m:r>
+                      <m:r>
+                        <a:rPr lang="en-US" i="1">
+                          <a:latin typeface="Cambria Math" panose="02040503050406030204" pitchFamily="18" charset="0"/>
+                        </a:rPr>
+                        <m:t>𝑔</m:t>
+                      </m:r>
+                      <m:r>
+                        <a:rPr lang="en-US" i="1">
+                          <a:latin typeface="Cambria Math" panose="02040503050406030204" pitchFamily="18" charset="0"/>
+                        </a:rPr>
+                        <m:t>(</m:t>
+                      </m:r>
+                      <m:r>
+                        <a:rPr lang="en-US" i="1">
+                          <a:latin typeface="Cambria Math" panose="02040503050406030204" pitchFamily="18" charset="0"/>
+                        </a:rPr>
+                        <m:t>𝑡</m:t>
+                      </m:r>
+                      <m:r>
+                        <a:rPr lang="en-US" i="1">
+                          <a:latin typeface="Cambria Math" panose="02040503050406030204" pitchFamily="18" charset="0"/>
+                        </a:rPr>
+                        <m:t>) + </m:t>
+                      </m:r>
+                      <m:r>
+                        <a:rPr lang="en-US" i="1" smtClean="0">
+                          <a:solidFill>
+                            <a:srgbClr val="C00000"/>
+                          </a:solidFill>
+                          <a:latin typeface="Cambria Math" panose="02040503050406030204" pitchFamily="18" charset="0"/>
+                        </a:rPr>
+                        <m:t>𝑠</m:t>
+                      </m:r>
+                      <m:r>
+                        <a:rPr lang="en-US" i="1" smtClean="0">
+                          <a:solidFill>
+                            <a:srgbClr val="C00000"/>
+                          </a:solidFill>
+                          <a:latin typeface="Cambria Math" panose="02040503050406030204" pitchFamily="18" charset="0"/>
+                        </a:rPr>
+                        <m:t>(</m:t>
+                      </m:r>
+                      <m:r>
+                        <a:rPr lang="en-US" i="1" smtClean="0">
+                          <a:solidFill>
+                            <a:srgbClr val="C00000"/>
+                          </a:solidFill>
+                          <a:latin typeface="Cambria Math" panose="02040503050406030204" pitchFamily="18" charset="0"/>
+                        </a:rPr>
+                        <m:t>𝑡</m:t>
+                      </m:r>
+                      <m:r>
+                        <a:rPr lang="en-US" i="1" smtClean="0">
+                          <a:solidFill>
+                            <a:srgbClr val="C00000"/>
+                          </a:solidFill>
+                          <a:latin typeface="Cambria Math" panose="02040503050406030204" pitchFamily="18" charset="0"/>
+                        </a:rPr>
+                        <m:t>) + </m:t>
+                      </m:r>
+                      <m:r>
+                        <a:rPr lang="en-US" i="1" smtClean="0">
+                          <a:solidFill>
+                            <a:schemeClr val="accent6">
+                              <a:lumMod val="50000"/>
+                            </a:schemeClr>
+                          </a:solidFill>
+                          <a:latin typeface="Cambria Math" panose="02040503050406030204" pitchFamily="18" charset="0"/>
+                        </a:rPr>
+                        <m:t>h</m:t>
+                      </m:r>
+                      <m:r>
+                        <a:rPr lang="en-US" i="1" smtClean="0">
+                          <a:solidFill>
+                            <a:schemeClr val="accent6">
+                              <a:lumMod val="50000"/>
+                            </a:schemeClr>
+                          </a:solidFill>
+                          <a:latin typeface="Cambria Math" panose="02040503050406030204" pitchFamily="18" charset="0"/>
+                        </a:rPr>
+                        <m:t>(</m:t>
+                      </m:r>
+                      <m:r>
+                        <a:rPr lang="en-US" i="1" smtClean="0">
+                          <a:solidFill>
+                            <a:schemeClr val="accent6">
+                              <a:lumMod val="50000"/>
+                            </a:schemeClr>
+                          </a:solidFill>
+                          <a:latin typeface="Cambria Math" panose="02040503050406030204" pitchFamily="18" charset="0"/>
+                        </a:rPr>
+                        <m:t>𝑡</m:t>
+                      </m:r>
+                      <m:r>
+                        <a:rPr lang="en-US" i="1" smtClean="0">
+                          <a:solidFill>
+                            <a:schemeClr val="accent6">
+                              <a:lumMod val="50000"/>
+                            </a:schemeClr>
+                          </a:solidFill>
+                          <a:latin typeface="Cambria Math" panose="02040503050406030204" pitchFamily="18" charset="0"/>
+                        </a:rPr>
+                        <m:t>) + </m:t>
+                      </m:r>
+                      <m:r>
+                        <a:rPr lang="en-US" i="1" smtClean="0">
+                          <a:solidFill>
+                            <a:srgbClr val="CC7832"/>
+                          </a:solidFill>
+                          <a:latin typeface="Cambria Math" panose="02040503050406030204" pitchFamily="18" charset="0"/>
+                        </a:rPr>
+                        <m:t>𝑒</m:t>
+                      </m:r>
+                      <m:r>
+                        <a:rPr lang="en-US" i="1" smtClean="0">
+                          <a:solidFill>
+                            <a:srgbClr val="CC7832"/>
+                          </a:solidFill>
+                          <a:latin typeface="Cambria Math" panose="02040503050406030204" pitchFamily="18" charset="0"/>
+                        </a:rPr>
+                        <m:t>(</m:t>
+                      </m:r>
+                      <m:r>
+                        <a:rPr lang="en-US" i="1" smtClean="0">
+                          <a:solidFill>
+                            <a:srgbClr val="CC7832"/>
+                          </a:solidFill>
+                          <a:latin typeface="Cambria Math" panose="02040503050406030204" pitchFamily="18" charset="0"/>
+                        </a:rPr>
+                        <m:t>𝑡</m:t>
+                      </m:r>
+                      <m:r>
+                        <a:rPr lang="en-US" i="1" smtClean="0">
+                          <a:solidFill>
+                            <a:srgbClr val="CC7832"/>
+                          </a:solidFill>
+                          <a:latin typeface="Cambria Math" panose="02040503050406030204" pitchFamily="18" charset="0"/>
+                        </a:rPr>
+                        <m:t>)</m:t>
+                      </m:r>
+                    </m:oMath>
+                  </m:oMathPara>
+                </a14:m>
+                <a:endParaRPr lang="en-US" dirty="0"/>
+              </a:p>
+            </p:txBody>
+          </p:sp>
+        </mc:Choice>
+        <mc:Fallback>
+          <p:sp>
+            <p:nvSpPr>
+              <p:cNvPr id="2" name="CuadroTexto 1">
+                <a:extLst>
+                  <a:ext uri="{FF2B5EF4-FFF2-40B4-BE49-F238E27FC236}">
+                    <a16:creationId xmlns:a16="http://schemas.microsoft.com/office/drawing/2014/main" id="{578383B6-D5BF-4AD6-BA88-5E327FA47896}"/>
+                  </a:ext>
+                </a:extLst>
+              </p:cNvPr>
+              <p:cNvSpPr txBox="1">
+                <a:spLocks noRot="1" noChangeAspect="1" noMove="1" noResize="1" noEditPoints="1" noAdjustHandles="1" noChangeArrowheads="1" noChangeShapeType="1" noTextEdit="1"/>
+              </p:cNvSpPr>
+              <p:nvPr/>
+            </p:nvSpPr>
+            <p:spPr>
+              <a:xfrm>
+                <a:off x="3541667" y="1198325"/>
+                <a:ext cx="3691973" cy="276999"/>
+              </a:xfrm>
+              <a:prstGeom prst="rect">
+                <a:avLst/>
+              </a:prstGeom>
+              <a:blipFill>
+                <a:blip r:embed="rId2"/>
+                <a:stretch>
+                  <a:fillRect l="-990" r="-1650" b="-40000"/>
+                </a:stretch>
+              </a:blipFill>
+            </p:spPr>
+            <p:txBody>
+              <a:bodyPr/>
+              <a:lstStyle/>
+              <a:p>
+                <a:r>
+                  <a:rPr lang="en-US">
+                    <a:noFill/>
+                  </a:rPr>
+                  <a:t> </a:t>
+                </a:r>
+              </a:p>
+            </p:txBody>
+          </p:sp>
+        </mc:Fallback>
+      </mc:AlternateContent>
+      <p:pic>
+        <p:nvPicPr>
+          <p:cNvPr id="11" name="Picture 2" descr="Facebook Prophet. (Almost) everything you should know to… | by Moto DEI |  The Startup | Medium">
+            <a:extLst>
+              <a:ext uri="{FF2B5EF4-FFF2-40B4-BE49-F238E27FC236}">
+                <a16:creationId xmlns:a16="http://schemas.microsoft.com/office/drawing/2014/main" id="{58191A01-2EFB-4501-B00C-65596854A346}"/>
+              </a:ext>
+            </a:extLst>
+          </p:cNvPr>
+          <p:cNvPicPr>
+            <a:picLocks noChangeAspect="1" noChangeArrowheads="1"/>
+          </p:cNvPicPr>
+          <p:nvPr/>
+        </p:nvPicPr>
+        <p:blipFill>
+          <a:blip r:embed="rId3">
+            <a:extLst>
+              <a:ext uri="{28A0092B-C50C-407E-A947-70E740481C1C}">
+                <a14:useLocalDpi xmlns:a14="http://schemas.microsoft.com/office/drawing/2010/main" val="0"/>
+              </a:ext>
+            </a:extLst>
+          </a:blip>
+          <a:srcRect/>
+          <a:stretch>
+            <a:fillRect/>
+          </a:stretch>
+        </p:blipFill>
+        <p:spPr bwMode="auto">
+          <a:xfrm>
+            <a:off x="704675" y="1203319"/>
+            <a:ext cx="1325461" cy="379489"/>
+          </a:xfrm>
+          <a:prstGeom prst="rect">
+            <a:avLst/>
+          </a:prstGeom>
+          <a:noFill/>
+          <a:extLst>
+            <a:ext uri="{909E8E84-426E-40DD-AFC4-6F175D3DCCD1}">
+              <a14:hiddenFill xmlns:a14="http://schemas.microsoft.com/office/drawing/2010/main">
+                <a:solidFill>
+                  <a:srgbClr val="FFFFFF"/>
+                </a:solidFill>
+              </a14:hiddenFill>
+            </a:ext>
+          </a:extLst>
+        </p:spPr>
+      </p:pic>
+      <p:grpSp>
+        <p:nvGrpSpPr>
+          <p:cNvPr id="18" name="Grupo 17">
+            <a:extLst>
+              <a:ext uri="{FF2B5EF4-FFF2-40B4-BE49-F238E27FC236}">
+                <a16:creationId xmlns:a16="http://schemas.microsoft.com/office/drawing/2014/main" id="{64F3371C-CBEC-4B6C-8A82-D3D825F846DA}"/>
+              </a:ext>
+            </a:extLst>
+          </p:cNvPr>
+          <p:cNvGrpSpPr/>
+          <p:nvPr/>
+        </p:nvGrpSpPr>
+        <p:grpSpPr>
+          <a:xfrm>
+            <a:off x="156628" y="3342476"/>
+            <a:ext cx="11867692" cy="954107"/>
+            <a:chOff x="195676" y="3031650"/>
+            <a:chExt cx="11867692" cy="954107"/>
+          </a:xfrm>
+        </p:grpSpPr>
+        <p:sp>
+          <p:nvSpPr>
+            <p:cNvPr id="7" name="CuadroTexto 6">
+              <a:extLst>
+                <a:ext uri="{FF2B5EF4-FFF2-40B4-BE49-F238E27FC236}">
+                  <a16:creationId xmlns:a16="http://schemas.microsoft.com/office/drawing/2014/main" id="{A7F5BC20-AD7E-4AF1-9EE9-FAEC9605DC69}"/>
+                </a:ext>
+              </a:extLst>
+            </p:cNvPr>
+            <p:cNvSpPr txBox="1"/>
+            <p:nvPr/>
+          </p:nvSpPr>
+          <p:spPr>
+            <a:xfrm>
+              <a:off x="195676" y="3324037"/>
+              <a:ext cx="2052574" cy="369332"/>
+            </a:xfrm>
+            <a:prstGeom prst="rect">
+              <a:avLst/>
+            </a:prstGeom>
+            <a:noFill/>
+          </p:spPr>
+          <p:txBody>
+            <a:bodyPr wrap="square" rtlCol="0">
+              <a:spAutoFit/>
+            </a:bodyPr>
+            <a:lstStyle/>
+            <a:p>
+              <a:r>
+                <a:rPr lang="es-ES" dirty="0">
+                  <a:solidFill>
+                    <a:srgbClr val="C00000"/>
+                  </a:solidFill>
+                </a:rPr>
+                <a:t>Estacionalidad</a:t>
+              </a:r>
+              <a:endParaRPr lang="en-US" dirty="0">
+                <a:solidFill>
+                  <a:srgbClr val="C00000"/>
+                </a:solidFill>
+              </a:endParaRPr>
+            </a:p>
+          </p:txBody>
+        </p:sp>
+        <p:sp>
+          <p:nvSpPr>
+            <p:cNvPr id="12" name="CuadroTexto 11">
+              <a:extLst>
+                <a:ext uri="{FF2B5EF4-FFF2-40B4-BE49-F238E27FC236}">
+                  <a16:creationId xmlns:a16="http://schemas.microsoft.com/office/drawing/2014/main" id="{18BAECA9-D4DE-476D-8651-52E8F0886230}"/>
+                </a:ext>
+              </a:extLst>
+            </p:cNvPr>
+            <p:cNvSpPr txBox="1"/>
+            <p:nvPr/>
+          </p:nvSpPr>
+          <p:spPr>
+            <a:xfrm>
+              <a:off x="2508307" y="3031650"/>
+              <a:ext cx="9555061" cy="954107"/>
+            </a:xfrm>
+            <a:prstGeom prst="rect">
+              <a:avLst/>
+            </a:prstGeom>
+            <a:noFill/>
+          </p:spPr>
+          <p:txBody>
+            <a:bodyPr wrap="square" rtlCol="0">
+              <a:spAutoFit/>
+            </a:bodyPr>
+            <a:lstStyle/>
+            <a:p>
+              <a:r>
+                <a:rPr lang="es-ES" sz="1400" dirty="0" err="1">
+                  <a:solidFill>
+                    <a:srgbClr val="C00000"/>
+                  </a:solidFill>
+                </a:rPr>
+                <a:t>Prophet</a:t>
+              </a:r>
+              <a:r>
+                <a:rPr lang="es-ES" sz="1400" dirty="0">
+                  <a:solidFill>
+                    <a:srgbClr val="C00000"/>
+                  </a:solidFill>
+                </a:rPr>
+                <a:t> utiliza series de Fourier para identificar la estacionalidad</a:t>
+              </a:r>
+              <a:endParaRPr lang="en-US" sz="1400" dirty="0">
+                <a:solidFill>
+                  <a:srgbClr val="C00000"/>
+                </a:solidFill>
+              </a:endParaRPr>
+            </a:p>
+            <a:p>
+              <a:endParaRPr lang="es-ES" sz="1400" dirty="0">
+                <a:solidFill>
+                  <a:srgbClr val="C00000"/>
+                </a:solidFill>
+              </a:endParaRPr>
+            </a:p>
+            <a:p>
+              <a:r>
+                <a:rPr lang="es-ES" sz="1400" dirty="0">
+                  <a:solidFill>
+                    <a:srgbClr val="C00000"/>
+                  </a:solidFill>
+                </a:rPr>
+                <a:t>Un claro beneficio del modelo </a:t>
+              </a:r>
+              <a:r>
+                <a:rPr lang="es-ES" sz="1400" dirty="0" err="1">
+                  <a:solidFill>
+                    <a:srgbClr val="C00000"/>
+                  </a:solidFill>
+                </a:rPr>
+                <a:t>prophet</a:t>
+              </a:r>
+              <a:r>
+                <a:rPr lang="es-ES" sz="1400" dirty="0">
+                  <a:solidFill>
+                    <a:srgbClr val="C00000"/>
+                  </a:solidFill>
+                </a:rPr>
+                <a:t> es que a diferencia de los modelos ARIMA tradicionales  que están implementados actualmente en R y Python, estos permiten múltiples términos de estacionalidad.</a:t>
+              </a:r>
+            </a:p>
+          </p:txBody>
+        </p:sp>
+      </p:grpSp>
+      <p:grpSp>
+        <p:nvGrpSpPr>
+          <p:cNvPr id="19" name="Grupo 18">
+            <a:extLst>
+              <a:ext uri="{FF2B5EF4-FFF2-40B4-BE49-F238E27FC236}">
+                <a16:creationId xmlns:a16="http://schemas.microsoft.com/office/drawing/2014/main" id="{735194BF-EBFB-4B4B-8478-1DF8C9495B6F}"/>
+              </a:ext>
+            </a:extLst>
+          </p:cNvPr>
+          <p:cNvGrpSpPr/>
+          <p:nvPr/>
+        </p:nvGrpSpPr>
+        <p:grpSpPr>
+          <a:xfrm>
+            <a:off x="374742" y="2002359"/>
+            <a:ext cx="11294344" cy="1169551"/>
+            <a:chOff x="195677" y="2002359"/>
+            <a:chExt cx="11294344" cy="1169551"/>
+          </a:xfrm>
+        </p:grpSpPr>
+        <p:sp>
+          <p:nvSpPr>
+            <p:cNvPr id="6" name="CuadroTexto 5">
+              <a:extLst>
+                <a:ext uri="{FF2B5EF4-FFF2-40B4-BE49-F238E27FC236}">
+                  <a16:creationId xmlns:a16="http://schemas.microsoft.com/office/drawing/2014/main" id="{CF2F343C-4140-4BAA-9BDB-2E3A7D86E04B}"/>
+                </a:ext>
+              </a:extLst>
+            </p:cNvPr>
+            <p:cNvSpPr txBox="1"/>
+            <p:nvPr/>
+          </p:nvSpPr>
+          <p:spPr>
+            <a:xfrm>
+              <a:off x="195677" y="2402468"/>
+              <a:ext cx="2052574" cy="369332"/>
+            </a:xfrm>
+            <a:prstGeom prst="rect">
+              <a:avLst/>
+            </a:prstGeom>
+            <a:noFill/>
+          </p:spPr>
+          <p:txBody>
+            <a:bodyPr wrap="square" rtlCol="0">
+              <a:spAutoFit/>
+            </a:bodyPr>
+            <a:lstStyle/>
+            <a:p>
+              <a:r>
+                <a:rPr lang="es-ES" dirty="0"/>
+                <a:t>Tendencia</a:t>
+              </a:r>
+              <a:endParaRPr lang="en-US" dirty="0"/>
+            </a:p>
+          </p:txBody>
+        </p:sp>
+        <p:sp>
+          <p:nvSpPr>
+            <p:cNvPr id="13" name="CuadroTexto 12">
+              <a:extLst>
+                <a:ext uri="{FF2B5EF4-FFF2-40B4-BE49-F238E27FC236}">
+                  <a16:creationId xmlns:a16="http://schemas.microsoft.com/office/drawing/2014/main" id="{BDE69564-DEBF-432E-A1D4-B446F33D6ECE}"/>
+                </a:ext>
+              </a:extLst>
+            </p:cNvPr>
+            <p:cNvSpPr txBox="1"/>
+            <p:nvPr/>
+          </p:nvSpPr>
+          <p:spPr>
+            <a:xfrm>
+              <a:off x="2371187" y="2002359"/>
+              <a:ext cx="9118834" cy="1169551"/>
+            </a:xfrm>
+            <a:prstGeom prst="rect">
+              <a:avLst/>
+            </a:prstGeom>
+            <a:noFill/>
+          </p:spPr>
+          <p:txBody>
+            <a:bodyPr wrap="square" rtlCol="0">
+              <a:spAutoFit/>
+            </a:bodyPr>
+            <a:lstStyle/>
+            <a:p>
+              <a:r>
+                <a:rPr lang="es-ES" sz="1400" dirty="0" err="1"/>
+                <a:t>Prophet</a:t>
+              </a:r>
+              <a:r>
+                <a:rPr lang="es-ES" sz="1400" dirty="0"/>
+                <a:t> permite tener una saturación en la tendencia con el parámetro “</a:t>
+              </a:r>
+              <a:r>
+                <a:rPr lang="es-ES" sz="1400" dirty="0" err="1"/>
+                <a:t>growth</a:t>
+              </a:r>
+              <a:r>
+                <a:rPr lang="es-ES" sz="1400" dirty="0"/>
+                <a:t>”</a:t>
+              </a:r>
+            </a:p>
+            <a:p>
+              <a:endParaRPr lang="es-ES" sz="1400" dirty="0"/>
+            </a:p>
+            <a:p>
+              <a:r>
+                <a:rPr lang="es-ES" sz="1400" dirty="0"/>
+                <a:t>Dentro de la estructura de </a:t>
+              </a:r>
+              <a:r>
+                <a:rPr lang="es-ES" sz="1400" dirty="0" err="1"/>
+                <a:t>Prophet</a:t>
+              </a:r>
+              <a:r>
+                <a:rPr lang="es-ES" sz="1400" dirty="0"/>
+                <a:t>, existen los “</a:t>
+              </a:r>
+              <a:r>
+                <a:rPr lang="es-ES" sz="1400" dirty="0" err="1"/>
+                <a:t>changepoints</a:t>
+              </a:r>
+              <a:r>
+                <a:rPr lang="es-ES" sz="1400" dirty="0"/>
+                <a:t>” que son puntos </a:t>
+              </a:r>
+              <a:r>
+                <a:rPr lang="es-ES" sz="1400" dirty="0" err="1"/>
+                <a:t>autodetectados</a:t>
+              </a:r>
+              <a:r>
+                <a:rPr lang="es-ES" sz="1400" dirty="0"/>
+                <a:t> por el ajuste del modelo cuando hay quiebres dentro de la tendencia. </a:t>
+              </a:r>
+              <a:endParaRPr lang="en-US" sz="1400" dirty="0"/>
+            </a:p>
+            <a:p>
+              <a:endParaRPr lang="en-US" sz="1400" dirty="0"/>
+            </a:p>
+          </p:txBody>
+        </p:sp>
+      </p:grpSp>
+      <p:grpSp>
+        <p:nvGrpSpPr>
+          <p:cNvPr id="10" name="Grupo 9">
+            <a:extLst>
+              <a:ext uri="{FF2B5EF4-FFF2-40B4-BE49-F238E27FC236}">
+                <a16:creationId xmlns:a16="http://schemas.microsoft.com/office/drawing/2014/main" id="{D46080A1-8358-475D-BEE8-2F91EF5A31C0}"/>
+              </a:ext>
+            </a:extLst>
+          </p:cNvPr>
+          <p:cNvGrpSpPr/>
+          <p:nvPr/>
+        </p:nvGrpSpPr>
+        <p:grpSpPr>
+          <a:xfrm>
+            <a:off x="117580" y="4467149"/>
+            <a:ext cx="11906740" cy="523220"/>
+            <a:chOff x="117580" y="4211334"/>
+            <a:chExt cx="11906740" cy="523220"/>
+          </a:xfrm>
+        </p:grpSpPr>
+        <p:sp>
+          <p:nvSpPr>
+            <p:cNvPr id="8" name="CuadroTexto 7">
+              <a:extLst>
+                <a:ext uri="{FF2B5EF4-FFF2-40B4-BE49-F238E27FC236}">
+                  <a16:creationId xmlns:a16="http://schemas.microsoft.com/office/drawing/2014/main" id="{B6D6E15F-288C-4E1A-9EF0-750CBC2F9A31}"/>
+                </a:ext>
+              </a:extLst>
+            </p:cNvPr>
+            <p:cNvSpPr txBox="1"/>
+            <p:nvPr/>
+          </p:nvSpPr>
+          <p:spPr>
+            <a:xfrm>
+              <a:off x="117580" y="4288278"/>
+              <a:ext cx="2298449" cy="369332"/>
+            </a:xfrm>
+            <a:prstGeom prst="rect">
+              <a:avLst/>
+            </a:prstGeom>
+            <a:noFill/>
+          </p:spPr>
+          <p:txBody>
+            <a:bodyPr wrap="square" rtlCol="0">
+              <a:spAutoFit/>
+            </a:bodyPr>
+            <a:lstStyle/>
+            <a:p>
+              <a:r>
+                <a:rPr lang="es-ES" dirty="0">
+                  <a:solidFill>
+                    <a:schemeClr val="accent1"/>
+                  </a:solidFill>
+                </a:rPr>
+                <a:t>Efectos de Festivos</a:t>
+              </a:r>
+              <a:endParaRPr lang="en-US" dirty="0">
+                <a:solidFill>
+                  <a:schemeClr val="accent1"/>
+                </a:solidFill>
+              </a:endParaRPr>
+            </a:p>
+          </p:txBody>
+        </p:sp>
+        <p:sp>
+          <p:nvSpPr>
+            <p:cNvPr id="15" name="CuadroTexto 14">
+              <a:extLst>
+                <a:ext uri="{FF2B5EF4-FFF2-40B4-BE49-F238E27FC236}">
+                  <a16:creationId xmlns:a16="http://schemas.microsoft.com/office/drawing/2014/main" id="{FDFCA819-A9E3-445D-B344-304A2FDD24DC}"/>
+                </a:ext>
+              </a:extLst>
+            </p:cNvPr>
+            <p:cNvSpPr txBox="1"/>
+            <p:nvPr/>
+          </p:nvSpPr>
+          <p:spPr>
+            <a:xfrm>
+              <a:off x="2469259" y="4211334"/>
+              <a:ext cx="9555061" cy="523220"/>
+            </a:xfrm>
+            <a:prstGeom prst="rect">
+              <a:avLst/>
+            </a:prstGeom>
+            <a:noFill/>
+          </p:spPr>
+          <p:txBody>
+            <a:bodyPr wrap="square" rtlCol="0">
+              <a:spAutoFit/>
+            </a:bodyPr>
+            <a:lstStyle/>
+            <a:p>
+              <a:r>
+                <a:rPr lang="es-ES" sz="1400" dirty="0" err="1">
+                  <a:solidFill>
+                    <a:schemeClr val="accent6">
+                      <a:lumMod val="50000"/>
+                    </a:schemeClr>
+                  </a:solidFill>
+                </a:rPr>
+                <a:t>Prophet</a:t>
+              </a:r>
+              <a:r>
+                <a:rPr lang="es-ES" sz="1400" dirty="0">
+                  <a:solidFill>
+                    <a:schemeClr val="accent6">
+                      <a:lumMod val="50000"/>
+                    </a:schemeClr>
+                  </a:solidFill>
+                </a:rPr>
+                <a:t> viene con festivos implementados por defecto, lo que lo hace una buena herramienta para comportamientos de personas (reservas, ventas de </a:t>
+              </a:r>
+              <a:r>
+                <a:rPr lang="es-ES" sz="1400" dirty="0" err="1">
+                  <a:solidFill>
+                    <a:schemeClr val="accent6">
+                      <a:lumMod val="50000"/>
+                    </a:schemeClr>
+                  </a:solidFill>
+                </a:rPr>
+                <a:t>retail</a:t>
+              </a:r>
+              <a:r>
+                <a:rPr lang="es-ES" sz="1400" dirty="0">
+                  <a:solidFill>
+                    <a:schemeClr val="accent6">
+                      <a:lumMod val="50000"/>
+                    </a:schemeClr>
+                  </a:solidFill>
+                </a:rPr>
+                <a:t>, eventos comerciales, </a:t>
+              </a:r>
+              <a:r>
+                <a:rPr lang="es-ES" sz="1400" dirty="0" err="1">
+                  <a:solidFill>
+                    <a:schemeClr val="accent6">
+                      <a:lumMod val="50000"/>
+                    </a:schemeClr>
+                  </a:solidFill>
+                </a:rPr>
+                <a:t>etc</a:t>
+              </a:r>
+              <a:r>
+                <a:rPr lang="es-ES" sz="1400" dirty="0">
+                  <a:solidFill>
+                    <a:schemeClr val="accent6">
+                      <a:lumMod val="50000"/>
+                    </a:schemeClr>
+                  </a:solidFill>
+                </a:rPr>
+                <a:t>) </a:t>
+              </a:r>
+            </a:p>
+          </p:txBody>
+        </p:sp>
+      </p:grpSp>
+      <p:grpSp>
+        <p:nvGrpSpPr>
+          <p:cNvPr id="3" name="Grupo 2">
+            <a:extLst>
+              <a:ext uri="{FF2B5EF4-FFF2-40B4-BE49-F238E27FC236}">
+                <a16:creationId xmlns:a16="http://schemas.microsoft.com/office/drawing/2014/main" id="{07CC0698-88DD-4923-88E1-82D51C753969}"/>
+              </a:ext>
+            </a:extLst>
+          </p:cNvPr>
+          <p:cNvGrpSpPr/>
+          <p:nvPr/>
+        </p:nvGrpSpPr>
+        <p:grpSpPr>
+          <a:xfrm>
+            <a:off x="159525" y="5160936"/>
+            <a:ext cx="11780906" cy="523220"/>
+            <a:chOff x="117580" y="5160936"/>
+            <a:chExt cx="11780906" cy="523220"/>
+          </a:xfrm>
+        </p:grpSpPr>
+        <p:sp>
+          <p:nvSpPr>
+            <p:cNvPr id="9" name="CuadroTexto 8">
+              <a:extLst>
+                <a:ext uri="{FF2B5EF4-FFF2-40B4-BE49-F238E27FC236}">
+                  <a16:creationId xmlns:a16="http://schemas.microsoft.com/office/drawing/2014/main" id="{73E66DE5-A1A7-462D-819B-D387A852FB4B}"/>
+                </a:ext>
+              </a:extLst>
+            </p:cNvPr>
+            <p:cNvSpPr txBox="1"/>
+            <p:nvPr/>
+          </p:nvSpPr>
+          <p:spPr>
+            <a:xfrm>
+              <a:off x="117580" y="5237880"/>
+              <a:ext cx="2298449" cy="369332"/>
+            </a:xfrm>
+            <a:prstGeom prst="rect">
+              <a:avLst/>
+            </a:prstGeom>
+            <a:noFill/>
+          </p:spPr>
+          <p:txBody>
+            <a:bodyPr wrap="square" rtlCol="0">
+              <a:spAutoFit/>
+            </a:bodyPr>
+            <a:lstStyle/>
+            <a:p>
+              <a:r>
+                <a:rPr lang="es-ES" dirty="0">
+                  <a:solidFill>
+                    <a:srgbClr val="CC7832"/>
+                  </a:solidFill>
+                </a:rPr>
+                <a:t>Factores Exógenos</a:t>
+              </a:r>
+              <a:endParaRPr lang="en-US" dirty="0">
+                <a:solidFill>
+                  <a:srgbClr val="CC7832"/>
+                </a:solidFill>
+              </a:endParaRPr>
+            </a:p>
+          </p:txBody>
+        </p:sp>
+        <p:sp>
+          <p:nvSpPr>
+            <p:cNvPr id="17" name="CuadroTexto 16">
+              <a:extLst>
+                <a:ext uri="{FF2B5EF4-FFF2-40B4-BE49-F238E27FC236}">
+                  <a16:creationId xmlns:a16="http://schemas.microsoft.com/office/drawing/2014/main" id="{7FA92080-D02A-4414-990C-18F623F7C48A}"/>
+                </a:ext>
+              </a:extLst>
+            </p:cNvPr>
+            <p:cNvSpPr txBox="1"/>
+            <p:nvPr/>
+          </p:nvSpPr>
+          <p:spPr>
+            <a:xfrm>
+              <a:off x="2427314" y="5160936"/>
+              <a:ext cx="9471172" cy="523220"/>
+            </a:xfrm>
+            <a:prstGeom prst="rect">
+              <a:avLst/>
+            </a:prstGeom>
+            <a:noFill/>
+          </p:spPr>
+          <p:txBody>
+            <a:bodyPr wrap="square" rtlCol="0">
+              <a:spAutoFit/>
+            </a:bodyPr>
+            <a:lstStyle/>
+            <a:p>
+              <a:r>
+                <a:rPr lang="es-ES" sz="1400" dirty="0">
+                  <a:solidFill>
+                    <a:srgbClr val="CC7832"/>
+                  </a:solidFill>
+                </a:rPr>
+                <a:t>Al igual que un modelo ARIMAX, el término de regresión permite agregar variables exógenas para agregar al modelo</a:t>
+              </a:r>
+            </a:p>
+          </p:txBody>
+        </p:sp>
+      </p:grpSp>
+    </p:spTree>
+    <p:extLst>
+      <p:ext uri="{BB962C8B-B14F-4D97-AF65-F5344CB8AC3E}">
+        <p14:creationId xmlns:p14="http://schemas.microsoft.com/office/powerpoint/2010/main" val="149662278"/>
+      </p:ext>
+    </p:extLst>
+  </p:cSld>
+  <p:clrMapOvr>
+    <a:masterClrMapping/>
+  </p:clrMapOvr>
+  <p:timing>
+    <p:tnLst>
+      <p:par>
+        <p:cTn id="1" dur="indefinite" restart="never" nodeType="tmRoot">
+          <p:childTnLst>
+            <p:seq concurrent="1" nextAc="seek">
+              <p:cTn id="2" dur="indefinite" nodeType="mainSeq">
+                <p:childTnLst>
+                  <p:par>
+                    <p:cTn id="3" fill="hold">
+                      <p:stCondLst>
+                        <p:cond delay="indefinite"/>
+                      </p:stCondLst>
+                      <p:childTnLst>
+                        <p:par>
+                          <p:cTn id="4" fill="hold">
+                            <p:stCondLst>
+                              <p:cond delay="0"/>
+                            </p:stCondLst>
+                            <p:childTnLst>
+                              <p:par>
+                                <p:cTn id="5" presetID="1" presetClass="entr" presetSubtype="0" fill="hold" nodeType="clickEffect">
+                                  <p:stCondLst>
+                                    <p:cond delay="0"/>
+                                  </p:stCondLst>
+                                  <p:childTnLst>
+                                    <p:set>
+                                      <p:cBhvr>
+                                        <p:cTn id="6" dur="1" fill="hold">
+                                          <p:stCondLst>
+                                            <p:cond delay="0"/>
+                                          </p:stCondLst>
+                                        </p:cTn>
+                                        <p:tgtEl>
+                                          <p:spTgt spid="19"/>
+                                        </p:tgtEl>
+                                        <p:attrNameLst>
+                                          <p:attrName>style.visibility</p:attrName>
+                                        </p:attrNameLst>
+                                      </p:cBhvr>
+                                      <p:to>
+                                        <p:strVal val="visible"/>
+                                      </p:to>
+                                    </p:set>
+                                  </p:childTnLst>
+                                </p:cTn>
+                              </p:par>
+                            </p:childTnLst>
+                          </p:cTn>
+                        </p:par>
+                      </p:childTnLst>
+                    </p:cTn>
+                  </p:par>
+                  <p:par>
+                    <p:cTn id="7" fill="hold">
+                      <p:stCondLst>
+                        <p:cond delay="indefinite"/>
+                      </p:stCondLst>
+                      <p:childTnLst>
+                        <p:par>
+                          <p:cTn id="8" fill="hold">
+                            <p:stCondLst>
+                              <p:cond delay="0"/>
+                            </p:stCondLst>
+                            <p:childTnLst>
+                              <p:par>
+                                <p:cTn id="9" presetID="1" presetClass="entr" presetSubtype="0" fill="hold" nodeType="clickEffect">
+                                  <p:stCondLst>
+                                    <p:cond delay="0"/>
+                                  </p:stCondLst>
+                                  <p:childTnLst>
+                                    <p:set>
+                                      <p:cBhvr>
+                                        <p:cTn id="10" dur="1" fill="hold">
+                                          <p:stCondLst>
+                                            <p:cond delay="0"/>
+                                          </p:stCondLst>
+                                        </p:cTn>
+                                        <p:tgtEl>
+                                          <p:spTgt spid="18"/>
+                                        </p:tgtEl>
+                                        <p:attrNameLst>
+                                          <p:attrName>style.visibility</p:attrName>
+                                        </p:attrNameLst>
+                                      </p:cBhvr>
+                                      <p:to>
+                                        <p:strVal val="visible"/>
+                                      </p:to>
+                                    </p:set>
+                                  </p:childTnLst>
+                                </p:cTn>
+                              </p:par>
+                            </p:childTnLst>
+                          </p:cTn>
+                        </p:par>
+                      </p:childTnLst>
+                    </p:cTn>
+                  </p:par>
+                  <p:par>
+                    <p:cTn id="11" fill="hold">
+                      <p:stCondLst>
+                        <p:cond delay="indefinite"/>
+                      </p:stCondLst>
+                      <p:childTnLst>
+                        <p:par>
+                          <p:cTn id="12" fill="hold">
+                            <p:stCondLst>
+                              <p:cond delay="0"/>
+                            </p:stCondLst>
+                            <p:childTnLst>
+                              <p:par>
+                                <p:cTn id="13" presetID="1" presetClass="entr" presetSubtype="0" fill="hold" nodeType="clickEffect">
+                                  <p:stCondLst>
+                                    <p:cond delay="0"/>
+                                  </p:stCondLst>
+                                  <p:childTnLst>
+                                    <p:set>
+                                      <p:cBhvr>
+                                        <p:cTn id="14" dur="1" fill="hold">
+                                          <p:stCondLst>
+                                            <p:cond delay="0"/>
+                                          </p:stCondLst>
+                                        </p:cTn>
+                                        <p:tgtEl>
+                                          <p:spTgt spid="10"/>
+                                        </p:tgtEl>
+                                        <p:attrNameLst>
+                                          <p:attrName>style.visibility</p:attrName>
+                                        </p:attrNameLst>
+                                      </p:cBhvr>
+                                      <p:to>
+                                        <p:strVal val="visible"/>
+                                      </p:to>
+                                    </p:set>
+                                  </p:childTnLst>
+                                </p:cTn>
+                              </p:par>
+                            </p:childTnLst>
+                          </p:cTn>
+                        </p:par>
+                      </p:childTnLst>
+                    </p:cTn>
+                  </p:par>
+                  <p:par>
+                    <p:cTn id="15" fill="hold">
+                      <p:stCondLst>
+                        <p:cond delay="indefinite"/>
+                      </p:stCondLst>
+                      <p:childTnLst>
+                        <p:par>
+                          <p:cTn id="16" fill="hold">
+                            <p:stCondLst>
+                              <p:cond delay="0"/>
+                            </p:stCondLst>
+                            <p:childTnLst>
+                              <p:par>
+                                <p:cTn id="17" presetID="1" presetClass="entr" presetSubtype="0" fill="hold" nodeType="clickEffect">
+                                  <p:stCondLst>
+                                    <p:cond delay="0"/>
+                                  </p:stCondLst>
+                                  <p:childTnLst>
+                                    <p:set>
+                                      <p:cBhvr>
+                                        <p:cTn id="18" dur="1" fill="hold">
+                                          <p:stCondLst>
+                                            <p:cond delay="0"/>
+                                          </p:stCondLst>
+                                        </p:cTn>
+                                        <p:tgtEl>
+                                          <p:spTgt spid="3"/>
+                                        </p:tgtEl>
+                                        <p:attrNameLst>
+                                          <p:attrName>style.visibility</p:attrName>
+                                        </p:attrNameLst>
+                                      </p:cBhvr>
+                                      <p:to>
+                                        <p:strVal val="visible"/>
+                                      </p:to>
+                                    </p:set>
+                                  </p:childTnLst>
+                                </p:cTn>
+                              </p:par>
+                            </p:childTnLst>
+                          </p:cTn>
+                        </p:par>
+                      </p:childTnLst>
+                    </p:cTn>
+                  </p:par>
+                </p:childTnLst>
+              </p:cTn>
+              <p:prevCondLst>
+                <p:cond evt="onPrev" delay="0">
+                  <p:tgtEl>
+                    <p:sldTgt/>
+                  </p:tgtEl>
+                </p:cond>
+              </p:prevCondLst>
+              <p:nextCondLst>
+                <p:cond evt="onNext" delay="0">
+                  <p:tgtEl>
+                    <p:sldTgt/>
+                  </p:tgtEl>
+                </p:cond>
+              </p:nextCondLst>
+            </p:seq>
+          </p:childTnLst>
+        </p:cTn>
+      </p:par>
+    </p:tnLst>
+  </p:timing>
+</p:sld>
+</file>
+
+<file path=ppt/slides/slide28.xml><?xml version="1.0" encoding="utf-8"?>
 <p:sld xmlns:a="http://schemas.openxmlformats.org/drawingml/2006/main" xmlns:r="http://schemas.openxmlformats.org/officeDocument/2006/relationships" xmlns:p="http://schemas.openxmlformats.org/presentationml/2006/main">
   <p:cSld>
     <p:spTree>
@@ -21379,7 +23535,7 @@
 </p:sld>
 </file>
 
-<file path=ppt/slides/slide27.xml><?xml version="1.0" encoding="utf-8"?>
+<file path=ppt/slides/slide29.xml><?xml version="1.0" encoding="utf-8"?>
 <p:sld xmlns:a="http://schemas.openxmlformats.org/drawingml/2006/main" xmlns:r="http://schemas.openxmlformats.org/officeDocument/2006/relationships" xmlns:p="http://schemas.openxmlformats.org/presentationml/2006/main">
   <p:cSld>
     <p:spTree>
@@ -21556,7 +23712,730 @@
 </p:sld>
 </file>
 
-<file path=ppt/slides/slide28.xml><?xml version="1.0" encoding="utf-8"?>
+<file path=ppt/slides/slide3.xml><?xml version="1.0" encoding="utf-8"?>
+<p:sld xmlns:a="http://schemas.openxmlformats.org/drawingml/2006/main" xmlns:r="http://schemas.openxmlformats.org/officeDocument/2006/relationships" xmlns:p="http://schemas.openxmlformats.org/presentationml/2006/main">
+  <p:cSld>
+    <p:spTree>
+      <p:nvGrpSpPr>
+        <p:cNvPr id="1" name=""/>
+        <p:cNvGrpSpPr/>
+        <p:nvPr/>
+      </p:nvGrpSpPr>
+      <p:grpSpPr>
+        <a:xfrm>
+          <a:off x="0" y="0"/>
+          <a:ext cx="0" cy="0"/>
+          <a:chOff x="0" y="0"/>
+          <a:chExt cx="0" cy="0"/>
+        </a:xfrm>
+      </p:grpSpPr>
+      <p:sp>
+        <p:nvSpPr>
+          <p:cNvPr id="22" name="CuadroTexto 21">
+            <a:extLst>
+              <a:ext uri="{FF2B5EF4-FFF2-40B4-BE49-F238E27FC236}">
+                <a16:creationId xmlns:a16="http://schemas.microsoft.com/office/drawing/2014/main" id="{5C80F593-DD2F-4F38-8160-0B4B1E5E79C5}"/>
+              </a:ext>
+            </a:extLst>
+          </p:cNvPr>
+          <p:cNvSpPr txBox="1"/>
+          <p:nvPr/>
+        </p:nvSpPr>
+        <p:spPr>
+          <a:xfrm>
+            <a:off x="7222976" y="186661"/>
+            <a:ext cx="5100506" cy="584775"/>
+          </a:xfrm>
+          <a:prstGeom prst="rect">
+            <a:avLst/>
+          </a:prstGeom>
+          <a:noFill/>
+        </p:spPr>
+        <p:txBody>
+          <a:bodyPr wrap="square" rtlCol="0">
+            <a:spAutoFit/>
+          </a:bodyPr>
+          <a:lstStyle/>
+          <a:p>
+            <a:pPr algn="ctr"/>
+            <a:r>
+              <a:rPr lang="es-ES" sz="3200" dirty="0" err="1"/>
+              <a:t>Outline</a:t>
+            </a:r>
+            <a:r>
+              <a:rPr lang="es-ES" sz="3200" dirty="0"/>
+              <a:t> del Laboratorio</a:t>
+            </a:r>
+            <a:endParaRPr lang="en-US" sz="2800" dirty="0"/>
+          </a:p>
+        </p:txBody>
+      </p:sp>
+      <p:sp>
+        <p:nvSpPr>
+          <p:cNvPr id="39" name="CuadroTexto 38">
+            <a:extLst>
+              <a:ext uri="{FF2B5EF4-FFF2-40B4-BE49-F238E27FC236}">
+                <a16:creationId xmlns:a16="http://schemas.microsoft.com/office/drawing/2014/main" id="{B904A498-FAA0-4D1F-952A-8B5CDC3850AC}"/>
+              </a:ext>
+            </a:extLst>
+          </p:cNvPr>
+          <p:cNvSpPr txBox="1"/>
+          <p:nvPr/>
+        </p:nvSpPr>
+        <p:spPr>
+          <a:xfrm>
+            <a:off x="69909" y="1690970"/>
+            <a:ext cx="5834325" cy="2954655"/>
+          </a:xfrm>
+          <a:prstGeom prst="rect">
+            <a:avLst/>
+          </a:prstGeom>
+          <a:noFill/>
+        </p:spPr>
+        <p:txBody>
+          <a:bodyPr wrap="square" rtlCol="0">
+            <a:spAutoFit/>
+          </a:bodyPr>
+          <a:lstStyle/>
+          <a:p>
+            <a:r>
+              <a:rPr lang="es-ES" b="1" dirty="0"/>
+              <a:t>Creación y A</a:t>
+            </a:r>
+            <a:r>
+              <a:rPr lang="en-US" b="1" dirty="0"/>
+              <a:t>nálisis de Series Temporales</a:t>
+            </a:r>
+          </a:p>
+          <a:p>
+            <a:pPr marL="742950" lvl="1" indent="-285750">
+              <a:buFont typeface="Wingdings" panose="05000000000000000000" pitchFamily="2" charset="2"/>
+              <a:buChar char="Ø"/>
+            </a:pPr>
+            <a:r>
+              <a:rPr lang="en-US" sz="1400" dirty="0" err="1"/>
+              <a:t>Descomposición</a:t>
+            </a:r>
+            <a:r>
+              <a:rPr lang="en-US" sz="1400" dirty="0"/>
+              <a:t> de Series</a:t>
+            </a:r>
+          </a:p>
+          <a:p>
+            <a:pPr marL="1200150" lvl="2" indent="-285750">
+              <a:buFont typeface="Wingdings" panose="05000000000000000000" pitchFamily="2" charset="2"/>
+              <a:buChar char="Ø"/>
+            </a:pPr>
+            <a:r>
+              <a:rPr lang="en-US" sz="1400" dirty="0"/>
+              <a:t>Tendencia</a:t>
+            </a:r>
+          </a:p>
+          <a:p>
+            <a:pPr marL="1200150" lvl="2" indent="-285750">
+              <a:buFont typeface="Wingdings" panose="05000000000000000000" pitchFamily="2" charset="2"/>
+              <a:buChar char="Ø"/>
+            </a:pPr>
+            <a:r>
+              <a:rPr lang="en-US" sz="1400" dirty="0"/>
+              <a:t>Estacionalidad</a:t>
+            </a:r>
+          </a:p>
+          <a:p>
+            <a:pPr marL="1200150" lvl="2" indent="-285750">
+              <a:buFont typeface="Wingdings" panose="05000000000000000000" pitchFamily="2" charset="2"/>
+              <a:buChar char="Ø"/>
+            </a:pPr>
+            <a:r>
+              <a:rPr lang="en-US" sz="1400" dirty="0" err="1"/>
+              <a:t>Ruido</a:t>
+            </a:r>
+            <a:endParaRPr lang="en-US" sz="1400" dirty="0"/>
+          </a:p>
+          <a:p>
+            <a:pPr marL="742950" lvl="1" indent="-285750">
+              <a:buFont typeface="Wingdings" panose="05000000000000000000" pitchFamily="2" charset="2"/>
+              <a:buChar char="Ø"/>
+            </a:pPr>
+            <a:r>
+              <a:rPr lang="en-US" sz="1400" dirty="0" err="1"/>
+              <a:t>Creación</a:t>
+            </a:r>
+            <a:r>
+              <a:rPr lang="en-US" sz="1400" dirty="0"/>
+              <a:t> de Series </a:t>
+            </a:r>
+            <a:r>
+              <a:rPr lang="en-US" sz="1400" dirty="0" err="1"/>
+              <a:t>Temporales</a:t>
+            </a:r>
+            <a:endParaRPr lang="en-US" sz="1400" dirty="0"/>
+          </a:p>
+          <a:p>
+            <a:pPr marL="1200150" lvl="2" indent="-285750">
+              <a:buFont typeface="Wingdings" panose="05000000000000000000" pitchFamily="2" charset="2"/>
+              <a:buChar char="Ø"/>
+            </a:pPr>
+            <a:r>
+              <a:rPr lang="en-US" sz="1400" dirty="0" err="1"/>
+              <a:t>Elección</a:t>
+            </a:r>
+            <a:r>
+              <a:rPr lang="en-US" sz="1400" dirty="0"/>
+              <a:t> de </a:t>
+            </a:r>
+            <a:r>
+              <a:rPr lang="en-US" sz="1400" dirty="0" err="1"/>
+              <a:t>Resolución</a:t>
+            </a:r>
+            <a:r>
+              <a:rPr lang="en-US" sz="1400" dirty="0"/>
+              <a:t> temporal</a:t>
+            </a:r>
+          </a:p>
+          <a:p>
+            <a:pPr marL="742950" lvl="1" indent="-285750">
+              <a:buFont typeface="Wingdings" panose="05000000000000000000" pitchFamily="2" charset="2"/>
+              <a:buChar char="Ø"/>
+            </a:pPr>
+            <a:r>
+              <a:rPr lang="en-US" sz="1400" dirty="0" err="1"/>
+              <a:t>Transformación</a:t>
+            </a:r>
+            <a:r>
+              <a:rPr lang="en-US" sz="1400" dirty="0"/>
+              <a:t> de Series Temporales</a:t>
+            </a:r>
+          </a:p>
+          <a:p>
+            <a:pPr marL="1200150" lvl="2" indent="-285750">
+              <a:buFont typeface="Wingdings" panose="05000000000000000000" pitchFamily="2" charset="2"/>
+              <a:buChar char="Ø"/>
+            </a:pPr>
+            <a:r>
+              <a:rPr lang="en-US" sz="1400" dirty="0"/>
+              <a:t>Logaritmos, Diferencias y Normalizaciones</a:t>
+            </a:r>
+          </a:p>
+          <a:p>
+            <a:pPr marL="1200150" lvl="2" indent="-285750">
+              <a:buFont typeface="Wingdings" panose="05000000000000000000" pitchFamily="2" charset="2"/>
+              <a:buChar char="Ø"/>
+            </a:pPr>
+            <a:r>
+              <a:rPr lang="en-US" sz="1400" dirty="0"/>
+              <a:t>Medias </a:t>
+            </a:r>
+            <a:r>
+              <a:rPr lang="en-US" sz="1400" noProof="1"/>
+              <a:t>Móviles</a:t>
+            </a:r>
+          </a:p>
+          <a:p>
+            <a:pPr marL="742950" lvl="1" indent="-285750">
+              <a:buFont typeface="Wingdings" panose="05000000000000000000" pitchFamily="2" charset="2"/>
+              <a:buChar char="Ø"/>
+            </a:pPr>
+            <a:r>
+              <a:rPr lang="en-US" sz="1400" b="1" dirty="0" err="1">
+                <a:solidFill>
+                  <a:srgbClr val="FF0000"/>
+                </a:solidFill>
+              </a:rPr>
+              <a:t>Análisis</a:t>
+            </a:r>
+            <a:r>
+              <a:rPr lang="en-US" sz="1400" b="1" dirty="0">
+                <a:solidFill>
+                  <a:srgbClr val="FF0000"/>
+                </a:solidFill>
+              </a:rPr>
+              <a:t> de las Series</a:t>
+            </a:r>
+          </a:p>
+          <a:p>
+            <a:pPr marL="1200150" lvl="2" indent="-285750">
+              <a:buFont typeface="Wingdings" panose="05000000000000000000" pitchFamily="2" charset="2"/>
+              <a:buChar char="Ø"/>
+            </a:pPr>
+            <a:r>
+              <a:rPr lang="en-US" sz="1400" b="1" dirty="0">
+                <a:solidFill>
+                  <a:srgbClr val="FF0000"/>
+                </a:solidFill>
+              </a:rPr>
+              <a:t>Tests (ACF &amp; PACF, ADF, </a:t>
+            </a:r>
+            <a:r>
+              <a:rPr lang="en-US" sz="1400" b="1" dirty="0" err="1">
+                <a:solidFill>
+                  <a:srgbClr val="FF0000"/>
+                </a:solidFill>
+              </a:rPr>
+              <a:t>etc</a:t>
+            </a:r>
+            <a:r>
+              <a:rPr lang="en-US" sz="1400" b="1" dirty="0">
+                <a:solidFill>
+                  <a:srgbClr val="FF0000"/>
+                </a:solidFill>
+              </a:rPr>
+              <a:t>…)</a:t>
+            </a:r>
+          </a:p>
+          <a:p>
+            <a:pPr marL="1200150" lvl="2" indent="-285750">
+              <a:buFont typeface="Wingdings" panose="05000000000000000000" pitchFamily="2" charset="2"/>
+              <a:buChar char="Ø"/>
+            </a:pPr>
+            <a:r>
+              <a:rPr lang="en-US" sz="1400" b="1" dirty="0">
+                <a:solidFill>
+                  <a:srgbClr val="FF0000"/>
+                </a:solidFill>
+              </a:rPr>
+              <a:t>Cross Correlations</a:t>
+            </a:r>
+          </a:p>
+        </p:txBody>
+      </p:sp>
+      <p:sp>
+        <p:nvSpPr>
+          <p:cNvPr id="40" name="CuadroTexto 39">
+            <a:extLst>
+              <a:ext uri="{FF2B5EF4-FFF2-40B4-BE49-F238E27FC236}">
+                <a16:creationId xmlns:a16="http://schemas.microsoft.com/office/drawing/2014/main" id="{2476623C-B4DE-4C46-B31D-CABE88143AD3}"/>
+              </a:ext>
+            </a:extLst>
+          </p:cNvPr>
+          <p:cNvSpPr txBox="1"/>
+          <p:nvPr/>
+        </p:nvSpPr>
+        <p:spPr>
+          <a:xfrm>
+            <a:off x="5744846" y="1690970"/>
+            <a:ext cx="5834325" cy="2308324"/>
+          </a:xfrm>
+          <a:prstGeom prst="rect">
+            <a:avLst/>
+          </a:prstGeom>
+          <a:noFill/>
+        </p:spPr>
+        <p:txBody>
+          <a:bodyPr wrap="square" rtlCol="0">
+            <a:spAutoFit/>
+          </a:bodyPr>
+          <a:lstStyle/>
+          <a:p>
+            <a:r>
+              <a:rPr lang="es-ES" b="1" dirty="0"/>
+              <a:t>Modelado </a:t>
+            </a:r>
+            <a:r>
+              <a:rPr lang="en-US" b="1" dirty="0"/>
+              <a:t>de Series Temporales</a:t>
+            </a:r>
+          </a:p>
+          <a:p>
+            <a:pPr marL="742950" lvl="1" indent="-285750">
+              <a:buFont typeface="Wingdings" panose="05000000000000000000" pitchFamily="2" charset="2"/>
+              <a:buChar char="Ø"/>
+            </a:pPr>
+            <a:r>
+              <a:rPr lang="en-US" sz="1400" b="1" dirty="0">
+                <a:solidFill>
+                  <a:srgbClr val="FF0000"/>
+                </a:solidFill>
+              </a:rPr>
+              <a:t>Entrenamiento y Validación en Series Temporales</a:t>
+            </a:r>
+          </a:p>
+          <a:p>
+            <a:pPr marL="1200150" lvl="2" indent="-285750">
+              <a:buFont typeface="Wingdings" panose="05000000000000000000" pitchFamily="2" charset="2"/>
+              <a:buChar char="Ø"/>
+            </a:pPr>
+            <a:r>
+              <a:rPr lang="en-US" sz="1400" b="1" dirty="0">
+                <a:solidFill>
+                  <a:srgbClr val="FF0000"/>
+                </a:solidFill>
+              </a:rPr>
+              <a:t>Walkforward Validations</a:t>
+            </a:r>
+          </a:p>
+          <a:p>
+            <a:pPr marL="1200150" lvl="2" indent="-285750">
+              <a:buFont typeface="Wingdings" panose="05000000000000000000" pitchFamily="2" charset="2"/>
+              <a:buChar char="Ø"/>
+            </a:pPr>
+            <a:r>
+              <a:rPr lang="en-US" sz="1400" b="1" dirty="0">
+                <a:solidFill>
+                  <a:srgbClr val="FF0000"/>
+                </a:solidFill>
+              </a:rPr>
+              <a:t>Métricas de validación (MAE, MAPE, RMSE, MDA)</a:t>
+            </a:r>
+          </a:p>
+          <a:p>
+            <a:pPr marL="742950" lvl="1" indent="-285750">
+              <a:buFont typeface="Wingdings" panose="05000000000000000000" pitchFamily="2" charset="2"/>
+              <a:buChar char="Ø"/>
+            </a:pPr>
+            <a:r>
+              <a:rPr lang="en-US" sz="1400" b="1" dirty="0">
+                <a:solidFill>
+                  <a:srgbClr val="FF0000"/>
+                </a:solidFill>
+              </a:rPr>
+              <a:t>Modelos tradicionales </a:t>
+            </a:r>
+          </a:p>
+          <a:p>
+            <a:pPr marL="1200150" lvl="2" indent="-285750">
+              <a:buFont typeface="Wingdings" panose="05000000000000000000" pitchFamily="2" charset="2"/>
+              <a:buChar char="Ø"/>
+            </a:pPr>
+            <a:r>
+              <a:rPr lang="en-US" sz="1400" b="1" dirty="0">
+                <a:solidFill>
+                  <a:srgbClr val="FF0000"/>
+                </a:solidFill>
+              </a:rPr>
+              <a:t>ARIMA,  </a:t>
+            </a:r>
+            <a:r>
+              <a:rPr lang="en-US" sz="1400" dirty="0"/>
+              <a:t>(SARIMAX), prophet</a:t>
+            </a:r>
+          </a:p>
+          <a:p>
+            <a:pPr marL="1200150" lvl="2" indent="-285750">
+              <a:buFont typeface="Wingdings" panose="05000000000000000000" pitchFamily="2" charset="2"/>
+              <a:buChar char="Ø"/>
+            </a:pPr>
+            <a:r>
+              <a:rPr lang="en-US" sz="1400" dirty="0"/>
+              <a:t>Creación de variables </a:t>
+            </a:r>
+            <a:r>
+              <a:rPr lang="en-US" sz="1400" dirty="0" err="1"/>
+              <a:t>regresoras</a:t>
+            </a:r>
+            <a:r>
+              <a:rPr lang="en-US" sz="1400" dirty="0"/>
+              <a:t>, step e impulse</a:t>
+            </a:r>
+          </a:p>
+          <a:p>
+            <a:pPr marL="742950" lvl="1" indent="-285750">
+              <a:buFont typeface="Wingdings" panose="05000000000000000000" pitchFamily="2" charset="2"/>
+              <a:buChar char="Ø"/>
+            </a:pPr>
+            <a:r>
+              <a:rPr lang="en-US" sz="1400" dirty="0" err="1"/>
+              <a:t>Aplicabilidad</a:t>
+            </a:r>
+            <a:r>
+              <a:rPr lang="en-US" sz="1400" dirty="0"/>
+              <a:t> de </a:t>
+            </a:r>
+            <a:r>
+              <a:rPr lang="en-US" sz="1400" dirty="0" err="1"/>
+              <a:t>modelos</a:t>
+            </a:r>
+            <a:endParaRPr lang="en-US" sz="1400" dirty="0"/>
+          </a:p>
+          <a:p>
+            <a:pPr marL="1200150" lvl="2" indent="-285750">
+              <a:buFont typeface="Wingdings" panose="05000000000000000000" pitchFamily="2" charset="2"/>
+              <a:buChar char="Ø"/>
+            </a:pPr>
+            <a:r>
+              <a:rPr lang="en-US" sz="1400" dirty="0" err="1"/>
+              <a:t>Teoría</a:t>
+            </a:r>
+            <a:r>
+              <a:rPr lang="en-US" sz="1400" dirty="0"/>
+              <a:t> de los mercados </a:t>
+            </a:r>
+            <a:r>
+              <a:rPr lang="en-US" sz="1400" dirty="0" err="1"/>
+              <a:t>eficientes</a:t>
+            </a:r>
+            <a:endParaRPr lang="en-US" sz="1400" dirty="0"/>
+          </a:p>
+          <a:p>
+            <a:pPr marL="1200150" lvl="2" indent="-285750">
+              <a:buFont typeface="Wingdings" panose="05000000000000000000" pitchFamily="2" charset="2"/>
+              <a:buChar char="Ø"/>
+            </a:pPr>
+            <a:endParaRPr lang="en-US" sz="1400" dirty="0"/>
+          </a:p>
+        </p:txBody>
+      </p:sp>
+      <p:sp>
+        <p:nvSpPr>
+          <p:cNvPr id="43" name="CuadroTexto 42">
+            <a:extLst>
+              <a:ext uri="{FF2B5EF4-FFF2-40B4-BE49-F238E27FC236}">
+                <a16:creationId xmlns:a16="http://schemas.microsoft.com/office/drawing/2014/main" id="{47A5A277-2DCF-4F78-A2A7-6F76ED500228}"/>
+              </a:ext>
+            </a:extLst>
+          </p:cNvPr>
+          <p:cNvSpPr txBox="1"/>
+          <p:nvPr/>
+        </p:nvSpPr>
+        <p:spPr>
+          <a:xfrm>
+            <a:off x="-85506" y="1360657"/>
+            <a:ext cx="3959603" cy="400110"/>
+          </a:xfrm>
+          <a:prstGeom prst="rect">
+            <a:avLst/>
+          </a:prstGeom>
+          <a:noFill/>
+        </p:spPr>
+        <p:txBody>
+          <a:bodyPr wrap="square" rtlCol="0">
+            <a:spAutoFit/>
+          </a:bodyPr>
+          <a:lstStyle/>
+          <a:p>
+            <a:pPr algn="ctr"/>
+            <a:r>
+              <a:rPr lang="es-ES" sz="2000" i="1" dirty="0"/>
+              <a:t>Primera Fase – 2 Semanas</a:t>
+            </a:r>
+            <a:endParaRPr lang="en-US" i="1" dirty="0"/>
+          </a:p>
+        </p:txBody>
+      </p:sp>
+      <p:sp>
+        <p:nvSpPr>
+          <p:cNvPr id="45" name="CuadroTexto 44">
+            <a:extLst>
+              <a:ext uri="{FF2B5EF4-FFF2-40B4-BE49-F238E27FC236}">
+                <a16:creationId xmlns:a16="http://schemas.microsoft.com/office/drawing/2014/main" id="{12170AA0-17D0-458A-8380-F90F34FCB72B}"/>
+              </a:ext>
+            </a:extLst>
+          </p:cNvPr>
+          <p:cNvSpPr txBox="1"/>
+          <p:nvPr/>
+        </p:nvSpPr>
+        <p:spPr>
+          <a:xfrm>
+            <a:off x="5553080" y="1360657"/>
+            <a:ext cx="3643618" cy="400110"/>
+          </a:xfrm>
+          <a:prstGeom prst="rect">
+            <a:avLst/>
+          </a:prstGeom>
+          <a:noFill/>
+        </p:spPr>
+        <p:txBody>
+          <a:bodyPr wrap="square" rtlCol="0">
+            <a:spAutoFit/>
+          </a:bodyPr>
+          <a:lstStyle/>
+          <a:p>
+            <a:pPr algn="ctr"/>
+            <a:r>
+              <a:rPr lang="es-ES" sz="2000" i="1" dirty="0"/>
+              <a:t>Segunda Fase </a:t>
+            </a:r>
+            <a:r>
+              <a:rPr lang="es-ES" sz="1800" i="1" dirty="0"/>
+              <a:t>– 2 Semanas</a:t>
+            </a:r>
+            <a:endParaRPr lang="en-US" i="1" dirty="0"/>
+          </a:p>
+        </p:txBody>
+      </p:sp>
+      <p:sp>
+        <p:nvSpPr>
+          <p:cNvPr id="8" name="CuadroTexto 7">
+            <a:extLst>
+              <a:ext uri="{FF2B5EF4-FFF2-40B4-BE49-F238E27FC236}">
+                <a16:creationId xmlns:a16="http://schemas.microsoft.com/office/drawing/2014/main" id="{152C8A77-647A-4001-81B8-157BAF9D71D0}"/>
+              </a:ext>
+            </a:extLst>
+          </p:cNvPr>
+          <p:cNvSpPr txBox="1"/>
+          <p:nvPr/>
+        </p:nvSpPr>
+        <p:spPr>
+          <a:xfrm>
+            <a:off x="5708495" y="4346741"/>
+            <a:ext cx="5834325" cy="1446550"/>
+          </a:xfrm>
+          <a:prstGeom prst="rect">
+            <a:avLst/>
+          </a:prstGeom>
+          <a:noFill/>
+        </p:spPr>
+        <p:txBody>
+          <a:bodyPr wrap="square" rtlCol="0">
+            <a:spAutoFit/>
+          </a:bodyPr>
+          <a:lstStyle/>
+          <a:p>
+            <a:r>
+              <a:rPr lang="es-ES" b="1" dirty="0"/>
+              <a:t>Modelos Avanzados</a:t>
+            </a:r>
+            <a:endParaRPr lang="en-US" b="1" dirty="0"/>
+          </a:p>
+          <a:p>
+            <a:pPr marL="742950" lvl="1" indent="-285750">
+              <a:buFont typeface="Wingdings" panose="05000000000000000000" pitchFamily="2" charset="2"/>
+              <a:buChar char="Ø"/>
+            </a:pPr>
+            <a:r>
+              <a:rPr lang="en-US" sz="1400" dirty="0"/>
+              <a:t>Modelado de Series Temporales con Redes Neuronales</a:t>
+            </a:r>
+          </a:p>
+          <a:p>
+            <a:pPr marL="1200150" lvl="2" indent="-285750">
+              <a:buFont typeface="Wingdings" panose="05000000000000000000" pitchFamily="2" charset="2"/>
+              <a:buChar char="Ø"/>
+            </a:pPr>
+            <a:r>
+              <a:rPr lang="en-US" sz="1400" dirty="0"/>
+              <a:t>LSTM</a:t>
+            </a:r>
+          </a:p>
+          <a:p>
+            <a:pPr marL="742950" lvl="1" indent="-285750">
+              <a:buFont typeface="Wingdings" panose="05000000000000000000" pitchFamily="2" charset="2"/>
+              <a:buChar char="Ø"/>
+            </a:pPr>
+            <a:r>
+              <a:rPr lang="en-US" sz="1400" dirty="0" err="1"/>
+              <a:t>Simuladores</a:t>
+            </a:r>
+            <a:endParaRPr lang="en-US" sz="1400" dirty="0"/>
+          </a:p>
+          <a:p>
+            <a:pPr marL="1200150" lvl="2" indent="-285750">
+              <a:buFont typeface="Wingdings" panose="05000000000000000000" pitchFamily="2" charset="2"/>
+              <a:buChar char="Ø"/>
+            </a:pPr>
+            <a:r>
+              <a:rPr lang="en-US" sz="1400" dirty="0"/>
+              <a:t>Importancia relativa de variables</a:t>
+            </a:r>
+          </a:p>
+          <a:p>
+            <a:pPr marL="1200150" lvl="2" indent="-285750">
+              <a:buFont typeface="Wingdings" panose="05000000000000000000" pitchFamily="2" charset="2"/>
+              <a:buChar char="Ø"/>
+            </a:pPr>
+            <a:r>
+              <a:rPr lang="en-US" sz="1400" dirty="0"/>
+              <a:t>Identificación de varianza base vs variable</a:t>
+            </a:r>
+          </a:p>
+        </p:txBody>
+      </p:sp>
+      <p:sp>
+        <p:nvSpPr>
+          <p:cNvPr id="9" name="AutoShape 6" descr="statsmodels">
+            <a:extLst>
+              <a:ext uri="{FF2B5EF4-FFF2-40B4-BE49-F238E27FC236}">
+                <a16:creationId xmlns:a16="http://schemas.microsoft.com/office/drawing/2014/main" id="{CABC1135-890E-4BE3-9332-D0D6EF3DCCCC}"/>
+              </a:ext>
+            </a:extLst>
+          </p:cNvPr>
+          <p:cNvSpPr>
+            <a:spLocks noChangeAspect="1" noChangeArrowheads="1"/>
+          </p:cNvSpPr>
+          <p:nvPr/>
+        </p:nvSpPr>
+        <p:spPr bwMode="auto">
+          <a:xfrm>
+            <a:off x="11524641" y="5400258"/>
+            <a:ext cx="304800" cy="304800"/>
+          </a:xfrm>
+          <a:prstGeom prst="rect">
+            <a:avLst/>
+          </a:prstGeom>
+          <a:noFill/>
+          <a:extLst>
+            <a:ext uri="{909E8E84-426E-40DD-AFC4-6F175D3DCCD1}">
+              <a14:hiddenFill xmlns:a14="http://schemas.microsoft.com/office/drawing/2010/main">
+                <a:solidFill>
+                  <a:srgbClr val="FFFFFF"/>
+                </a:solidFill>
+              </a14:hiddenFill>
+            </a:ext>
+          </a:extLst>
+        </p:spPr>
+        <p:txBody>
+          <a:bodyPr vert="horz" wrap="square" lIns="91440" tIns="45720" rIns="91440" bIns="45720" numCol="1" anchor="t" anchorCtr="0" compatLnSpc="1">
+            <a:prstTxWarp prst="textNoShape">
+              <a:avLst/>
+            </a:prstTxWarp>
+          </a:bodyPr>
+          <a:lstStyle/>
+          <a:p>
+            <a:endParaRPr lang="en-US" dirty="0"/>
+          </a:p>
+        </p:txBody>
+      </p:sp>
+      <p:sp>
+        <p:nvSpPr>
+          <p:cNvPr id="10" name="CuadroTexto 9">
+            <a:extLst>
+              <a:ext uri="{FF2B5EF4-FFF2-40B4-BE49-F238E27FC236}">
+                <a16:creationId xmlns:a16="http://schemas.microsoft.com/office/drawing/2014/main" id="{915661B0-B3F1-4F61-A765-1F3D3903FB7D}"/>
+              </a:ext>
+            </a:extLst>
+          </p:cNvPr>
+          <p:cNvSpPr txBox="1"/>
+          <p:nvPr/>
+        </p:nvSpPr>
+        <p:spPr>
+          <a:xfrm>
+            <a:off x="5553080" y="4014683"/>
+            <a:ext cx="3682767" cy="400110"/>
+          </a:xfrm>
+          <a:prstGeom prst="rect">
+            <a:avLst/>
+          </a:prstGeom>
+          <a:noFill/>
+        </p:spPr>
+        <p:txBody>
+          <a:bodyPr wrap="square" rtlCol="0">
+            <a:spAutoFit/>
+          </a:bodyPr>
+          <a:lstStyle/>
+          <a:p>
+            <a:pPr algn="ctr"/>
+            <a:r>
+              <a:rPr lang="es-ES" sz="2000" i="1" dirty="0"/>
+              <a:t>Tercera Fase – 3 Semanas</a:t>
+            </a:r>
+            <a:endParaRPr lang="en-US" i="1" dirty="0"/>
+          </a:p>
+        </p:txBody>
+      </p:sp>
+    </p:spTree>
+    <p:extLst>
+      <p:ext uri="{BB962C8B-B14F-4D97-AF65-F5344CB8AC3E}">
+        <p14:creationId xmlns:p14="http://schemas.microsoft.com/office/powerpoint/2010/main" val="475523971"/>
+      </p:ext>
+    </p:extLst>
+  </p:cSld>
+  <p:clrMapOvr>
+    <a:masterClrMapping/>
+  </p:clrMapOvr>
+</p:sld>
+</file>
+
+<file path=ppt/slides/slide30.xml><?xml version="1.0" encoding="utf-8"?>
 <p:sld xmlns:a="http://schemas.openxmlformats.org/drawingml/2006/main" xmlns:r="http://schemas.openxmlformats.org/officeDocument/2006/relationships" xmlns:p="http://schemas.openxmlformats.org/presentationml/2006/main">
   <p:cSld>
     <p:spTree>
@@ -21856,729 +24735,6 @@
     <p:extLst>
       <p:ext uri="{BB962C8B-B14F-4D97-AF65-F5344CB8AC3E}">
         <p14:creationId xmlns:p14="http://schemas.microsoft.com/office/powerpoint/2010/main" val="2703144559"/>
-      </p:ext>
-    </p:extLst>
-  </p:cSld>
-  <p:clrMapOvr>
-    <a:masterClrMapping/>
-  </p:clrMapOvr>
-</p:sld>
-</file>
-
-<file path=ppt/slides/slide3.xml><?xml version="1.0" encoding="utf-8"?>
-<p:sld xmlns:a="http://schemas.openxmlformats.org/drawingml/2006/main" xmlns:r="http://schemas.openxmlformats.org/officeDocument/2006/relationships" xmlns:p="http://schemas.openxmlformats.org/presentationml/2006/main">
-  <p:cSld>
-    <p:spTree>
-      <p:nvGrpSpPr>
-        <p:cNvPr id="1" name=""/>
-        <p:cNvGrpSpPr/>
-        <p:nvPr/>
-      </p:nvGrpSpPr>
-      <p:grpSpPr>
-        <a:xfrm>
-          <a:off x="0" y="0"/>
-          <a:ext cx="0" cy="0"/>
-          <a:chOff x="0" y="0"/>
-          <a:chExt cx="0" cy="0"/>
-        </a:xfrm>
-      </p:grpSpPr>
-      <p:sp>
-        <p:nvSpPr>
-          <p:cNvPr id="22" name="CuadroTexto 21">
-            <a:extLst>
-              <a:ext uri="{FF2B5EF4-FFF2-40B4-BE49-F238E27FC236}">
-                <a16:creationId xmlns:a16="http://schemas.microsoft.com/office/drawing/2014/main" id="{5C80F593-DD2F-4F38-8160-0B4B1E5E79C5}"/>
-              </a:ext>
-            </a:extLst>
-          </p:cNvPr>
-          <p:cNvSpPr txBox="1"/>
-          <p:nvPr/>
-        </p:nvSpPr>
-        <p:spPr>
-          <a:xfrm>
-            <a:off x="7222976" y="186661"/>
-            <a:ext cx="5100506" cy="584775"/>
-          </a:xfrm>
-          <a:prstGeom prst="rect">
-            <a:avLst/>
-          </a:prstGeom>
-          <a:noFill/>
-        </p:spPr>
-        <p:txBody>
-          <a:bodyPr wrap="square" rtlCol="0">
-            <a:spAutoFit/>
-          </a:bodyPr>
-          <a:lstStyle/>
-          <a:p>
-            <a:pPr algn="ctr"/>
-            <a:r>
-              <a:rPr lang="es-ES" sz="3200" dirty="0" err="1"/>
-              <a:t>Outline</a:t>
-            </a:r>
-            <a:r>
-              <a:rPr lang="es-ES" sz="3200" dirty="0"/>
-              <a:t> del Laboratorio</a:t>
-            </a:r>
-            <a:endParaRPr lang="en-US" sz="2800" dirty="0"/>
-          </a:p>
-        </p:txBody>
-      </p:sp>
-      <p:sp>
-        <p:nvSpPr>
-          <p:cNvPr id="39" name="CuadroTexto 38">
-            <a:extLst>
-              <a:ext uri="{FF2B5EF4-FFF2-40B4-BE49-F238E27FC236}">
-                <a16:creationId xmlns:a16="http://schemas.microsoft.com/office/drawing/2014/main" id="{B904A498-FAA0-4D1F-952A-8B5CDC3850AC}"/>
-              </a:ext>
-            </a:extLst>
-          </p:cNvPr>
-          <p:cNvSpPr txBox="1"/>
-          <p:nvPr/>
-        </p:nvSpPr>
-        <p:spPr>
-          <a:xfrm>
-            <a:off x="69909" y="1690970"/>
-            <a:ext cx="5834325" cy="2954655"/>
-          </a:xfrm>
-          <a:prstGeom prst="rect">
-            <a:avLst/>
-          </a:prstGeom>
-          <a:noFill/>
-        </p:spPr>
-        <p:txBody>
-          <a:bodyPr wrap="square" rtlCol="0">
-            <a:spAutoFit/>
-          </a:bodyPr>
-          <a:lstStyle/>
-          <a:p>
-            <a:r>
-              <a:rPr lang="es-ES" b="1" dirty="0"/>
-              <a:t>Creación y A</a:t>
-            </a:r>
-            <a:r>
-              <a:rPr lang="en-US" b="1" dirty="0"/>
-              <a:t>nálisis de Series Temporales</a:t>
-            </a:r>
-          </a:p>
-          <a:p>
-            <a:pPr marL="742950" lvl="1" indent="-285750">
-              <a:buFont typeface="Wingdings" panose="05000000000000000000" pitchFamily="2" charset="2"/>
-              <a:buChar char="Ø"/>
-            </a:pPr>
-            <a:r>
-              <a:rPr lang="en-US" sz="1400" dirty="0" err="1"/>
-              <a:t>Descomposición</a:t>
-            </a:r>
-            <a:r>
-              <a:rPr lang="en-US" sz="1400" dirty="0"/>
-              <a:t> de Series</a:t>
-            </a:r>
-          </a:p>
-          <a:p>
-            <a:pPr marL="1200150" lvl="2" indent="-285750">
-              <a:buFont typeface="Wingdings" panose="05000000000000000000" pitchFamily="2" charset="2"/>
-              <a:buChar char="Ø"/>
-            </a:pPr>
-            <a:r>
-              <a:rPr lang="en-US" sz="1400" dirty="0"/>
-              <a:t>Tendencia</a:t>
-            </a:r>
-          </a:p>
-          <a:p>
-            <a:pPr marL="1200150" lvl="2" indent="-285750">
-              <a:buFont typeface="Wingdings" panose="05000000000000000000" pitchFamily="2" charset="2"/>
-              <a:buChar char="Ø"/>
-            </a:pPr>
-            <a:r>
-              <a:rPr lang="en-US" sz="1400" dirty="0"/>
-              <a:t>Estacionalidad</a:t>
-            </a:r>
-          </a:p>
-          <a:p>
-            <a:pPr marL="1200150" lvl="2" indent="-285750">
-              <a:buFont typeface="Wingdings" panose="05000000000000000000" pitchFamily="2" charset="2"/>
-              <a:buChar char="Ø"/>
-            </a:pPr>
-            <a:r>
-              <a:rPr lang="en-US" sz="1400" dirty="0" err="1"/>
-              <a:t>Ruido</a:t>
-            </a:r>
-            <a:endParaRPr lang="en-US" sz="1400" dirty="0"/>
-          </a:p>
-          <a:p>
-            <a:pPr marL="742950" lvl="1" indent="-285750">
-              <a:buFont typeface="Wingdings" panose="05000000000000000000" pitchFamily="2" charset="2"/>
-              <a:buChar char="Ø"/>
-            </a:pPr>
-            <a:r>
-              <a:rPr lang="en-US" sz="1400" dirty="0" err="1"/>
-              <a:t>Creación</a:t>
-            </a:r>
-            <a:r>
-              <a:rPr lang="en-US" sz="1400" dirty="0"/>
-              <a:t> de Series </a:t>
-            </a:r>
-            <a:r>
-              <a:rPr lang="en-US" sz="1400" dirty="0" err="1"/>
-              <a:t>Temporales</a:t>
-            </a:r>
-            <a:endParaRPr lang="en-US" sz="1400" dirty="0"/>
-          </a:p>
-          <a:p>
-            <a:pPr marL="1200150" lvl="2" indent="-285750">
-              <a:buFont typeface="Wingdings" panose="05000000000000000000" pitchFamily="2" charset="2"/>
-              <a:buChar char="Ø"/>
-            </a:pPr>
-            <a:r>
-              <a:rPr lang="en-US" sz="1400" dirty="0" err="1"/>
-              <a:t>Elección</a:t>
-            </a:r>
-            <a:r>
-              <a:rPr lang="en-US" sz="1400" dirty="0"/>
-              <a:t> de </a:t>
-            </a:r>
-            <a:r>
-              <a:rPr lang="en-US" sz="1400" dirty="0" err="1"/>
-              <a:t>Resolución</a:t>
-            </a:r>
-            <a:r>
-              <a:rPr lang="en-US" sz="1400" dirty="0"/>
-              <a:t> temporal</a:t>
-            </a:r>
-          </a:p>
-          <a:p>
-            <a:pPr marL="742950" lvl="1" indent="-285750">
-              <a:buFont typeface="Wingdings" panose="05000000000000000000" pitchFamily="2" charset="2"/>
-              <a:buChar char="Ø"/>
-            </a:pPr>
-            <a:r>
-              <a:rPr lang="en-US" sz="1400" dirty="0" err="1"/>
-              <a:t>Transformación</a:t>
-            </a:r>
-            <a:r>
-              <a:rPr lang="en-US" sz="1400" dirty="0"/>
-              <a:t> de Series Temporales</a:t>
-            </a:r>
-          </a:p>
-          <a:p>
-            <a:pPr marL="1200150" lvl="2" indent="-285750">
-              <a:buFont typeface="Wingdings" panose="05000000000000000000" pitchFamily="2" charset="2"/>
-              <a:buChar char="Ø"/>
-            </a:pPr>
-            <a:r>
-              <a:rPr lang="en-US" sz="1400" dirty="0"/>
-              <a:t>Logaritmos, Diferencias y Normalizaciones</a:t>
-            </a:r>
-          </a:p>
-          <a:p>
-            <a:pPr marL="1200150" lvl="2" indent="-285750">
-              <a:buFont typeface="Wingdings" panose="05000000000000000000" pitchFamily="2" charset="2"/>
-              <a:buChar char="Ø"/>
-            </a:pPr>
-            <a:r>
-              <a:rPr lang="en-US" sz="1400" dirty="0"/>
-              <a:t>Medias </a:t>
-            </a:r>
-            <a:r>
-              <a:rPr lang="en-US" sz="1400" noProof="1"/>
-              <a:t>Móviles</a:t>
-            </a:r>
-          </a:p>
-          <a:p>
-            <a:pPr marL="742950" lvl="1" indent="-285750">
-              <a:buFont typeface="Wingdings" panose="05000000000000000000" pitchFamily="2" charset="2"/>
-              <a:buChar char="Ø"/>
-            </a:pPr>
-            <a:r>
-              <a:rPr lang="en-US" sz="1400" b="1" dirty="0" err="1">
-                <a:solidFill>
-                  <a:srgbClr val="FF0000"/>
-                </a:solidFill>
-              </a:rPr>
-              <a:t>Análisis</a:t>
-            </a:r>
-            <a:r>
-              <a:rPr lang="en-US" sz="1400" b="1" dirty="0">
-                <a:solidFill>
-                  <a:srgbClr val="FF0000"/>
-                </a:solidFill>
-              </a:rPr>
-              <a:t> de las Series</a:t>
-            </a:r>
-          </a:p>
-          <a:p>
-            <a:pPr marL="1200150" lvl="2" indent="-285750">
-              <a:buFont typeface="Wingdings" panose="05000000000000000000" pitchFamily="2" charset="2"/>
-              <a:buChar char="Ø"/>
-            </a:pPr>
-            <a:r>
-              <a:rPr lang="en-US" sz="1400" b="1" dirty="0">
-                <a:solidFill>
-                  <a:srgbClr val="FF0000"/>
-                </a:solidFill>
-              </a:rPr>
-              <a:t>Tests (ACF &amp; PACF, ADF, </a:t>
-            </a:r>
-            <a:r>
-              <a:rPr lang="en-US" sz="1400" b="1" dirty="0" err="1">
-                <a:solidFill>
-                  <a:srgbClr val="FF0000"/>
-                </a:solidFill>
-              </a:rPr>
-              <a:t>etc</a:t>
-            </a:r>
-            <a:r>
-              <a:rPr lang="en-US" sz="1400" b="1" dirty="0">
-                <a:solidFill>
-                  <a:srgbClr val="FF0000"/>
-                </a:solidFill>
-              </a:rPr>
-              <a:t>…)</a:t>
-            </a:r>
-          </a:p>
-          <a:p>
-            <a:pPr marL="1200150" lvl="2" indent="-285750">
-              <a:buFont typeface="Wingdings" panose="05000000000000000000" pitchFamily="2" charset="2"/>
-              <a:buChar char="Ø"/>
-            </a:pPr>
-            <a:r>
-              <a:rPr lang="en-US" sz="1400" b="1" dirty="0">
-                <a:solidFill>
-                  <a:srgbClr val="FF0000"/>
-                </a:solidFill>
-              </a:rPr>
-              <a:t>Cross Correlations</a:t>
-            </a:r>
-          </a:p>
-        </p:txBody>
-      </p:sp>
-      <p:sp>
-        <p:nvSpPr>
-          <p:cNvPr id="40" name="CuadroTexto 39">
-            <a:extLst>
-              <a:ext uri="{FF2B5EF4-FFF2-40B4-BE49-F238E27FC236}">
-                <a16:creationId xmlns:a16="http://schemas.microsoft.com/office/drawing/2014/main" id="{2476623C-B4DE-4C46-B31D-CABE88143AD3}"/>
-              </a:ext>
-            </a:extLst>
-          </p:cNvPr>
-          <p:cNvSpPr txBox="1"/>
-          <p:nvPr/>
-        </p:nvSpPr>
-        <p:spPr>
-          <a:xfrm>
-            <a:off x="5744846" y="1690970"/>
-            <a:ext cx="5834325" cy="2308324"/>
-          </a:xfrm>
-          <a:prstGeom prst="rect">
-            <a:avLst/>
-          </a:prstGeom>
-          <a:noFill/>
-        </p:spPr>
-        <p:txBody>
-          <a:bodyPr wrap="square" rtlCol="0">
-            <a:spAutoFit/>
-          </a:bodyPr>
-          <a:lstStyle/>
-          <a:p>
-            <a:r>
-              <a:rPr lang="es-ES" b="1" dirty="0"/>
-              <a:t>Modelado </a:t>
-            </a:r>
-            <a:r>
-              <a:rPr lang="en-US" b="1" dirty="0"/>
-              <a:t>de Series Temporales</a:t>
-            </a:r>
-          </a:p>
-          <a:p>
-            <a:pPr marL="742950" lvl="1" indent="-285750">
-              <a:buFont typeface="Wingdings" panose="05000000000000000000" pitchFamily="2" charset="2"/>
-              <a:buChar char="Ø"/>
-            </a:pPr>
-            <a:r>
-              <a:rPr lang="en-US" sz="1400" b="1" dirty="0">
-                <a:solidFill>
-                  <a:srgbClr val="FF0000"/>
-                </a:solidFill>
-              </a:rPr>
-              <a:t>Entrenamiento y Validación en Series Temporales</a:t>
-            </a:r>
-          </a:p>
-          <a:p>
-            <a:pPr marL="1200150" lvl="2" indent="-285750">
-              <a:buFont typeface="Wingdings" panose="05000000000000000000" pitchFamily="2" charset="2"/>
-              <a:buChar char="Ø"/>
-            </a:pPr>
-            <a:r>
-              <a:rPr lang="en-US" sz="1400" b="1" dirty="0">
-                <a:solidFill>
-                  <a:srgbClr val="FF0000"/>
-                </a:solidFill>
-              </a:rPr>
-              <a:t>Walkforward Validations</a:t>
-            </a:r>
-          </a:p>
-          <a:p>
-            <a:pPr marL="1200150" lvl="2" indent="-285750">
-              <a:buFont typeface="Wingdings" panose="05000000000000000000" pitchFamily="2" charset="2"/>
-              <a:buChar char="Ø"/>
-            </a:pPr>
-            <a:r>
-              <a:rPr lang="en-US" sz="1400" b="1" dirty="0">
-                <a:solidFill>
-                  <a:srgbClr val="FF0000"/>
-                </a:solidFill>
-              </a:rPr>
-              <a:t>Métricas de validación (MAE, MAPE, RMSE, MDA)</a:t>
-            </a:r>
-          </a:p>
-          <a:p>
-            <a:pPr marL="742950" lvl="1" indent="-285750">
-              <a:buFont typeface="Wingdings" panose="05000000000000000000" pitchFamily="2" charset="2"/>
-              <a:buChar char="Ø"/>
-            </a:pPr>
-            <a:r>
-              <a:rPr lang="en-US" sz="1400" b="1" dirty="0">
-                <a:solidFill>
-                  <a:srgbClr val="FF0000"/>
-                </a:solidFill>
-              </a:rPr>
-              <a:t>Modelos tradicionales </a:t>
-            </a:r>
-          </a:p>
-          <a:p>
-            <a:pPr marL="1200150" lvl="2" indent="-285750">
-              <a:buFont typeface="Wingdings" panose="05000000000000000000" pitchFamily="2" charset="2"/>
-              <a:buChar char="Ø"/>
-            </a:pPr>
-            <a:r>
-              <a:rPr lang="en-US" sz="1400" b="1" dirty="0">
-                <a:solidFill>
-                  <a:srgbClr val="FF0000"/>
-                </a:solidFill>
-              </a:rPr>
-              <a:t>ARIMA,  </a:t>
-            </a:r>
-            <a:r>
-              <a:rPr lang="en-US" sz="1400" dirty="0"/>
-              <a:t>(SARIMAX), prophet</a:t>
-            </a:r>
-          </a:p>
-          <a:p>
-            <a:pPr marL="1200150" lvl="2" indent="-285750">
-              <a:buFont typeface="Wingdings" panose="05000000000000000000" pitchFamily="2" charset="2"/>
-              <a:buChar char="Ø"/>
-            </a:pPr>
-            <a:r>
-              <a:rPr lang="en-US" sz="1400" dirty="0"/>
-              <a:t>Creación de variables </a:t>
-            </a:r>
-            <a:r>
-              <a:rPr lang="en-US" sz="1400" dirty="0" err="1"/>
-              <a:t>regresoras</a:t>
-            </a:r>
-            <a:r>
-              <a:rPr lang="en-US" sz="1400" dirty="0"/>
-              <a:t>, step e impulse</a:t>
-            </a:r>
-          </a:p>
-          <a:p>
-            <a:pPr marL="742950" lvl="1" indent="-285750">
-              <a:buFont typeface="Wingdings" panose="05000000000000000000" pitchFamily="2" charset="2"/>
-              <a:buChar char="Ø"/>
-            </a:pPr>
-            <a:r>
-              <a:rPr lang="en-US" sz="1400" dirty="0" err="1"/>
-              <a:t>Aplicabilidad</a:t>
-            </a:r>
-            <a:r>
-              <a:rPr lang="en-US" sz="1400" dirty="0"/>
-              <a:t> de </a:t>
-            </a:r>
-            <a:r>
-              <a:rPr lang="en-US" sz="1400" dirty="0" err="1"/>
-              <a:t>modelos</a:t>
-            </a:r>
-            <a:endParaRPr lang="en-US" sz="1400" dirty="0"/>
-          </a:p>
-          <a:p>
-            <a:pPr marL="1200150" lvl="2" indent="-285750">
-              <a:buFont typeface="Wingdings" panose="05000000000000000000" pitchFamily="2" charset="2"/>
-              <a:buChar char="Ø"/>
-            </a:pPr>
-            <a:r>
-              <a:rPr lang="en-US" sz="1400" dirty="0" err="1"/>
-              <a:t>Teoría</a:t>
-            </a:r>
-            <a:r>
-              <a:rPr lang="en-US" sz="1400" dirty="0"/>
-              <a:t> de los mercados </a:t>
-            </a:r>
-            <a:r>
-              <a:rPr lang="en-US" sz="1400" dirty="0" err="1"/>
-              <a:t>eficientes</a:t>
-            </a:r>
-            <a:endParaRPr lang="en-US" sz="1400" dirty="0"/>
-          </a:p>
-          <a:p>
-            <a:pPr marL="1200150" lvl="2" indent="-285750">
-              <a:buFont typeface="Wingdings" panose="05000000000000000000" pitchFamily="2" charset="2"/>
-              <a:buChar char="Ø"/>
-            </a:pPr>
-            <a:endParaRPr lang="en-US" sz="1400" dirty="0"/>
-          </a:p>
-        </p:txBody>
-      </p:sp>
-      <p:sp>
-        <p:nvSpPr>
-          <p:cNvPr id="43" name="CuadroTexto 42">
-            <a:extLst>
-              <a:ext uri="{FF2B5EF4-FFF2-40B4-BE49-F238E27FC236}">
-                <a16:creationId xmlns:a16="http://schemas.microsoft.com/office/drawing/2014/main" id="{47A5A277-2DCF-4F78-A2A7-6F76ED500228}"/>
-              </a:ext>
-            </a:extLst>
-          </p:cNvPr>
-          <p:cNvSpPr txBox="1"/>
-          <p:nvPr/>
-        </p:nvSpPr>
-        <p:spPr>
-          <a:xfrm>
-            <a:off x="-85506" y="1360657"/>
-            <a:ext cx="3959603" cy="400110"/>
-          </a:xfrm>
-          <a:prstGeom prst="rect">
-            <a:avLst/>
-          </a:prstGeom>
-          <a:noFill/>
-        </p:spPr>
-        <p:txBody>
-          <a:bodyPr wrap="square" rtlCol="0">
-            <a:spAutoFit/>
-          </a:bodyPr>
-          <a:lstStyle/>
-          <a:p>
-            <a:pPr algn="ctr"/>
-            <a:r>
-              <a:rPr lang="es-ES" sz="2000" i="1" dirty="0"/>
-              <a:t>Primera Fase – 2 Semanas</a:t>
-            </a:r>
-            <a:endParaRPr lang="en-US" i="1" dirty="0"/>
-          </a:p>
-        </p:txBody>
-      </p:sp>
-      <p:sp>
-        <p:nvSpPr>
-          <p:cNvPr id="45" name="CuadroTexto 44">
-            <a:extLst>
-              <a:ext uri="{FF2B5EF4-FFF2-40B4-BE49-F238E27FC236}">
-                <a16:creationId xmlns:a16="http://schemas.microsoft.com/office/drawing/2014/main" id="{12170AA0-17D0-458A-8380-F90F34FCB72B}"/>
-              </a:ext>
-            </a:extLst>
-          </p:cNvPr>
-          <p:cNvSpPr txBox="1"/>
-          <p:nvPr/>
-        </p:nvSpPr>
-        <p:spPr>
-          <a:xfrm>
-            <a:off x="5553080" y="1360657"/>
-            <a:ext cx="3643618" cy="400110"/>
-          </a:xfrm>
-          <a:prstGeom prst="rect">
-            <a:avLst/>
-          </a:prstGeom>
-          <a:noFill/>
-        </p:spPr>
-        <p:txBody>
-          <a:bodyPr wrap="square" rtlCol="0">
-            <a:spAutoFit/>
-          </a:bodyPr>
-          <a:lstStyle/>
-          <a:p>
-            <a:pPr algn="ctr"/>
-            <a:r>
-              <a:rPr lang="es-ES" sz="2000" i="1" dirty="0"/>
-              <a:t>Segunda Fase </a:t>
-            </a:r>
-            <a:r>
-              <a:rPr lang="es-ES" sz="1800" i="1" dirty="0"/>
-              <a:t>– 2 Semanas</a:t>
-            </a:r>
-            <a:endParaRPr lang="en-US" i="1" dirty="0"/>
-          </a:p>
-        </p:txBody>
-      </p:sp>
-      <p:sp>
-        <p:nvSpPr>
-          <p:cNvPr id="8" name="CuadroTexto 7">
-            <a:extLst>
-              <a:ext uri="{FF2B5EF4-FFF2-40B4-BE49-F238E27FC236}">
-                <a16:creationId xmlns:a16="http://schemas.microsoft.com/office/drawing/2014/main" id="{152C8A77-647A-4001-81B8-157BAF9D71D0}"/>
-              </a:ext>
-            </a:extLst>
-          </p:cNvPr>
-          <p:cNvSpPr txBox="1"/>
-          <p:nvPr/>
-        </p:nvSpPr>
-        <p:spPr>
-          <a:xfrm>
-            <a:off x="5708495" y="4346741"/>
-            <a:ext cx="5834325" cy="1446550"/>
-          </a:xfrm>
-          <a:prstGeom prst="rect">
-            <a:avLst/>
-          </a:prstGeom>
-          <a:noFill/>
-        </p:spPr>
-        <p:txBody>
-          <a:bodyPr wrap="square" rtlCol="0">
-            <a:spAutoFit/>
-          </a:bodyPr>
-          <a:lstStyle/>
-          <a:p>
-            <a:r>
-              <a:rPr lang="es-ES" b="1" dirty="0"/>
-              <a:t>Modelos Avanzados</a:t>
-            </a:r>
-            <a:endParaRPr lang="en-US" b="1" dirty="0"/>
-          </a:p>
-          <a:p>
-            <a:pPr marL="742950" lvl="1" indent="-285750">
-              <a:buFont typeface="Wingdings" panose="05000000000000000000" pitchFamily="2" charset="2"/>
-              <a:buChar char="Ø"/>
-            </a:pPr>
-            <a:r>
-              <a:rPr lang="en-US" sz="1400" dirty="0"/>
-              <a:t>Modelado de Series Temporales con Redes Neuronales</a:t>
-            </a:r>
-          </a:p>
-          <a:p>
-            <a:pPr marL="1200150" lvl="2" indent="-285750">
-              <a:buFont typeface="Wingdings" panose="05000000000000000000" pitchFamily="2" charset="2"/>
-              <a:buChar char="Ø"/>
-            </a:pPr>
-            <a:r>
-              <a:rPr lang="en-US" sz="1400" dirty="0"/>
-              <a:t>LSTM</a:t>
-            </a:r>
-          </a:p>
-          <a:p>
-            <a:pPr marL="742950" lvl="1" indent="-285750">
-              <a:buFont typeface="Wingdings" panose="05000000000000000000" pitchFamily="2" charset="2"/>
-              <a:buChar char="Ø"/>
-            </a:pPr>
-            <a:r>
-              <a:rPr lang="en-US" sz="1400" dirty="0" err="1"/>
-              <a:t>Simuladores</a:t>
-            </a:r>
-            <a:endParaRPr lang="en-US" sz="1400" dirty="0"/>
-          </a:p>
-          <a:p>
-            <a:pPr marL="1200150" lvl="2" indent="-285750">
-              <a:buFont typeface="Wingdings" panose="05000000000000000000" pitchFamily="2" charset="2"/>
-              <a:buChar char="Ø"/>
-            </a:pPr>
-            <a:r>
-              <a:rPr lang="en-US" sz="1400" dirty="0"/>
-              <a:t>Importancia relativa de variables</a:t>
-            </a:r>
-          </a:p>
-          <a:p>
-            <a:pPr marL="1200150" lvl="2" indent="-285750">
-              <a:buFont typeface="Wingdings" panose="05000000000000000000" pitchFamily="2" charset="2"/>
-              <a:buChar char="Ø"/>
-            </a:pPr>
-            <a:r>
-              <a:rPr lang="en-US" sz="1400" dirty="0"/>
-              <a:t>Identificación de varianza base vs variable</a:t>
-            </a:r>
-          </a:p>
-        </p:txBody>
-      </p:sp>
-      <p:sp>
-        <p:nvSpPr>
-          <p:cNvPr id="9" name="AutoShape 6" descr="statsmodels">
-            <a:extLst>
-              <a:ext uri="{FF2B5EF4-FFF2-40B4-BE49-F238E27FC236}">
-                <a16:creationId xmlns:a16="http://schemas.microsoft.com/office/drawing/2014/main" id="{CABC1135-890E-4BE3-9332-D0D6EF3DCCCC}"/>
-              </a:ext>
-            </a:extLst>
-          </p:cNvPr>
-          <p:cNvSpPr>
-            <a:spLocks noChangeAspect="1" noChangeArrowheads="1"/>
-          </p:cNvSpPr>
-          <p:nvPr/>
-        </p:nvSpPr>
-        <p:spPr bwMode="auto">
-          <a:xfrm>
-            <a:off x="11524641" y="5400258"/>
-            <a:ext cx="304800" cy="304800"/>
-          </a:xfrm>
-          <a:prstGeom prst="rect">
-            <a:avLst/>
-          </a:prstGeom>
-          <a:noFill/>
-          <a:extLst>
-            <a:ext uri="{909E8E84-426E-40DD-AFC4-6F175D3DCCD1}">
-              <a14:hiddenFill xmlns:a14="http://schemas.microsoft.com/office/drawing/2010/main">
-                <a:solidFill>
-                  <a:srgbClr val="FFFFFF"/>
-                </a:solidFill>
-              </a14:hiddenFill>
-            </a:ext>
-          </a:extLst>
-        </p:spPr>
-        <p:txBody>
-          <a:bodyPr vert="horz" wrap="square" lIns="91440" tIns="45720" rIns="91440" bIns="45720" numCol="1" anchor="t" anchorCtr="0" compatLnSpc="1">
-            <a:prstTxWarp prst="textNoShape">
-              <a:avLst/>
-            </a:prstTxWarp>
-          </a:bodyPr>
-          <a:lstStyle/>
-          <a:p>
-            <a:endParaRPr lang="en-US" dirty="0"/>
-          </a:p>
-        </p:txBody>
-      </p:sp>
-      <p:sp>
-        <p:nvSpPr>
-          <p:cNvPr id="10" name="CuadroTexto 9">
-            <a:extLst>
-              <a:ext uri="{FF2B5EF4-FFF2-40B4-BE49-F238E27FC236}">
-                <a16:creationId xmlns:a16="http://schemas.microsoft.com/office/drawing/2014/main" id="{915661B0-B3F1-4F61-A765-1F3D3903FB7D}"/>
-              </a:ext>
-            </a:extLst>
-          </p:cNvPr>
-          <p:cNvSpPr txBox="1"/>
-          <p:nvPr/>
-        </p:nvSpPr>
-        <p:spPr>
-          <a:xfrm>
-            <a:off x="5553080" y="4014683"/>
-            <a:ext cx="3682767" cy="400110"/>
-          </a:xfrm>
-          <a:prstGeom prst="rect">
-            <a:avLst/>
-          </a:prstGeom>
-          <a:noFill/>
-        </p:spPr>
-        <p:txBody>
-          <a:bodyPr wrap="square" rtlCol="0">
-            <a:spAutoFit/>
-          </a:bodyPr>
-          <a:lstStyle/>
-          <a:p>
-            <a:pPr algn="ctr"/>
-            <a:r>
-              <a:rPr lang="es-ES" sz="2000" i="1" dirty="0"/>
-              <a:t>Tercera Fase – 3 Semanas</a:t>
-            </a:r>
-            <a:endParaRPr lang="en-US" i="1" dirty="0"/>
-          </a:p>
-        </p:txBody>
-      </p:sp>
-    </p:spTree>
-    <p:extLst>
-      <p:ext uri="{BB962C8B-B14F-4D97-AF65-F5344CB8AC3E}">
-        <p14:creationId xmlns:p14="http://schemas.microsoft.com/office/powerpoint/2010/main" val="475523971"/>
       </p:ext>
     </p:extLst>
   </p:cSld>

</xml_diff>